<commit_message>
added run 2 for horizon
</commit_message>
<xml_diff>
--- a/public/js/tasks/horizon/media/horizonInstructions_RSS.pptx
+++ b/public/js/tasks/horizon/media/horizonInstructions_RSS.pptx
@@ -5,7 +5,7 @@
     <p:sldMasterId id="2147483660" r:id="rId1"/>
   </p:sldMasterIdLst>
   <p:notesMasterIdLst>
-    <p:notesMasterId r:id="rId24"/>
+    <p:notesMasterId r:id="rId26"/>
   </p:notesMasterIdLst>
   <p:sldIdLst>
     <p:sldId id="498" r:id="rId2"/>
@@ -30,6 +30,8 @@
     <p:sldId id="529" r:id="rId21"/>
     <p:sldId id="530" r:id="rId22"/>
     <p:sldId id="531" r:id="rId23"/>
+    <p:sldId id="532" r:id="rId24"/>
+    <p:sldId id="533" r:id="rId25"/>
   </p:sldIdLst>
   <p:sldSz cx="12192000" cy="6858000"/>
   <p:notesSz cx="6858000" cy="9144000"/>
@@ -129,6 +131,42 @@
     </a:lvl9pPr>
   </p:defaultTextStyle>
   <p:extLst>
+    <p:ext uri="{521415D9-36F7-43E2-AB2F-B90AF26B5E84}">
+      <p14:sectionLst xmlns:p14="http://schemas.microsoft.com/office/powerpoint/2010/main">
+        <p14:section name="run1" id="{83EBD0D1-AFB9-CA47-840B-0BC3DF865093}">
+          <p14:sldIdLst>
+            <p14:sldId id="498"/>
+            <p14:sldId id="495"/>
+            <p14:sldId id="510"/>
+            <p14:sldId id="511"/>
+            <p14:sldId id="513"/>
+            <p14:sldId id="514"/>
+            <p14:sldId id="515"/>
+            <p14:sldId id="516"/>
+            <p14:sldId id="517"/>
+            <p14:sldId id="518"/>
+            <p14:sldId id="519"/>
+            <p14:sldId id="520"/>
+            <p14:sldId id="521"/>
+            <p14:sldId id="522"/>
+            <p14:sldId id="523"/>
+            <p14:sldId id="524"/>
+            <p14:sldId id="525"/>
+            <p14:sldId id="526"/>
+            <p14:sldId id="528"/>
+            <p14:sldId id="529"/>
+            <p14:sldId id="530"/>
+            <p14:sldId id="531"/>
+          </p14:sldIdLst>
+        </p14:section>
+        <p14:section name="run2" id="{D32F0954-C8B6-BD40-8229-7B80911332A3}">
+          <p14:sldIdLst>
+            <p14:sldId id="532"/>
+            <p14:sldId id="533"/>
+          </p14:sldIdLst>
+        </p14:section>
+      </p14:sectionLst>
+    </p:ext>
     <p:ext uri="{EFAFB233-063F-42B5-8137-9DF3F51BA10A}">
       <p15:sldGuideLst xmlns:p15="http://schemas.microsoft.com/office/powerpoint/2012/main">
         <p15:guide id="1" orient="horz" pos="2160" userDrawn="1">
@@ -229,7 +267,7 @@
           <a:p>
             <a:fld id="{5ACDFB13-8C7E-2148-B293-047F9641DD71}" type="datetimeFigureOut">
               <a:rPr lang="en-US" smtClean="0"/>
-              <a:t>7/27/2020</a:t>
+              <a:t>8/11/20</a:t>
             </a:fld>
             <a:endParaRPr lang="en-US" dirty="0"/>
           </a:p>
@@ -1951,6 +1989,200 @@
 </p:notes>
 </file>
 
+<file path=ppt/notesSlides/notesSlide23.xml><?xml version="1.0" encoding="utf-8"?>
+<p:notes xmlns:a="http://schemas.openxmlformats.org/drawingml/2006/main" xmlns:r="http://schemas.openxmlformats.org/officeDocument/2006/relationships" xmlns:p="http://schemas.openxmlformats.org/presentationml/2006/main">
+  <p:cSld>
+    <p:spTree>
+      <p:nvGrpSpPr>
+        <p:cNvPr id="1" name=""/>
+        <p:cNvGrpSpPr/>
+        <p:nvPr/>
+      </p:nvGrpSpPr>
+      <p:grpSpPr>
+        <a:xfrm>
+          <a:off x="0" y="0"/>
+          <a:ext cx="0" cy="0"/>
+          <a:chOff x="0" y="0"/>
+          <a:chExt cx="0" cy="0"/>
+        </a:xfrm>
+      </p:grpSpPr>
+      <p:sp>
+        <p:nvSpPr>
+          <p:cNvPr id="2" name="Slide Image Placeholder 1"/>
+          <p:cNvSpPr>
+            <a:spLocks noGrp="1" noRot="1" noChangeAspect="1"/>
+          </p:cNvSpPr>
+          <p:nvPr>
+            <p:ph type="sldImg"/>
+          </p:nvPr>
+        </p:nvSpPr>
+        <p:spPr>
+          <a:xfrm>
+            <a:off x="381000" y="685800"/>
+            <a:ext cx="6096000" cy="3429000"/>
+          </a:xfrm>
+        </p:spPr>
+      </p:sp>
+      <p:sp>
+        <p:nvSpPr>
+          <p:cNvPr id="3" name="Notes Placeholder 2"/>
+          <p:cNvSpPr>
+            <a:spLocks noGrp="1"/>
+          </p:cNvSpPr>
+          <p:nvPr>
+            <p:ph type="body" idx="1"/>
+          </p:nvPr>
+        </p:nvSpPr>
+        <p:spPr/>
+        <p:txBody>
+          <a:bodyPr/>
+          <a:lstStyle/>
+          <a:p>
+            <a:r>
+              <a:rPr lang="en-US" dirty="0"/>
+              <a:t>Outside</a:t>
+            </a:r>
+            <a:r>
+              <a:rPr lang="en-US" baseline="0" dirty="0"/>
+              <a:t> the scanner</a:t>
+            </a:r>
+            <a:endParaRPr lang="en-US" dirty="0"/>
+          </a:p>
+        </p:txBody>
+      </p:sp>
+      <p:sp>
+        <p:nvSpPr>
+          <p:cNvPr id="4" name="Slide Number Placeholder 3"/>
+          <p:cNvSpPr>
+            <a:spLocks noGrp="1"/>
+          </p:cNvSpPr>
+          <p:nvPr>
+            <p:ph type="sldNum" sz="quarter" idx="10"/>
+          </p:nvPr>
+        </p:nvSpPr>
+        <p:spPr/>
+        <p:txBody>
+          <a:bodyPr/>
+          <a:lstStyle/>
+          <a:p>
+            <a:fld id="{BCAE12D7-AE97-9243-8341-9A20FCA5A307}" type="slidenum">
+              <a:rPr lang="en-US" smtClean="0"/>
+              <a:t>23</a:t>
+            </a:fld>
+            <a:endParaRPr lang="en-US"/>
+          </a:p>
+        </p:txBody>
+      </p:sp>
+    </p:spTree>
+    <p:extLst>
+      <p:ext uri="{BB962C8B-B14F-4D97-AF65-F5344CB8AC3E}">
+        <p14:creationId xmlns:p14="http://schemas.microsoft.com/office/powerpoint/2010/main" val="2080840416"/>
+      </p:ext>
+    </p:extLst>
+  </p:cSld>
+  <p:clrMapOvr>
+    <a:masterClrMapping/>
+  </p:clrMapOvr>
+</p:notes>
+</file>
+
+<file path=ppt/notesSlides/notesSlide24.xml><?xml version="1.0" encoding="utf-8"?>
+<p:notes xmlns:a="http://schemas.openxmlformats.org/drawingml/2006/main" xmlns:r="http://schemas.openxmlformats.org/officeDocument/2006/relationships" xmlns:p="http://schemas.openxmlformats.org/presentationml/2006/main">
+  <p:cSld>
+    <p:spTree>
+      <p:nvGrpSpPr>
+        <p:cNvPr id="1" name=""/>
+        <p:cNvGrpSpPr/>
+        <p:nvPr/>
+      </p:nvGrpSpPr>
+      <p:grpSpPr>
+        <a:xfrm>
+          <a:off x="0" y="0"/>
+          <a:ext cx="0" cy="0"/>
+          <a:chOff x="0" y="0"/>
+          <a:chExt cx="0" cy="0"/>
+        </a:xfrm>
+      </p:grpSpPr>
+      <p:sp>
+        <p:nvSpPr>
+          <p:cNvPr id="2" name="Slide Image Placeholder 1"/>
+          <p:cNvSpPr>
+            <a:spLocks noGrp="1" noRot="1" noChangeAspect="1"/>
+          </p:cNvSpPr>
+          <p:nvPr>
+            <p:ph type="sldImg"/>
+          </p:nvPr>
+        </p:nvSpPr>
+        <p:spPr>
+          <a:xfrm>
+            <a:off x="381000" y="685800"/>
+            <a:ext cx="6096000" cy="3429000"/>
+          </a:xfrm>
+        </p:spPr>
+      </p:sp>
+      <p:sp>
+        <p:nvSpPr>
+          <p:cNvPr id="3" name="Notes Placeholder 2"/>
+          <p:cNvSpPr>
+            <a:spLocks noGrp="1"/>
+          </p:cNvSpPr>
+          <p:nvPr>
+            <p:ph type="body" idx="1"/>
+          </p:nvPr>
+        </p:nvSpPr>
+        <p:spPr/>
+        <p:txBody>
+          <a:bodyPr/>
+          <a:lstStyle/>
+          <a:p>
+            <a:r>
+              <a:rPr lang="en-US" dirty="0"/>
+              <a:t>Add screenshots of an X and an O</a:t>
+            </a:r>
+            <a:r>
+              <a:rPr lang="en-US" baseline="0" dirty="0"/>
+              <a:t> screen – like a timeline of screenshots.</a:t>
+            </a:r>
+            <a:endParaRPr lang="en-US" dirty="0"/>
+          </a:p>
+        </p:txBody>
+      </p:sp>
+      <p:sp>
+        <p:nvSpPr>
+          <p:cNvPr id="4" name="Slide Number Placeholder 3"/>
+          <p:cNvSpPr>
+            <a:spLocks noGrp="1"/>
+          </p:cNvSpPr>
+          <p:nvPr>
+            <p:ph type="sldNum" sz="quarter" idx="10"/>
+          </p:nvPr>
+        </p:nvSpPr>
+        <p:spPr/>
+        <p:txBody>
+          <a:bodyPr/>
+          <a:lstStyle/>
+          <a:p>
+            <a:fld id="{BCAE12D7-AE97-9243-8341-9A20FCA5A307}" type="slidenum">
+              <a:rPr lang="en-US" smtClean="0"/>
+              <a:t>24</a:t>
+            </a:fld>
+            <a:endParaRPr lang="en-US"/>
+          </a:p>
+        </p:txBody>
+      </p:sp>
+    </p:spTree>
+    <p:extLst>
+      <p:ext uri="{BB962C8B-B14F-4D97-AF65-F5344CB8AC3E}">
+        <p14:creationId xmlns:p14="http://schemas.microsoft.com/office/powerpoint/2010/main" val="3322356223"/>
+      </p:ext>
+    </p:extLst>
+  </p:cSld>
+  <p:clrMapOvr>
+    <a:masterClrMapping/>
+  </p:clrMapOvr>
+</p:notes>
+</file>
+
 <file path=ppt/notesSlides/notesSlide3.xml><?xml version="1.0" encoding="utf-8"?>
 <p:notes xmlns:a="http://schemas.openxmlformats.org/drawingml/2006/main" xmlns:r="http://schemas.openxmlformats.org/officeDocument/2006/relationships" xmlns:p="http://schemas.openxmlformats.org/presentationml/2006/main">
   <p:cSld>
@@ -2809,7 +3041,7 @@
           <a:p>
             <a:fld id="{E69A4D3A-6EF8-7448-AC6F-AD52FEDAA6A8}" type="datetimeFigureOut">
               <a:rPr lang="en-US" smtClean="0"/>
-              <a:t>7/27/2020</a:t>
+              <a:t>8/11/20</a:t>
             </a:fld>
             <a:endParaRPr lang="en-US" dirty="0"/>
           </a:p>
@@ -2977,7 +3209,7 @@
           <a:p>
             <a:fld id="{E69A4D3A-6EF8-7448-AC6F-AD52FEDAA6A8}" type="datetimeFigureOut">
               <a:rPr lang="en-US" smtClean="0"/>
-              <a:t>7/27/2020</a:t>
+              <a:t>8/11/20</a:t>
             </a:fld>
             <a:endParaRPr lang="en-US" dirty="0"/>
           </a:p>
@@ -3155,7 +3387,7 @@
           <a:p>
             <a:fld id="{E69A4D3A-6EF8-7448-AC6F-AD52FEDAA6A8}" type="datetimeFigureOut">
               <a:rPr lang="en-US" smtClean="0"/>
-              <a:t>7/27/2020</a:t>
+              <a:t>8/11/20</a:t>
             </a:fld>
             <a:endParaRPr lang="en-US" dirty="0"/>
           </a:p>
@@ -3323,7 +3555,7 @@
           <a:p>
             <a:fld id="{E69A4D3A-6EF8-7448-AC6F-AD52FEDAA6A8}" type="datetimeFigureOut">
               <a:rPr lang="en-US" smtClean="0"/>
-              <a:t>7/27/2020</a:t>
+              <a:t>8/11/20</a:t>
             </a:fld>
             <a:endParaRPr lang="en-US" dirty="0"/>
           </a:p>
@@ -3568,7 +3800,7 @@
           <a:p>
             <a:fld id="{E69A4D3A-6EF8-7448-AC6F-AD52FEDAA6A8}" type="datetimeFigureOut">
               <a:rPr lang="en-US" smtClean="0"/>
-              <a:t>7/27/2020</a:t>
+              <a:t>8/11/20</a:t>
             </a:fld>
             <a:endParaRPr lang="en-US" dirty="0"/>
           </a:p>
@@ -3853,7 +4085,7 @@
           <a:p>
             <a:fld id="{E69A4D3A-6EF8-7448-AC6F-AD52FEDAA6A8}" type="datetimeFigureOut">
               <a:rPr lang="en-US" smtClean="0"/>
-              <a:t>7/27/2020</a:t>
+              <a:t>8/11/20</a:t>
             </a:fld>
             <a:endParaRPr lang="en-US" dirty="0"/>
           </a:p>
@@ -4272,7 +4504,7 @@
           <a:p>
             <a:fld id="{E69A4D3A-6EF8-7448-AC6F-AD52FEDAA6A8}" type="datetimeFigureOut">
               <a:rPr lang="en-US" smtClean="0"/>
-              <a:t>7/27/2020</a:t>
+              <a:t>8/11/20</a:t>
             </a:fld>
             <a:endParaRPr lang="en-US" dirty="0"/>
           </a:p>
@@ -4389,7 +4621,7 @@
           <a:p>
             <a:fld id="{E69A4D3A-6EF8-7448-AC6F-AD52FEDAA6A8}" type="datetimeFigureOut">
               <a:rPr lang="en-US" smtClean="0"/>
-              <a:t>7/27/2020</a:t>
+              <a:t>8/11/20</a:t>
             </a:fld>
             <a:endParaRPr lang="en-US" dirty="0"/>
           </a:p>
@@ -4484,7 +4716,7 @@
           <a:p>
             <a:fld id="{E69A4D3A-6EF8-7448-AC6F-AD52FEDAA6A8}" type="datetimeFigureOut">
               <a:rPr lang="en-US" smtClean="0"/>
-              <a:t>7/27/2020</a:t>
+              <a:t>8/11/20</a:t>
             </a:fld>
             <a:endParaRPr lang="en-US" dirty="0"/>
           </a:p>
@@ -4759,7 +4991,7 @@
           <a:p>
             <a:fld id="{E69A4D3A-6EF8-7448-AC6F-AD52FEDAA6A8}" type="datetimeFigureOut">
               <a:rPr lang="en-US" smtClean="0"/>
-              <a:t>7/27/2020</a:t>
+              <a:t>8/11/20</a:t>
             </a:fld>
             <a:endParaRPr lang="en-US" dirty="0"/>
           </a:p>
@@ -5014,7 +5246,7 @@
           <a:p>
             <a:fld id="{E69A4D3A-6EF8-7448-AC6F-AD52FEDAA6A8}" type="datetimeFigureOut">
               <a:rPr lang="en-US" smtClean="0"/>
-              <a:t>7/27/2020</a:t>
+              <a:t>8/11/20</a:t>
             </a:fld>
             <a:endParaRPr lang="en-US" dirty="0"/>
           </a:p>
@@ -5228,7 +5460,7 @@
           <a:p>
             <a:fld id="{E69A4D3A-6EF8-7448-AC6F-AD52FEDAA6A8}" type="datetimeFigureOut">
               <a:rPr lang="en-US" smtClean="0"/>
-              <a:t>7/27/2020</a:t>
+              <a:t>8/11/20</a:t>
             </a:fld>
             <a:endParaRPr lang="en-US" dirty="0"/>
           </a:p>
@@ -13565,6 +13797,804 @@
     <p:extLst>
       <p:ext uri="{BB962C8B-B14F-4D97-AF65-F5344CB8AC3E}">
         <p14:creationId xmlns:p14="http://schemas.microsoft.com/office/powerpoint/2010/main" val="3634238876"/>
+      </p:ext>
+    </p:extLst>
+  </p:cSld>
+  <p:clrMapOvr>
+    <a:masterClrMapping/>
+  </p:clrMapOvr>
+</p:sld>
+</file>
+
+<file path=ppt/slides/slide23.xml><?xml version="1.0" encoding="utf-8"?>
+<p:sld xmlns:a="http://schemas.openxmlformats.org/drawingml/2006/main" xmlns:r="http://schemas.openxmlformats.org/officeDocument/2006/relationships" xmlns:p="http://schemas.openxmlformats.org/presentationml/2006/main">
+  <p:cSld>
+    <p:bg>
+      <p:bgPr>
+        <a:solidFill>
+          <a:schemeClr val="bg1"/>
+        </a:solidFill>
+        <a:effectLst/>
+      </p:bgPr>
+    </p:bg>
+    <p:spTree>
+      <p:nvGrpSpPr>
+        <p:cNvPr id="1" name=""/>
+        <p:cNvGrpSpPr/>
+        <p:nvPr/>
+      </p:nvGrpSpPr>
+      <p:grpSpPr>
+        <a:xfrm>
+          <a:off x="0" y="0"/>
+          <a:ext cx="0" cy="0"/>
+          <a:chOff x="0" y="0"/>
+          <a:chExt cx="0" cy="0"/>
+        </a:xfrm>
+      </p:grpSpPr>
+      <p:sp>
+        <p:nvSpPr>
+          <p:cNvPr id="4" name="Title 3"/>
+          <p:cNvSpPr>
+            <a:spLocks noGrp="1"/>
+          </p:cNvSpPr>
+          <p:nvPr>
+            <p:ph type="ctrTitle"/>
+          </p:nvPr>
+        </p:nvSpPr>
+        <p:spPr>
+          <a:xfrm>
+            <a:off x="1888343" y="2130426"/>
+            <a:ext cx="8458200" cy="1470025"/>
+          </a:xfrm>
+        </p:spPr>
+        <p:txBody>
+          <a:bodyPr>
+            <a:normAutofit/>
+          </a:bodyPr>
+          <a:lstStyle/>
+          <a:p>
+            <a:r>
+              <a:rPr lang="en-US" dirty="0"/>
+              <a:t>Horizon Task</a:t>
+            </a:r>
+          </a:p>
+        </p:txBody>
+      </p:sp>
+      <p:sp>
+        <p:nvSpPr>
+          <p:cNvPr id="7" name="Title 3"/>
+          <p:cNvSpPr txBox="1">
+            <a:spLocks/>
+          </p:cNvSpPr>
+          <p:nvPr/>
+        </p:nvSpPr>
+        <p:spPr>
+          <a:xfrm>
+            <a:off x="1524000" y="6201295"/>
+            <a:ext cx="9149174" cy="656705"/>
+          </a:xfrm>
+          <a:prstGeom prst="rect">
+            <a:avLst/>
+          </a:prstGeom>
+        </p:spPr>
+        <p:txBody>
+          <a:bodyPr vert="horz" lIns="91440" tIns="45720" rIns="91440" bIns="45720" rtlCol="0" anchor="ctr">
+            <a:normAutofit/>
+          </a:bodyPr>
+          <a:lstStyle>
+            <a:lvl1pPr algn="ctr" defTabSz="914400" rtl="0" eaLnBrk="1" latinLnBrk="0" hangingPunct="1">
+              <a:spcBef>
+                <a:spcPct val="0"/>
+              </a:spcBef>
+              <a:buNone/>
+              <a:defRPr sz="4400" kern="1200">
+                <a:solidFill>
+                  <a:schemeClr val="tx1"/>
+                </a:solidFill>
+                <a:latin typeface="+mj-lt"/>
+                <a:ea typeface="+mj-ea"/>
+                <a:cs typeface="+mj-cs"/>
+              </a:defRPr>
+            </a:lvl1pPr>
+          </a:lstStyle>
+          <a:p>
+            <a:r>
+              <a:rPr lang="en-US" sz="3000" dirty="0">
+                <a:solidFill>
+                  <a:srgbClr val="FF0000"/>
+                </a:solidFill>
+              </a:rPr>
+              <a:t>PRESS THE RIGHT BUTTON TO CONTINUE</a:t>
+            </a:r>
+          </a:p>
+        </p:txBody>
+      </p:sp>
+      <p:sp>
+        <p:nvSpPr>
+          <p:cNvPr id="12" name="Subtitle 8"/>
+          <p:cNvSpPr txBox="1">
+            <a:spLocks/>
+          </p:cNvSpPr>
+          <p:nvPr/>
+        </p:nvSpPr>
+        <p:spPr>
+          <a:xfrm>
+            <a:off x="9140345" y="6073844"/>
+            <a:ext cx="1532830" cy="801636"/>
+          </a:xfrm>
+          <a:prstGeom prst="rect">
+            <a:avLst/>
+          </a:prstGeom>
+        </p:spPr>
+        <p:txBody>
+          <a:bodyPr vert="horz" lIns="91440" tIns="45720" rIns="91440" bIns="45720" rtlCol="0">
+            <a:normAutofit/>
+          </a:bodyPr>
+          <a:lstStyle>
+            <a:lvl1pPr marL="0" indent="0" algn="ctr" defTabSz="914400" rtl="0" eaLnBrk="1" latinLnBrk="0" hangingPunct="1">
+              <a:spcBef>
+                <a:spcPct val="20000"/>
+              </a:spcBef>
+              <a:buFont typeface="Arial" pitchFamily="34" charset="0"/>
+              <a:buNone/>
+              <a:defRPr sz="3200" kern="1200">
+                <a:solidFill>
+                  <a:schemeClr val="tx1">
+                    <a:tint val="75000"/>
+                  </a:schemeClr>
+                </a:solidFill>
+                <a:latin typeface="+mn-lt"/>
+                <a:ea typeface="+mn-ea"/>
+                <a:cs typeface="+mn-cs"/>
+              </a:defRPr>
+            </a:lvl1pPr>
+            <a:lvl2pPr marL="457200" indent="0" algn="ctr" defTabSz="914400" rtl="0" eaLnBrk="1" latinLnBrk="0" hangingPunct="1">
+              <a:spcBef>
+                <a:spcPct val="20000"/>
+              </a:spcBef>
+              <a:buFont typeface="Arial" pitchFamily="34" charset="0"/>
+              <a:buNone/>
+              <a:defRPr sz="2800" kern="1200">
+                <a:solidFill>
+                  <a:schemeClr val="tx1">
+                    <a:tint val="75000"/>
+                  </a:schemeClr>
+                </a:solidFill>
+                <a:latin typeface="+mn-lt"/>
+                <a:ea typeface="+mn-ea"/>
+                <a:cs typeface="+mn-cs"/>
+              </a:defRPr>
+            </a:lvl2pPr>
+            <a:lvl3pPr marL="914400" indent="0" algn="ctr" defTabSz="914400" rtl="0" eaLnBrk="1" latinLnBrk="0" hangingPunct="1">
+              <a:spcBef>
+                <a:spcPct val="20000"/>
+              </a:spcBef>
+              <a:buFont typeface="Arial" pitchFamily="34" charset="0"/>
+              <a:buNone/>
+              <a:defRPr sz="2400" kern="1200">
+                <a:solidFill>
+                  <a:schemeClr val="tx1">
+                    <a:tint val="75000"/>
+                  </a:schemeClr>
+                </a:solidFill>
+                <a:latin typeface="+mn-lt"/>
+                <a:ea typeface="+mn-ea"/>
+                <a:cs typeface="+mn-cs"/>
+              </a:defRPr>
+            </a:lvl3pPr>
+            <a:lvl4pPr marL="1371600" indent="0" algn="ctr" defTabSz="914400" rtl="0" eaLnBrk="1" latinLnBrk="0" hangingPunct="1">
+              <a:spcBef>
+                <a:spcPct val="20000"/>
+              </a:spcBef>
+              <a:buFont typeface="Arial" pitchFamily="34" charset="0"/>
+              <a:buNone/>
+              <a:defRPr sz="2000" kern="1200">
+                <a:solidFill>
+                  <a:schemeClr val="tx1">
+                    <a:tint val="75000"/>
+                  </a:schemeClr>
+                </a:solidFill>
+                <a:latin typeface="+mn-lt"/>
+                <a:ea typeface="+mn-ea"/>
+                <a:cs typeface="+mn-cs"/>
+              </a:defRPr>
+            </a:lvl4pPr>
+            <a:lvl5pPr marL="1828800" indent="0" algn="ctr" defTabSz="914400" rtl="0" eaLnBrk="1" latinLnBrk="0" hangingPunct="1">
+              <a:spcBef>
+                <a:spcPct val="20000"/>
+              </a:spcBef>
+              <a:buFont typeface="Arial" pitchFamily="34" charset="0"/>
+              <a:buNone/>
+              <a:defRPr sz="2000" kern="1200">
+                <a:solidFill>
+                  <a:schemeClr val="tx1">
+                    <a:tint val="75000"/>
+                  </a:schemeClr>
+                </a:solidFill>
+                <a:latin typeface="+mn-lt"/>
+                <a:ea typeface="+mn-ea"/>
+                <a:cs typeface="+mn-cs"/>
+              </a:defRPr>
+            </a:lvl5pPr>
+            <a:lvl6pPr marL="2286000" indent="0" algn="ctr" defTabSz="914400" rtl="0" eaLnBrk="1" latinLnBrk="0" hangingPunct="1">
+              <a:spcBef>
+                <a:spcPct val="20000"/>
+              </a:spcBef>
+              <a:buFont typeface="Arial" pitchFamily="34" charset="0"/>
+              <a:buNone/>
+              <a:defRPr sz="2000" kern="1200">
+                <a:solidFill>
+                  <a:schemeClr val="tx1">
+                    <a:tint val="75000"/>
+                  </a:schemeClr>
+                </a:solidFill>
+                <a:latin typeface="+mn-lt"/>
+                <a:ea typeface="+mn-ea"/>
+                <a:cs typeface="+mn-cs"/>
+              </a:defRPr>
+            </a:lvl6pPr>
+            <a:lvl7pPr marL="2743200" indent="0" algn="ctr" defTabSz="914400" rtl="0" eaLnBrk="1" latinLnBrk="0" hangingPunct="1">
+              <a:spcBef>
+                <a:spcPct val="20000"/>
+              </a:spcBef>
+              <a:buFont typeface="Arial" pitchFamily="34" charset="0"/>
+              <a:buNone/>
+              <a:defRPr sz="2000" kern="1200">
+                <a:solidFill>
+                  <a:schemeClr val="tx1">
+                    <a:tint val="75000"/>
+                  </a:schemeClr>
+                </a:solidFill>
+                <a:latin typeface="+mn-lt"/>
+                <a:ea typeface="+mn-ea"/>
+                <a:cs typeface="+mn-cs"/>
+              </a:defRPr>
+            </a:lvl7pPr>
+            <a:lvl8pPr marL="3200400" indent="0" algn="ctr" defTabSz="914400" rtl="0" eaLnBrk="1" latinLnBrk="0" hangingPunct="1">
+              <a:spcBef>
+                <a:spcPct val="20000"/>
+              </a:spcBef>
+              <a:buFont typeface="Arial" pitchFamily="34" charset="0"/>
+              <a:buNone/>
+              <a:defRPr sz="2000" kern="1200">
+                <a:solidFill>
+                  <a:schemeClr val="tx1">
+                    <a:tint val="75000"/>
+                  </a:schemeClr>
+                </a:solidFill>
+                <a:latin typeface="+mn-lt"/>
+                <a:ea typeface="+mn-ea"/>
+                <a:cs typeface="+mn-cs"/>
+              </a:defRPr>
+            </a:lvl8pPr>
+            <a:lvl9pPr marL="3657600" indent="0" algn="ctr" defTabSz="914400" rtl="0" eaLnBrk="1" latinLnBrk="0" hangingPunct="1">
+              <a:spcBef>
+                <a:spcPct val="20000"/>
+              </a:spcBef>
+              <a:buFont typeface="Arial" pitchFamily="34" charset="0"/>
+              <a:buNone/>
+              <a:defRPr sz="2000" kern="1200">
+                <a:solidFill>
+                  <a:schemeClr val="tx1">
+                    <a:tint val="75000"/>
+                  </a:schemeClr>
+                </a:solidFill>
+                <a:latin typeface="+mn-lt"/>
+                <a:ea typeface="+mn-ea"/>
+                <a:cs typeface="+mn-cs"/>
+              </a:defRPr>
+            </a:lvl9pPr>
+          </a:lstStyle>
+          <a:p>
+            <a:r>
+              <a:rPr lang="en-US" sz="1600" dirty="0">
+                <a:solidFill>
+                  <a:schemeClr val="tx1"/>
+                </a:solidFill>
+              </a:rPr>
+              <a:t>RIGHT</a:t>
+            </a:r>
+          </a:p>
+        </p:txBody>
+      </p:sp>
+      <p:sp>
+        <p:nvSpPr>
+          <p:cNvPr id="13" name="Right Arrow 12"/>
+          <p:cNvSpPr/>
+          <p:nvPr/>
+        </p:nvSpPr>
+        <p:spPr>
+          <a:xfrm>
+            <a:off x="9637318" y="6391827"/>
+            <a:ext cx="640200" cy="289763"/>
+          </a:xfrm>
+          <a:prstGeom prst="rightArrow">
+            <a:avLst/>
+          </a:prstGeom>
+          <a:solidFill>
+            <a:schemeClr val="tx1"/>
+          </a:solidFill>
+          <a:ln>
+            <a:noFill/>
+          </a:ln>
+        </p:spPr>
+        <p:style>
+          <a:lnRef idx="1">
+            <a:schemeClr val="accent1"/>
+          </a:lnRef>
+          <a:fillRef idx="3">
+            <a:schemeClr val="accent1"/>
+          </a:fillRef>
+          <a:effectRef idx="2">
+            <a:schemeClr val="accent1"/>
+          </a:effectRef>
+          <a:fontRef idx="minor">
+            <a:schemeClr val="lt1"/>
+          </a:fontRef>
+        </p:style>
+        <p:txBody>
+          <a:bodyPr rtlCol="0" anchor="ctr"/>
+          <a:lstStyle/>
+          <a:p>
+            <a:pPr algn="ctr"/>
+            <a:endParaRPr lang="en-US"/>
+          </a:p>
+        </p:txBody>
+      </p:sp>
+      <p:pic>
+        <p:nvPicPr>
+          <p:cNvPr id="9" name="Picture 8"/>
+          <p:cNvPicPr>
+            <a:picLocks noChangeAspect="1"/>
+          </p:cNvPicPr>
+          <p:nvPr/>
+        </p:nvPicPr>
+        <p:blipFill>
+          <a:blip r:embed="rId3">
+            <a:extLst>
+              <a:ext uri="{28A0092B-C50C-407E-A947-70E740481C1C}">
+                <a14:useLocalDpi xmlns:a14="http://schemas.microsoft.com/office/drawing/2010/main" val="0"/>
+              </a:ext>
+            </a:extLst>
+          </a:blip>
+          <a:stretch>
+            <a:fillRect/>
+          </a:stretch>
+        </p:blipFill>
+        <p:spPr>
+          <a:xfrm>
+            <a:off x="8585983" y="236744"/>
+            <a:ext cx="1760561" cy="333863"/>
+          </a:xfrm>
+          <a:prstGeom prst="rect">
+            <a:avLst/>
+          </a:prstGeom>
+        </p:spPr>
+      </p:pic>
+      <p:sp>
+        <p:nvSpPr>
+          <p:cNvPr id="3" name="TextBox 2">
+            <a:extLst>
+              <a:ext uri="{FF2B5EF4-FFF2-40B4-BE49-F238E27FC236}">
+                <a16:creationId xmlns:a16="http://schemas.microsoft.com/office/drawing/2014/main" id="{FFBB1882-2811-DC42-B2D6-C0A65CB2AA4E}"/>
+              </a:ext>
+            </a:extLst>
+          </p:cNvPr>
+          <p:cNvSpPr txBox="1"/>
+          <p:nvPr/>
+        </p:nvSpPr>
+        <p:spPr>
+          <a:xfrm>
+            <a:off x="5064211" y="5704512"/>
+            <a:ext cx="2063578" cy="369332"/>
+          </a:xfrm>
+          <a:prstGeom prst="rect">
+            <a:avLst/>
+          </a:prstGeom>
+          <a:noFill/>
+        </p:spPr>
+        <p:txBody>
+          <a:bodyPr wrap="square" rtlCol="0">
+            <a:spAutoFit/>
+          </a:bodyPr>
+          <a:lstStyle/>
+          <a:p>
+            <a:pPr algn="ctr"/>
+            <a:r>
+              <a:rPr lang="en-US" dirty="0"/>
+              <a:t>RUN 2</a:t>
+            </a:r>
+          </a:p>
+        </p:txBody>
+      </p:sp>
+    </p:spTree>
+    <p:extLst>
+      <p:ext uri="{BB962C8B-B14F-4D97-AF65-F5344CB8AC3E}">
+        <p14:creationId xmlns:p14="http://schemas.microsoft.com/office/powerpoint/2010/main" val="1204496967"/>
+      </p:ext>
+    </p:extLst>
+  </p:cSld>
+  <p:clrMapOvr>
+    <a:masterClrMapping/>
+  </p:clrMapOvr>
+</p:sld>
+</file>
+
+<file path=ppt/slides/slide24.xml><?xml version="1.0" encoding="utf-8"?>
+<p:sld xmlns:a="http://schemas.openxmlformats.org/drawingml/2006/main" xmlns:r="http://schemas.openxmlformats.org/officeDocument/2006/relationships" xmlns:p="http://schemas.openxmlformats.org/presentationml/2006/main">
+  <p:cSld>
+    <p:bg>
+      <p:bgPr>
+        <a:solidFill>
+          <a:schemeClr val="bg1"/>
+        </a:solidFill>
+        <a:effectLst/>
+      </p:bgPr>
+    </p:bg>
+    <p:spTree>
+      <p:nvGrpSpPr>
+        <p:cNvPr id="1" name=""/>
+        <p:cNvGrpSpPr/>
+        <p:nvPr/>
+      </p:nvGrpSpPr>
+      <p:grpSpPr>
+        <a:xfrm>
+          <a:off x="0" y="0"/>
+          <a:ext cx="0" cy="0"/>
+          <a:chOff x="0" y="0"/>
+          <a:chExt cx="0" cy="0"/>
+        </a:xfrm>
+      </p:grpSpPr>
+      <p:sp>
+        <p:nvSpPr>
+          <p:cNvPr id="3" name="Content Placeholder 2"/>
+          <p:cNvSpPr>
+            <a:spLocks noGrp="1"/>
+          </p:cNvSpPr>
+          <p:nvPr>
+            <p:ph idx="1"/>
+          </p:nvPr>
+        </p:nvSpPr>
+        <p:spPr>
+          <a:xfrm>
+            <a:off x="840890" y="871371"/>
+            <a:ext cx="10510220" cy="4406499"/>
+          </a:xfrm>
+        </p:spPr>
+        <p:txBody>
+          <a:bodyPr>
+            <a:noAutofit/>
+          </a:bodyPr>
+          <a:lstStyle/>
+          <a:p>
+            <a:pPr marL="0" indent="0" algn="ctr">
+              <a:buNone/>
+            </a:pPr>
+            <a:r>
+              <a:rPr lang="en-US" dirty="0"/>
+              <a:t>This is run 2.</a:t>
+            </a:r>
+          </a:p>
+          <a:p>
+            <a:pPr marL="0" indent="0" algn="ctr">
+              <a:buNone/>
+            </a:pPr>
+            <a:endParaRPr lang="en-US" dirty="0"/>
+          </a:p>
+          <a:p>
+            <a:pPr marL="0" indent="0" algn="ctr">
+              <a:buNone/>
+            </a:pPr>
+            <a:r>
+              <a:rPr lang="en-US" dirty="0"/>
+              <a:t>Same instructions as Run 1</a:t>
+            </a:r>
+          </a:p>
+          <a:p>
+            <a:pPr marL="0" indent="0" algn="ctr">
+              <a:buNone/>
+            </a:pPr>
+            <a:endParaRPr lang="en-US" dirty="0"/>
+          </a:p>
+          <a:p>
+            <a:pPr marL="0" indent="0" algn="ctr">
+              <a:buNone/>
+            </a:pPr>
+            <a:endParaRPr lang="en-US" dirty="0"/>
+          </a:p>
+          <a:p>
+            <a:pPr marL="0" indent="0" algn="ctr">
+              <a:buNone/>
+            </a:pPr>
+            <a:endParaRPr lang="en-US" dirty="0"/>
+          </a:p>
+        </p:txBody>
+      </p:sp>
+      <p:sp>
+        <p:nvSpPr>
+          <p:cNvPr id="26" name="Title 3"/>
+          <p:cNvSpPr txBox="1">
+            <a:spLocks/>
+          </p:cNvSpPr>
+          <p:nvPr/>
+        </p:nvSpPr>
+        <p:spPr>
+          <a:xfrm>
+            <a:off x="1524000" y="6201295"/>
+            <a:ext cx="9149174" cy="656705"/>
+          </a:xfrm>
+          <a:prstGeom prst="rect">
+            <a:avLst/>
+          </a:prstGeom>
+        </p:spPr>
+        <p:txBody>
+          <a:bodyPr vert="horz" lIns="91440" tIns="45720" rIns="91440" bIns="45720" rtlCol="0" anchor="ctr">
+            <a:normAutofit/>
+          </a:bodyPr>
+          <a:lstStyle>
+            <a:lvl1pPr algn="ctr" defTabSz="914400" rtl="0" eaLnBrk="1" latinLnBrk="0" hangingPunct="1">
+              <a:spcBef>
+                <a:spcPct val="0"/>
+              </a:spcBef>
+              <a:buNone/>
+              <a:defRPr sz="4400" kern="1200">
+                <a:solidFill>
+                  <a:schemeClr val="tx1"/>
+                </a:solidFill>
+                <a:latin typeface="+mj-lt"/>
+                <a:ea typeface="+mj-ea"/>
+                <a:cs typeface="+mj-cs"/>
+              </a:defRPr>
+            </a:lvl1pPr>
+          </a:lstStyle>
+          <a:p>
+            <a:r>
+              <a:rPr lang="en-US" sz="3000" dirty="0">
+                <a:solidFill>
+                  <a:srgbClr val="FF0000"/>
+                </a:solidFill>
+              </a:rPr>
+              <a:t>PRESS THE RIGHT BUTTON TO CONTINUE</a:t>
+            </a:r>
+          </a:p>
+        </p:txBody>
+      </p:sp>
+      <p:sp>
+        <p:nvSpPr>
+          <p:cNvPr id="12" name="Subtitle 8"/>
+          <p:cNvSpPr txBox="1">
+            <a:spLocks/>
+          </p:cNvSpPr>
+          <p:nvPr/>
+        </p:nvSpPr>
+        <p:spPr>
+          <a:xfrm>
+            <a:off x="9140345" y="6073844"/>
+            <a:ext cx="1532830" cy="801636"/>
+          </a:xfrm>
+          <a:prstGeom prst="rect">
+            <a:avLst/>
+          </a:prstGeom>
+        </p:spPr>
+        <p:txBody>
+          <a:bodyPr vert="horz" lIns="91440" tIns="45720" rIns="91440" bIns="45720" rtlCol="0">
+            <a:normAutofit/>
+          </a:bodyPr>
+          <a:lstStyle>
+            <a:lvl1pPr marL="0" indent="0" algn="ctr" defTabSz="914400" rtl="0" eaLnBrk="1" latinLnBrk="0" hangingPunct="1">
+              <a:spcBef>
+                <a:spcPct val="20000"/>
+              </a:spcBef>
+              <a:buFont typeface="Arial" pitchFamily="34" charset="0"/>
+              <a:buNone/>
+              <a:defRPr sz="3200" kern="1200">
+                <a:solidFill>
+                  <a:schemeClr val="tx1">
+                    <a:tint val="75000"/>
+                  </a:schemeClr>
+                </a:solidFill>
+                <a:latin typeface="+mn-lt"/>
+                <a:ea typeface="+mn-ea"/>
+                <a:cs typeface="+mn-cs"/>
+              </a:defRPr>
+            </a:lvl1pPr>
+            <a:lvl2pPr marL="457200" indent="0" algn="ctr" defTabSz="914400" rtl="0" eaLnBrk="1" latinLnBrk="0" hangingPunct="1">
+              <a:spcBef>
+                <a:spcPct val="20000"/>
+              </a:spcBef>
+              <a:buFont typeface="Arial" pitchFamily="34" charset="0"/>
+              <a:buNone/>
+              <a:defRPr sz="2800" kern="1200">
+                <a:solidFill>
+                  <a:schemeClr val="tx1">
+                    <a:tint val="75000"/>
+                  </a:schemeClr>
+                </a:solidFill>
+                <a:latin typeface="+mn-lt"/>
+                <a:ea typeface="+mn-ea"/>
+                <a:cs typeface="+mn-cs"/>
+              </a:defRPr>
+            </a:lvl2pPr>
+            <a:lvl3pPr marL="914400" indent="0" algn="ctr" defTabSz="914400" rtl="0" eaLnBrk="1" latinLnBrk="0" hangingPunct="1">
+              <a:spcBef>
+                <a:spcPct val="20000"/>
+              </a:spcBef>
+              <a:buFont typeface="Arial" pitchFamily="34" charset="0"/>
+              <a:buNone/>
+              <a:defRPr sz="2400" kern="1200">
+                <a:solidFill>
+                  <a:schemeClr val="tx1">
+                    <a:tint val="75000"/>
+                  </a:schemeClr>
+                </a:solidFill>
+                <a:latin typeface="+mn-lt"/>
+                <a:ea typeface="+mn-ea"/>
+                <a:cs typeface="+mn-cs"/>
+              </a:defRPr>
+            </a:lvl3pPr>
+            <a:lvl4pPr marL="1371600" indent="0" algn="ctr" defTabSz="914400" rtl="0" eaLnBrk="1" latinLnBrk="0" hangingPunct="1">
+              <a:spcBef>
+                <a:spcPct val="20000"/>
+              </a:spcBef>
+              <a:buFont typeface="Arial" pitchFamily="34" charset="0"/>
+              <a:buNone/>
+              <a:defRPr sz="2000" kern="1200">
+                <a:solidFill>
+                  <a:schemeClr val="tx1">
+                    <a:tint val="75000"/>
+                  </a:schemeClr>
+                </a:solidFill>
+                <a:latin typeface="+mn-lt"/>
+                <a:ea typeface="+mn-ea"/>
+                <a:cs typeface="+mn-cs"/>
+              </a:defRPr>
+            </a:lvl4pPr>
+            <a:lvl5pPr marL="1828800" indent="0" algn="ctr" defTabSz="914400" rtl="0" eaLnBrk="1" latinLnBrk="0" hangingPunct="1">
+              <a:spcBef>
+                <a:spcPct val="20000"/>
+              </a:spcBef>
+              <a:buFont typeface="Arial" pitchFamily="34" charset="0"/>
+              <a:buNone/>
+              <a:defRPr sz="2000" kern="1200">
+                <a:solidFill>
+                  <a:schemeClr val="tx1">
+                    <a:tint val="75000"/>
+                  </a:schemeClr>
+                </a:solidFill>
+                <a:latin typeface="+mn-lt"/>
+                <a:ea typeface="+mn-ea"/>
+                <a:cs typeface="+mn-cs"/>
+              </a:defRPr>
+            </a:lvl5pPr>
+            <a:lvl6pPr marL="2286000" indent="0" algn="ctr" defTabSz="914400" rtl="0" eaLnBrk="1" latinLnBrk="0" hangingPunct="1">
+              <a:spcBef>
+                <a:spcPct val="20000"/>
+              </a:spcBef>
+              <a:buFont typeface="Arial" pitchFamily="34" charset="0"/>
+              <a:buNone/>
+              <a:defRPr sz="2000" kern="1200">
+                <a:solidFill>
+                  <a:schemeClr val="tx1">
+                    <a:tint val="75000"/>
+                  </a:schemeClr>
+                </a:solidFill>
+                <a:latin typeface="+mn-lt"/>
+                <a:ea typeface="+mn-ea"/>
+                <a:cs typeface="+mn-cs"/>
+              </a:defRPr>
+            </a:lvl6pPr>
+            <a:lvl7pPr marL="2743200" indent="0" algn="ctr" defTabSz="914400" rtl="0" eaLnBrk="1" latinLnBrk="0" hangingPunct="1">
+              <a:spcBef>
+                <a:spcPct val="20000"/>
+              </a:spcBef>
+              <a:buFont typeface="Arial" pitchFamily="34" charset="0"/>
+              <a:buNone/>
+              <a:defRPr sz="2000" kern="1200">
+                <a:solidFill>
+                  <a:schemeClr val="tx1">
+                    <a:tint val="75000"/>
+                  </a:schemeClr>
+                </a:solidFill>
+                <a:latin typeface="+mn-lt"/>
+                <a:ea typeface="+mn-ea"/>
+                <a:cs typeface="+mn-cs"/>
+              </a:defRPr>
+            </a:lvl7pPr>
+            <a:lvl8pPr marL="3200400" indent="0" algn="ctr" defTabSz="914400" rtl="0" eaLnBrk="1" latinLnBrk="0" hangingPunct="1">
+              <a:spcBef>
+                <a:spcPct val="20000"/>
+              </a:spcBef>
+              <a:buFont typeface="Arial" pitchFamily="34" charset="0"/>
+              <a:buNone/>
+              <a:defRPr sz="2000" kern="1200">
+                <a:solidFill>
+                  <a:schemeClr val="tx1">
+                    <a:tint val="75000"/>
+                  </a:schemeClr>
+                </a:solidFill>
+                <a:latin typeface="+mn-lt"/>
+                <a:ea typeface="+mn-ea"/>
+                <a:cs typeface="+mn-cs"/>
+              </a:defRPr>
+            </a:lvl8pPr>
+            <a:lvl9pPr marL="3657600" indent="0" algn="ctr" defTabSz="914400" rtl="0" eaLnBrk="1" latinLnBrk="0" hangingPunct="1">
+              <a:spcBef>
+                <a:spcPct val="20000"/>
+              </a:spcBef>
+              <a:buFont typeface="Arial" pitchFamily="34" charset="0"/>
+              <a:buNone/>
+              <a:defRPr sz="2000" kern="1200">
+                <a:solidFill>
+                  <a:schemeClr val="tx1">
+                    <a:tint val="75000"/>
+                  </a:schemeClr>
+                </a:solidFill>
+                <a:latin typeface="+mn-lt"/>
+                <a:ea typeface="+mn-ea"/>
+                <a:cs typeface="+mn-cs"/>
+              </a:defRPr>
+            </a:lvl9pPr>
+          </a:lstStyle>
+          <a:p>
+            <a:r>
+              <a:rPr lang="en-US" sz="1600" dirty="0">
+                <a:solidFill>
+                  <a:schemeClr val="tx1"/>
+                </a:solidFill>
+              </a:rPr>
+              <a:t>RIGHT</a:t>
+            </a:r>
+          </a:p>
+        </p:txBody>
+      </p:sp>
+      <p:sp>
+        <p:nvSpPr>
+          <p:cNvPr id="13" name="Right Arrow 12"/>
+          <p:cNvSpPr/>
+          <p:nvPr/>
+        </p:nvSpPr>
+        <p:spPr>
+          <a:xfrm>
+            <a:off x="9637318" y="6391827"/>
+            <a:ext cx="640200" cy="289763"/>
+          </a:xfrm>
+          <a:prstGeom prst="rightArrow">
+            <a:avLst/>
+          </a:prstGeom>
+          <a:solidFill>
+            <a:schemeClr val="tx1"/>
+          </a:solidFill>
+          <a:ln>
+            <a:noFill/>
+          </a:ln>
+        </p:spPr>
+        <p:style>
+          <a:lnRef idx="1">
+            <a:schemeClr val="accent1"/>
+          </a:lnRef>
+          <a:fillRef idx="3">
+            <a:schemeClr val="accent1"/>
+          </a:fillRef>
+          <a:effectRef idx="2">
+            <a:schemeClr val="accent1"/>
+          </a:effectRef>
+          <a:fontRef idx="minor">
+            <a:schemeClr val="lt1"/>
+          </a:fontRef>
+        </p:style>
+        <p:txBody>
+          <a:bodyPr rtlCol="0" anchor="ctr"/>
+          <a:lstStyle/>
+          <a:p>
+            <a:pPr algn="ctr"/>
+            <a:endParaRPr lang="en-US"/>
+          </a:p>
+        </p:txBody>
+      </p:sp>
+    </p:spTree>
+    <p:extLst>
+      <p:ext uri="{BB962C8B-B14F-4D97-AF65-F5344CB8AC3E}">
+        <p14:creationId xmlns:p14="http://schemas.microsoft.com/office/powerpoint/2010/main" val="984613945"/>
       </p:ext>
     </p:extLst>
   </p:cSld>

</xml_diff>

<commit_message>
updated horizon task run
</commit_message>
<xml_diff>
--- a/public/js/tasks/horizon/media/horizonInstructions_RSS.pptx
+++ b/public/js/tasks/horizon/media/horizonInstructions_RSS.pptx
@@ -267,7 +267,7 @@
           <a:p>
             <a:fld id="{5ACDFB13-8C7E-2148-B293-047F9641DD71}" type="datetimeFigureOut">
               <a:rPr lang="en-US" smtClean="0"/>
-              <a:t>8/11/20</a:t>
+              <a:t>8/17/20</a:t>
             </a:fld>
             <a:endParaRPr lang="en-US" dirty="0"/>
           </a:p>
@@ -1844,14 +1844,6 @@
           <a:bodyPr/>
           <a:lstStyle/>
           <a:p>
-            <a:r>
-              <a:rPr lang="en-US" dirty="0"/>
-              <a:t>Add screenshots of an X and an O</a:t>
-            </a:r>
-            <a:r>
-              <a:rPr lang="en-US" baseline="0" dirty="0"/>
-              <a:t> screen – like a timeline of screenshots.</a:t>
-            </a:r>
             <a:endParaRPr lang="en-US" dirty="0"/>
           </a:p>
         </p:txBody>
@@ -3041,7 +3033,7 @@
           <a:p>
             <a:fld id="{E69A4D3A-6EF8-7448-AC6F-AD52FEDAA6A8}" type="datetimeFigureOut">
               <a:rPr lang="en-US" smtClean="0"/>
-              <a:t>8/11/20</a:t>
+              <a:t>8/17/20</a:t>
             </a:fld>
             <a:endParaRPr lang="en-US" dirty="0"/>
           </a:p>
@@ -3209,7 +3201,7 @@
           <a:p>
             <a:fld id="{E69A4D3A-6EF8-7448-AC6F-AD52FEDAA6A8}" type="datetimeFigureOut">
               <a:rPr lang="en-US" smtClean="0"/>
-              <a:t>8/11/20</a:t>
+              <a:t>8/17/20</a:t>
             </a:fld>
             <a:endParaRPr lang="en-US" dirty="0"/>
           </a:p>
@@ -3387,7 +3379,7 @@
           <a:p>
             <a:fld id="{E69A4D3A-6EF8-7448-AC6F-AD52FEDAA6A8}" type="datetimeFigureOut">
               <a:rPr lang="en-US" smtClean="0"/>
-              <a:t>8/11/20</a:t>
+              <a:t>8/17/20</a:t>
             </a:fld>
             <a:endParaRPr lang="en-US" dirty="0"/>
           </a:p>
@@ -3555,7 +3547,7 @@
           <a:p>
             <a:fld id="{E69A4D3A-6EF8-7448-AC6F-AD52FEDAA6A8}" type="datetimeFigureOut">
               <a:rPr lang="en-US" smtClean="0"/>
-              <a:t>8/11/20</a:t>
+              <a:t>8/17/20</a:t>
             </a:fld>
             <a:endParaRPr lang="en-US" dirty="0"/>
           </a:p>
@@ -3800,7 +3792,7 @@
           <a:p>
             <a:fld id="{E69A4D3A-6EF8-7448-AC6F-AD52FEDAA6A8}" type="datetimeFigureOut">
               <a:rPr lang="en-US" smtClean="0"/>
-              <a:t>8/11/20</a:t>
+              <a:t>8/17/20</a:t>
             </a:fld>
             <a:endParaRPr lang="en-US" dirty="0"/>
           </a:p>
@@ -4085,7 +4077,7 @@
           <a:p>
             <a:fld id="{E69A4D3A-6EF8-7448-AC6F-AD52FEDAA6A8}" type="datetimeFigureOut">
               <a:rPr lang="en-US" smtClean="0"/>
-              <a:t>8/11/20</a:t>
+              <a:t>8/17/20</a:t>
             </a:fld>
             <a:endParaRPr lang="en-US" dirty="0"/>
           </a:p>
@@ -4504,7 +4496,7 @@
           <a:p>
             <a:fld id="{E69A4D3A-6EF8-7448-AC6F-AD52FEDAA6A8}" type="datetimeFigureOut">
               <a:rPr lang="en-US" smtClean="0"/>
-              <a:t>8/11/20</a:t>
+              <a:t>8/17/20</a:t>
             </a:fld>
             <a:endParaRPr lang="en-US" dirty="0"/>
           </a:p>
@@ -4621,7 +4613,7 @@
           <a:p>
             <a:fld id="{E69A4D3A-6EF8-7448-AC6F-AD52FEDAA6A8}" type="datetimeFigureOut">
               <a:rPr lang="en-US" smtClean="0"/>
-              <a:t>8/11/20</a:t>
+              <a:t>8/17/20</a:t>
             </a:fld>
             <a:endParaRPr lang="en-US" dirty="0"/>
           </a:p>
@@ -4716,7 +4708,7 @@
           <a:p>
             <a:fld id="{E69A4D3A-6EF8-7448-AC6F-AD52FEDAA6A8}" type="datetimeFigureOut">
               <a:rPr lang="en-US" smtClean="0"/>
-              <a:t>8/11/20</a:t>
+              <a:t>8/17/20</a:t>
             </a:fld>
             <a:endParaRPr lang="en-US" dirty="0"/>
           </a:p>
@@ -4991,7 +4983,7 @@
           <a:p>
             <a:fld id="{E69A4D3A-6EF8-7448-AC6F-AD52FEDAA6A8}" type="datetimeFigureOut">
               <a:rPr lang="en-US" smtClean="0"/>
-              <a:t>8/11/20</a:t>
+              <a:t>8/17/20</a:t>
             </a:fld>
             <a:endParaRPr lang="en-US" dirty="0"/>
           </a:p>
@@ -5246,7 +5238,7 @@
           <a:p>
             <a:fld id="{E69A4D3A-6EF8-7448-AC6F-AD52FEDAA6A8}" type="datetimeFigureOut">
               <a:rPr lang="en-US" smtClean="0"/>
-              <a:t>8/11/20</a:t>
+              <a:t>8/17/20</a:t>
             </a:fld>
             <a:endParaRPr lang="en-US" dirty="0"/>
           </a:p>
@@ -5460,7 +5452,7 @@
           <a:p>
             <a:fld id="{E69A4D3A-6EF8-7448-AC6F-AD52FEDAA6A8}" type="datetimeFigureOut">
               <a:rPr lang="en-US" smtClean="0"/>
-              <a:t>8/11/20</a:t>
+              <a:t>8/17/20</a:t>
             </a:fld>
             <a:endParaRPr lang="en-US" dirty="0"/>
           </a:p>
@@ -6928,7 +6920,7 @@
           </a:bodyPr>
           <a:lstStyle/>
           <a:p>
-            <a:pPr marL="0" indent="0" algn="ctr">
+            <a:pPr marL="0" indent="0">
               <a:buNone/>
             </a:pPr>
             <a:r>
@@ -7671,8 +7663,8 @@
         </p:nvSpPr>
         <p:spPr>
           <a:xfrm>
-            <a:off x="457200" y="473173"/>
-            <a:ext cx="11214100" cy="1662164"/>
+            <a:off x="457200" y="473172"/>
+            <a:ext cx="11214100" cy="2205519"/>
           </a:xfrm>
           <a:ln>
             <a:noFill/>
@@ -7684,12 +7676,20 @@
           </a:bodyPr>
           <a:lstStyle/>
           <a:p>
-            <a:pPr marL="0" indent="0" algn="ctr">
+            <a:pPr marL="0" indent="0">
               <a:buNone/>
             </a:pPr>
             <a:r>
               <a:rPr lang="en-US" dirty="0"/>
-              <a:t>Both slot machines will have the same kind of variability, and this variability will stay constant throughout the experiment.</a:t>
+              <a:t>The pay outs will vary in the same way for both slot machines, and the level in which they vary will stay the same throughout the experiment. It is just the </a:t>
+            </a:r>
+            <a:r>
+              <a:rPr lang="en-US" u="sng" dirty="0"/>
+              <a:t>average pay out</a:t>
+            </a:r>
+            <a:r>
+              <a:rPr lang="en-US" dirty="0"/>
+              <a:t> that will change for each slot machine.</a:t>
             </a:r>
           </a:p>
         </p:txBody>
@@ -8387,7 +8387,7 @@
         <p:spPr>
           <a:xfrm>
             <a:off x="457200" y="419383"/>
-            <a:ext cx="11214100" cy="1662164"/>
+            <a:ext cx="11214100" cy="2117890"/>
           </a:xfrm>
           <a:ln>
             <a:noFill/>
@@ -8399,12 +8399,12 @@
           </a:bodyPr>
           <a:lstStyle/>
           <a:p>
-            <a:pPr marL="0" indent="0" algn="ctr">
+            <a:pPr marL="0" indent="0">
               <a:buNone/>
             </a:pPr>
             <a:r>
               <a:rPr lang="en-US" dirty="0"/>
-              <a:t>During each game, one of the slot machines will always have a higher average reward and hence is the better option to choose on average. However, the same slot machine will not always be best for all games.</a:t>
+              <a:t>During each game, one of the slot machines will have a higher average reward and will therefore be the best choice during that game. However, the same slot machine will not always be the best for all games.</a:t>
             </a:r>
           </a:p>
         </p:txBody>
@@ -9583,8 +9583,8 @@
         </p:nvSpPr>
         <p:spPr>
           <a:xfrm>
-            <a:off x="457200" y="473172"/>
-            <a:ext cx="11214100" cy="2104927"/>
+            <a:off x="488950" y="100210"/>
+            <a:ext cx="11214100" cy="2640050"/>
           </a:xfrm>
           <a:ln>
             <a:noFill/>
@@ -9596,12 +9596,12 @@
           </a:bodyPr>
           <a:lstStyle/>
           <a:p>
-            <a:pPr marL="0" indent="0" algn="ctr">
+            <a:pPr marL="0" indent="0">
               <a:buNone/>
             </a:pPr>
             <a:r>
               <a:rPr lang="en-US" dirty="0"/>
-              <a:t>On any trial you can only play one slot machine and the number of trials in each game is determined by the height of the slot machine. For example, when the slot machines are 10 boxes high, there are 10 trials in each game.</a:t>
+              <a:t>For any one choice, you can only play one slot machine. The number of choices in each game is determined by the height of the slot machine. For example, when the slot machines are 10 boxes high, you will have 10 choices in that game. Once you make those 10 choices, that game is over and you will start a new one. </a:t>
             </a:r>
           </a:p>
         </p:txBody>
@@ -10002,12 +10002,12 @@
           </a:bodyPr>
           <a:lstStyle/>
           <a:p>
-            <a:pPr marL="0" indent="0" algn="ctr">
+            <a:pPr marL="0" indent="0">
               <a:buNone/>
             </a:pPr>
             <a:r>
               <a:rPr lang="en-US" dirty="0"/>
-              <a:t>When the stacks are 5 boxes high there are only 5 trials in each game.</a:t>
+              <a:t>When the stacks are 5 boxes high, there are only 5 choices in that game.</a:t>
             </a:r>
           </a:p>
         </p:txBody>
@@ -10453,7 +10453,7 @@
         </p:nvSpPr>
         <p:spPr>
           <a:xfrm>
-            <a:off x="457200" y="473172"/>
+            <a:off x="488950" y="361594"/>
             <a:ext cx="11214100" cy="2104927"/>
           </a:xfrm>
           <a:ln>
@@ -10466,12 +10466,12 @@
           </a:bodyPr>
           <a:lstStyle/>
           <a:p>
-            <a:pPr marL="0" indent="0" algn="ctr">
+            <a:pPr marL="0" indent="0">
               <a:buNone/>
             </a:pPr>
             <a:r>
               <a:rPr lang="en-US" dirty="0"/>
-              <a:t>In addition, the first 4 choices in each game are instructed trials where we will choose an option for you. This will give you some experience with each option before you make your first choice between the two slot machines.</a:t>
+              <a:t>In addition, the first 4 choices in each game are “forced choices” where we will choose an option for you. This will give you some experience with each option before you make your first free choice between the two slot machines.”</a:t>
             </a:r>
           </a:p>
         </p:txBody>
@@ -10967,13 +10967,13 @@
         </p:nvPicPr>
         <p:blipFill rotWithShape="1">
           <a:blip r:embed="rId3"/>
-          <a:srcRect l="28021" t="5209" r="28750" b="41148"/>
+          <a:srcRect l="28021" t="5209" r="28750" b="49951"/>
           <a:stretch/>
         </p:blipFill>
         <p:spPr>
           <a:xfrm>
-            <a:off x="3429000" y="3543300"/>
-            <a:ext cx="5270500" cy="3540027"/>
+            <a:off x="3429000" y="3543301"/>
+            <a:ext cx="5270500" cy="2959099"/>
           </a:xfrm>
           <a:prstGeom prst="rect">
             <a:avLst/>
@@ -10993,7 +10993,7 @@
         <p:spPr>
           <a:xfrm>
             <a:off x="457200" y="473172"/>
-            <a:ext cx="11214100" cy="2104927"/>
+            <a:ext cx="11214100" cy="3070128"/>
           </a:xfrm>
           <a:ln>
             <a:noFill/>
@@ -11005,28 +11005,22 @@
           </a:bodyPr>
           <a:lstStyle/>
           <a:p>
-            <a:pPr marL="0" indent="0" algn="ctr">
+            <a:pPr marL="0" indent="0">
               <a:buNone/>
             </a:pPr>
             <a:r>
               <a:rPr lang="en-US" dirty="0"/>
-              <a:t>These instructed trials will be indicated by a red square inside the box we want you to open. You must press the button to choose this option in order to see the reward and move on to the next trial. </a:t>
-            </a:r>
-          </a:p>
-          <a:p>
-            <a:pPr marL="0" indent="0" algn="ctr">
+              <a:t>“These “forced choices” will be indicated by a red square inside the box we want you to open. You must press the button to choose this option in order to see the reward and move on to the next choice in the game. </a:t>
+            </a:r>
+          </a:p>
+          <a:p>
+            <a:pPr marL="0" indent="0">
               <a:buNone/>
             </a:pPr>
             <a:r>
               <a:rPr lang="en-US" dirty="0"/>
-              <a:t>For example, if you are instructed to choose the left box on the first trial, you will see this:</a:t>
-            </a:r>
-          </a:p>
-          <a:p>
-            <a:pPr marL="0" indent="0" algn="ctr">
-              <a:buNone/>
-            </a:pPr>
-            <a:endParaRPr lang="en-US" dirty="0"/>
+              <a:t>For example, if you are instructed to choose the left box for your first choice, you will see this.</a:t>
+            </a:r>
           </a:p>
         </p:txBody>
       </p:sp>
@@ -12495,13 +12489,13 @@
         </p:nvPicPr>
         <p:blipFill rotWithShape="1">
           <a:blip r:embed="rId3"/>
-          <a:srcRect l="28021" t="5209" r="28750" b="41148"/>
+          <a:srcRect l="28021" t="5209" r="28750" b="49566"/>
           <a:stretch/>
         </p:blipFill>
         <p:spPr>
           <a:xfrm>
-            <a:off x="3429000" y="3543300"/>
-            <a:ext cx="5270500" cy="3540027"/>
+            <a:off x="3429000" y="3543301"/>
+            <a:ext cx="5270500" cy="2984500"/>
           </a:xfrm>
           <a:prstGeom prst="rect">
             <a:avLst/>
@@ -12533,12 +12527,12 @@
           </a:bodyPr>
           <a:lstStyle/>
           <a:p>
-            <a:pPr marL="0" indent="0" algn="ctr">
+            <a:pPr marL="0" indent="0">
               <a:buNone/>
             </a:pPr>
             <a:r>
               <a:rPr lang="en-US" dirty="0"/>
-              <a:t>Once these instructed trials are complete, you will have a free choice between the two stacks that is indicated by two green squares inside the two boxes you are choosing between.</a:t>
+              <a:t>Once these “forced choices” are complete, you will have a free choice between the two stacks that is indicated by two green squares inside the two boxes you are choosing between. </a:t>
             </a:r>
           </a:p>
         </p:txBody>
@@ -13330,6 +13324,12 @@
               <a:rPr lang="en-US" dirty="0"/>
               <a:t>So to be sure that everything makes sense let’s work through a few example games.</a:t>
             </a:r>
+          </a:p>
+          <a:p>
+            <a:pPr marL="0" indent="0" algn="ctr">
+              <a:buNone/>
+            </a:pPr>
+            <a:endParaRPr lang="en-US" dirty="0"/>
           </a:p>
           <a:p>
             <a:pPr marL="0" indent="0" algn="ctr">
@@ -14688,7 +14688,7 @@
             </a:pPr>
             <a:r>
               <a:rPr lang="en-US" dirty="0"/>
-              <a:t>The slot machines will be represented like this:</a:t>
+              <a:t>The slot machines will look like this :</a:t>
             </a:r>
           </a:p>
         </p:txBody>
@@ -16597,7 +16597,7 @@
             </a:pPr>
             <a:r>
               <a:rPr lang="en-US" dirty="0"/>
-              <a:t>During one game, a slot machine will tend to pay out about the same amount on average, but there is variability in the reward on any given choice. </a:t>
+              <a:t>During one game, each slot machine will have a different average “pay out”. For example, one of the machines may pay out an average of 45 points while the other averages 52 points. However, the specific amount awarded on any given choice will vary.” </a:t>
             </a:r>
           </a:p>
         </p:txBody>
@@ -17027,12 +17027,12 @@
           </a:bodyPr>
           <a:lstStyle/>
           <a:p>
-            <a:pPr marL="0" indent="0" algn="ctr">
+            <a:pPr marL="0" indent="0">
               <a:buNone/>
             </a:pPr>
             <a:r>
               <a:rPr lang="en-US" dirty="0"/>
-              <a:t>For example, the average reward for the slot machine on the right might be 50 points, but on the first play you might see a reward of 52 points because of the variability.</a:t>
+              <a:t>For example, the average reward for the slot machine on the right might be 50 points, but on the first choice, you might see a reward of 52 points. This is because the exact reward on any given choice will vary around the average of 50 points.”</a:t>
             </a:r>
           </a:p>
         </p:txBody>

</xml_diff>

<commit_message>
added audio to instruction slides for horizon task
</commit_message>
<xml_diff>
--- a/public/js/tasks/horizon/media/horizonInstructions_RSS.pptx
+++ b/public/js/tasks/horizon/media/horizonInstructions_RSS.pptx
@@ -5,7 +5,7 @@
     <p:sldMasterId id="2147483660" r:id="rId1"/>
   </p:sldMasterIdLst>
   <p:notesMasterIdLst>
-    <p:notesMasterId r:id="rId26"/>
+    <p:notesMasterId r:id="rId25"/>
   </p:notesMasterIdLst>
   <p:sldIdLst>
     <p:sldId id="498" r:id="rId2"/>
@@ -31,7 +31,6 @@
     <p:sldId id="530" r:id="rId22"/>
     <p:sldId id="531" r:id="rId23"/>
     <p:sldId id="532" r:id="rId24"/>
-    <p:sldId id="533" r:id="rId25"/>
   </p:sldIdLst>
   <p:sldSz cx="12192000" cy="6858000"/>
   <p:notesSz cx="6858000" cy="9144000"/>
@@ -162,7 +161,6 @@
         <p14:section name="run2" id="{D32F0954-C8B6-BD40-8229-7B80911332A3}">
           <p14:sldIdLst>
             <p14:sldId id="532"/>
-            <p14:sldId id="533"/>
           </p14:sldIdLst>
         </p14:section>
       </p14:sectionLst>
@@ -267,7 +265,7 @@
           <a:p>
             <a:fld id="{5ACDFB13-8C7E-2148-B293-047F9641DD71}" type="datetimeFigureOut">
               <a:rPr lang="en-US" smtClean="0"/>
-              <a:t>8/17/20</a:t>
+              <a:t>9/4/20</a:t>
             </a:fld>
             <a:endParaRPr lang="en-US" dirty="0"/>
           </a:p>
@@ -1650,14 +1648,6 @@
           <a:bodyPr/>
           <a:lstStyle/>
           <a:p>
-            <a:r>
-              <a:rPr lang="en-US" dirty="0"/>
-              <a:t>Add screenshots of an X and an O</a:t>
-            </a:r>
-            <a:r>
-              <a:rPr lang="en-US" baseline="0" dirty="0"/>
-              <a:t> screen – like a timeline of screenshots.</a:t>
-            </a:r>
             <a:endParaRPr lang="en-US" dirty="0"/>
           </a:p>
         </p:txBody>
@@ -1933,14 +1923,6 @@
           <a:bodyPr/>
           <a:lstStyle/>
           <a:p>
-            <a:r>
-              <a:rPr lang="en-US" dirty="0"/>
-              <a:t>Add screenshots of an X and an O</a:t>
-            </a:r>
-            <a:r>
-              <a:rPr lang="en-US" baseline="0" dirty="0"/>
-              <a:t> screen – like a timeline of screenshots.</a:t>
-            </a:r>
             <a:endParaRPr lang="en-US" dirty="0"/>
           </a:p>
         </p:txBody>
@@ -2078,103 +2060,6 @@
 </p:notes>
 </file>
 
-<file path=ppt/notesSlides/notesSlide24.xml><?xml version="1.0" encoding="utf-8"?>
-<p:notes xmlns:a="http://schemas.openxmlformats.org/drawingml/2006/main" xmlns:r="http://schemas.openxmlformats.org/officeDocument/2006/relationships" xmlns:p="http://schemas.openxmlformats.org/presentationml/2006/main">
-  <p:cSld>
-    <p:spTree>
-      <p:nvGrpSpPr>
-        <p:cNvPr id="1" name=""/>
-        <p:cNvGrpSpPr/>
-        <p:nvPr/>
-      </p:nvGrpSpPr>
-      <p:grpSpPr>
-        <a:xfrm>
-          <a:off x="0" y="0"/>
-          <a:ext cx="0" cy="0"/>
-          <a:chOff x="0" y="0"/>
-          <a:chExt cx="0" cy="0"/>
-        </a:xfrm>
-      </p:grpSpPr>
-      <p:sp>
-        <p:nvSpPr>
-          <p:cNvPr id="2" name="Slide Image Placeholder 1"/>
-          <p:cNvSpPr>
-            <a:spLocks noGrp="1" noRot="1" noChangeAspect="1"/>
-          </p:cNvSpPr>
-          <p:nvPr>
-            <p:ph type="sldImg"/>
-          </p:nvPr>
-        </p:nvSpPr>
-        <p:spPr>
-          <a:xfrm>
-            <a:off x="381000" y="685800"/>
-            <a:ext cx="6096000" cy="3429000"/>
-          </a:xfrm>
-        </p:spPr>
-      </p:sp>
-      <p:sp>
-        <p:nvSpPr>
-          <p:cNvPr id="3" name="Notes Placeholder 2"/>
-          <p:cNvSpPr>
-            <a:spLocks noGrp="1"/>
-          </p:cNvSpPr>
-          <p:nvPr>
-            <p:ph type="body" idx="1"/>
-          </p:nvPr>
-        </p:nvSpPr>
-        <p:spPr/>
-        <p:txBody>
-          <a:bodyPr/>
-          <a:lstStyle/>
-          <a:p>
-            <a:r>
-              <a:rPr lang="en-US" dirty="0"/>
-              <a:t>Add screenshots of an X and an O</a:t>
-            </a:r>
-            <a:r>
-              <a:rPr lang="en-US" baseline="0" dirty="0"/>
-              <a:t> screen – like a timeline of screenshots.</a:t>
-            </a:r>
-            <a:endParaRPr lang="en-US" dirty="0"/>
-          </a:p>
-        </p:txBody>
-      </p:sp>
-      <p:sp>
-        <p:nvSpPr>
-          <p:cNvPr id="4" name="Slide Number Placeholder 3"/>
-          <p:cNvSpPr>
-            <a:spLocks noGrp="1"/>
-          </p:cNvSpPr>
-          <p:nvPr>
-            <p:ph type="sldNum" sz="quarter" idx="10"/>
-          </p:nvPr>
-        </p:nvSpPr>
-        <p:spPr/>
-        <p:txBody>
-          <a:bodyPr/>
-          <a:lstStyle/>
-          <a:p>
-            <a:fld id="{BCAE12D7-AE97-9243-8341-9A20FCA5A307}" type="slidenum">
-              <a:rPr lang="en-US" smtClean="0"/>
-              <a:t>24</a:t>
-            </a:fld>
-            <a:endParaRPr lang="en-US"/>
-          </a:p>
-        </p:txBody>
-      </p:sp>
-    </p:spTree>
-    <p:extLst>
-      <p:ext uri="{BB962C8B-B14F-4D97-AF65-F5344CB8AC3E}">
-        <p14:creationId xmlns:p14="http://schemas.microsoft.com/office/powerpoint/2010/main" val="3322356223"/>
-      </p:ext>
-    </p:extLst>
-  </p:cSld>
-  <p:clrMapOvr>
-    <a:masterClrMapping/>
-  </p:clrMapOvr>
-</p:notes>
-</file>
-
 <file path=ppt/notesSlides/notesSlide3.xml><?xml version="1.0" encoding="utf-8"?>
 <p:notes xmlns:a="http://schemas.openxmlformats.org/drawingml/2006/main" xmlns:r="http://schemas.openxmlformats.org/officeDocument/2006/relationships" xmlns:p="http://schemas.openxmlformats.org/presentationml/2006/main">
   <p:cSld>
@@ -3033,7 +2918,7 @@
           <a:p>
             <a:fld id="{E69A4D3A-6EF8-7448-AC6F-AD52FEDAA6A8}" type="datetimeFigureOut">
               <a:rPr lang="en-US" smtClean="0"/>
-              <a:t>8/17/20</a:t>
+              <a:t>9/4/20</a:t>
             </a:fld>
             <a:endParaRPr lang="en-US" dirty="0"/>
           </a:p>
@@ -3201,7 +3086,7 @@
           <a:p>
             <a:fld id="{E69A4D3A-6EF8-7448-AC6F-AD52FEDAA6A8}" type="datetimeFigureOut">
               <a:rPr lang="en-US" smtClean="0"/>
-              <a:t>8/17/20</a:t>
+              <a:t>9/4/20</a:t>
             </a:fld>
             <a:endParaRPr lang="en-US" dirty="0"/>
           </a:p>
@@ -3379,7 +3264,7 @@
           <a:p>
             <a:fld id="{E69A4D3A-6EF8-7448-AC6F-AD52FEDAA6A8}" type="datetimeFigureOut">
               <a:rPr lang="en-US" smtClean="0"/>
-              <a:t>8/17/20</a:t>
+              <a:t>9/4/20</a:t>
             </a:fld>
             <a:endParaRPr lang="en-US" dirty="0"/>
           </a:p>
@@ -3547,7 +3432,7 @@
           <a:p>
             <a:fld id="{E69A4D3A-6EF8-7448-AC6F-AD52FEDAA6A8}" type="datetimeFigureOut">
               <a:rPr lang="en-US" smtClean="0"/>
-              <a:t>8/17/20</a:t>
+              <a:t>9/4/20</a:t>
             </a:fld>
             <a:endParaRPr lang="en-US" dirty="0"/>
           </a:p>
@@ -3792,7 +3677,7 @@
           <a:p>
             <a:fld id="{E69A4D3A-6EF8-7448-AC6F-AD52FEDAA6A8}" type="datetimeFigureOut">
               <a:rPr lang="en-US" smtClean="0"/>
-              <a:t>8/17/20</a:t>
+              <a:t>9/4/20</a:t>
             </a:fld>
             <a:endParaRPr lang="en-US" dirty="0"/>
           </a:p>
@@ -4077,7 +3962,7 @@
           <a:p>
             <a:fld id="{E69A4D3A-6EF8-7448-AC6F-AD52FEDAA6A8}" type="datetimeFigureOut">
               <a:rPr lang="en-US" smtClean="0"/>
-              <a:t>8/17/20</a:t>
+              <a:t>9/4/20</a:t>
             </a:fld>
             <a:endParaRPr lang="en-US" dirty="0"/>
           </a:p>
@@ -4496,7 +4381,7 @@
           <a:p>
             <a:fld id="{E69A4D3A-6EF8-7448-AC6F-AD52FEDAA6A8}" type="datetimeFigureOut">
               <a:rPr lang="en-US" smtClean="0"/>
-              <a:t>8/17/20</a:t>
+              <a:t>9/4/20</a:t>
             </a:fld>
             <a:endParaRPr lang="en-US" dirty="0"/>
           </a:p>
@@ -4613,7 +4498,7 @@
           <a:p>
             <a:fld id="{E69A4D3A-6EF8-7448-AC6F-AD52FEDAA6A8}" type="datetimeFigureOut">
               <a:rPr lang="en-US" smtClean="0"/>
-              <a:t>8/17/20</a:t>
+              <a:t>9/4/20</a:t>
             </a:fld>
             <a:endParaRPr lang="en-US" dirty="0"/>
           </a:p>
@@ -4708,7 +4593,7 @@
           <a:p>
             <a:fld id="{E69A4D3A-6EF8-7448-AC6F-AD52FEDAA6A8}" type="datetimeFigureOut">
               <a:rPr lang="en-US" smtClean="0"/>
-              <a:t>8/17/20</a:t>
+              <a:t>9/4/20</a:t>
             </a:fld>
             <a:endParaRPr lang="en-US" dirty="0"/>
           </a:p>
@@ -4983,7 +4868,7 @@
           <a:p>
             <a:fld id="{E69A4D3A-6EF8-7448-AC6F-AD52FEDAA6A8}" type="datetimeFigureOut">
               <a:rPr lang="en-US" smtClean="0"/>
-              <a:t>8/17/20</a:t>
+              <a:t>9/4/20</a:t>
             </a:fld>
             <a:endParaRPr lang="en-US" dirty="0"/>
           </a:p>
@@ -5238,7 +5123,7 @@
           <a:p>
             <a:fld id="{E69A4D3A-6EF8-7448-AC6F-AD52FEDAA6A8}" type="datetimeFigureOut">
               <a:rPr lang="en-US" smtClean="0"/>
-              <a:t>8/17/20</a:t>
+              <a:t>9/4/20</a:t>
             </a:fld>
             <a:endParaRPr lang="en-US" dirty="0"/>
           </a:p>
@@ -5452,7 +5337,7 @@
           <a:p>
             <a:fld id="{E69A4D3A-6EF8-7448-AC6F-AD52FEDAA6A8}" type="datetimeFigureOut">
               <a:rPr lang="en-US" smtClean="0"/>
-              <a:t>8/17/20</a:t>
+              <a:t>9/4/20</a:t>
             </a:fld>
             <a:endParaRPr lang="en-US" dirty="0"/>
           </a:p>
@@ -9128,7 +9013,15 @@
             </a:pPr>
             <a:r>
               <a:rPr lang="en-US" dirty="0"/>
-              <a:t>Press the LEFT BUTTON to play the left slot machine.</a:t>
+              <a:t>Press the </a:t>
+            </a:r>
+            <a:r>
+              <a:rPr lang="en-US" b="1" dirty="0"/>
+              <a:t>&lt;</a:t>
+            </a:r>
+            <a:r>
+              <a:rPr lang="en-US" dirty="0"/>
+              <a:t> BUTTON to play the left slot machine.</a:t>
             </a:r>
           </a:p>
           <a:p>
@@ -9137,7 +9030,15 @@
             </a:pPr>
             <a:r>
               <a:rPr lang="en-US" dirty="0"/>
-              <a:t>Press the RIGHT BUTTON to play the right slot machine.</a:t>
+              <a:t>Press the </a:t>
+            </a:r>
+            <a:r>
+              <a:rPr lang="en-US" b="1" dirty="0"/>
+              <a:t>&gt;</a:t>
+            </a:r>
+            <a:r>
+              <a:rPr lang="en-US" dirty="0"/>
+              <a:t> BUTTON to play the right slot machine.</a:t>
             </a:r>
           </a:p>
         </p:txBody>
@@ -13343,7 +13244,15 @@
             </a:pPr>
             <a:r>
               <a:rPr lang="en-US" dirty="0"/>
-              <a:t>Press the LEFT BUTTON to play the left slot machine.</a:t>
+              <a:t>Press the </a:t>
+            </a:r>
+            <a:r>
+              <a:rPr lang="en-US" b="1" dirty="0"/>
+              <a:t>&lt;</a:t>
+            </a:r>
+            <a:r>
+              <a:rPr lang="en-US" dirty="0"/>
+              <a:t> BUTTON to play the left slot machine.</a:t>
             </a:r>
           </a:p>
           <a:p>
@@ -13352,7 +13261,15 @@
             </a:pPr>
             <a:r>
               <a:rPr lang="en-US" dirty="0"/>
-              <a:t>Press the RIGHT BUTTON to play the right machine.</a:t>
+              <a:t>Press the </a:t>
+            </a:r>
+            <a:r>
+              <a:rPr lang="en-US" b="1" dirty="0"/>
+              <a:t>&gt;</a:t>
+            </a:r>
+            <a:r>
+              <a:rPr lang="en-US" dirty="0"/>
+              <a:t> BUTTON to play the right slot machine.</a:t>
             </a:r>
           </a:p>
         </p:txBody>
@@ -14211,390 +14128,6 @@
     <p:extLst>
       <p:ext uri="{BB962C8B-B14F-4D97-AF65-F5344CB8AC3E}">
         <p14:creationId xmlns:p14="http://schemas.microsoft.com/office/powerpoint/2010/main" val="1204496967"/>
-      </p:ext>
-    </p:extLst>
-  </p:cSld>
-  <p:clrMapOvr>
-    <a:masterClrMapping/>
-  </p:clrMapOvr>
-</p:sld>
-</file>
-
-<file path=ppt/slides/slide24.xml><?xml version="1.0" encoding="utf-8"?>
-<p:sld xmlns:a="http://schemas.openxmlformats.org/drawingml/2006/main" xmlns:r="http://schemas.openxmlformats.org/officeDocument/2006/relationships" xmlns:p="http://schemas.openxmlformats.org/presentationml/2006/main">
-  <p:cSld>
-    <p:bg>
-      <p:bgPr>
-        <a:solidFill>
-          <a:schemeClr val="bg1"/>
-        </a:solidFill>
-        <a:effectLst/>
-      </p:bgPr>
-    </p:bg>
-    <p:spTree>
-      <p:nvGrpSpPr>
-        <p:cNvPr id="1" name=""/>
-        <p:cNvGrpSpPr/>
-        <p:nvPr/>
-      </p:nvGrpSpPr>
-      <p:grpSpPr>
-        <a:xfrm>
-          <a:off x="0" y="0"/>
-          <a:ext cx="0" cy="0"/>
-          <a:chOff x="0" y="0"/>
-          <a:chExt cx="0" cy="0"/>
-        </a:xfrm>
-      </p:grpSpPr>
-      <p:sp>
-        <p:nvSpPr>
-          <p:cNvPr id="3" name="Content Placeholder 2"/>
-          <p:cNvSpPr>
-            <a:spLocks noGrp="1"/>
-          </p:cNvSpPr>
-          <p:nvPr>
-            <p:ph idx="1"/>
-          </p:nvPr>
-        </p:nvSpPr>
-        <p:spPr>
-          <a:xfrm>
-            <a:off x="840890" y="871371"/>
-            <a:ext cx="10510220" cy="4406499"/>
-          </a:xfrm>
-        </p:spPr>
-        <p:txBody>
-          <a:bodyPr>
-            <a:noAutofit/>
-          </a:bodyPr>
-          <a:lstStyle/>
-          <a:p>
-            <a:pPr marL="0" indent="0" algn="ctr">
-              <a:buNone/>
-            </a:pPr>
-            <a:r>
-              <a:rPr lang="en-US" dirty="0"/>
-              <a:t>This is run 2.</a:t>
-            </a:r>
-          </a:p>
-          <a:p>
-            <a:pPr marL="0" indent="0" algn="ctr">
-              <a:buNone/>
-            </a:pPr>
-            <a:endParaRPr lang="en-US" dirty="0"/>
-          </a:p>
-          <a:p>
-            <a:pPr marL="0" indent="0" algn="ctr">
-              <a:buNone/>
-            </a:pPr>
-            <a:r>
-              <a:rPr lang="en-US" dirty="0"/>
-              <a:t>Same instructions as Run 1</a:t>
-            </a:r>
-          </a:p>
-          <a:p>
-            <a:pPr marL="0" indent="0" algn="ctr">
-              <a:buNone/>
-            </a:pPr>
-            <a:endParaRPr lang="en-US" dirty="0"/>
-          </a:p>
-          <a:p>
-            <a:pPr marL="0" indent="0" algn="ctr">
-              <a:buNone/>
-            </a:pPr>
-            <a:endParaRPr lang="en-US" dirty="0"/>
-          </a:p>
-          <a:p>
-            <a:pPr marL="0" indent="0" algn="ctr">
-              <a:buNone/>
-            </a:pPr>
-            <a:endParaRPr lang="en-US" dirty="0"/>
-          </a:p>
-        </p:txBody>
-      </p:sp>
-      <p:sp>
-        <p:nvSpPr>
-          <p:cNvPr id="26" name="Title 3"/>
-          <p:cNvSpPr txBox="1">
-            <a:spLocks/>
-          </p:cNvSpPr>
-          <p:nvPr/>
-        </p:nvSpPr>
-        <p:spPr>
-          <a:xfrm>
-            <a:off x="1524000" y="6201295"/>
-            <a:ext cx="9149174" cy="656705"/>
-          </a:xfrm>
-          <a:prstGeom prst="rect">
-            <a:avLst/>
-          </a:prstGeom>
-        </p:spPr>
-        <p:txBody>
-          <a:bodyPr vert="horz" lIns="91440" tIns="45720" rIns="91440" bIns="45720" rtlCol="0" anchor="ctr">
-            <a:normAutofit/>
-          </a:bodyPr>
-          <a:lstStyle>
-            <a:lvl1pPr algn="ctr" defTabSz="914400" rtl="0" eaLnBrk="1" latinLnBrk="0" hangingPunct="1">
-              <a:spcBef>
-                <a:spcPct val="0"/>
-              </a:spcBef>
-              <a:buNone/>
-              <a:defRPr sz="4400" kern="1200">
-                <a:solidFill>
-                  <a:schemeClr val="tx1"/>
-                </a:solidFill>
-                <a:latin typeface="+mj-lt"/>
-                <a:ea typeface="+mj-ea"/>
-                <a:cs typeface="+mj-cs"/>
-              </a:defRPr>
-            </a:lvl1pPr>
-          </a:lstStyle>
-          <a:p>
-            <a:r>
-              <a:rPr lang="en-US" sz="3000" dirty="0">
-                <a:solidFill>
-                  <a:srgbClr val="FF0000"/>
-                </a:solidFill>
-              </a:rPr>
-              <a:t>PRESS THE RIGHT BUTTON TO CONTINUE</a:t>
-            </a:r>
-          </a:p>
-        </p:txBody>
-      </p:sp>
-      <p:sp>
-        <p:nvSpPr>
-          <p:cNvPr id="12" name="Subtitle 8"/>
-          <p:cNvSpPr txBox="1">
-            <a:spLocks/>
-          </p:cNvSpPr>
-          <p:nvPr/>
-        </p:nvSpPr>
-        <p:spPr>
-          <a:xfrm>
-            <a:off x="9140345" y="6073844"/>
-            <a:ext cx="1532830" cy="801636"/>
-          </a:xfrm>
-          <a:prstGeom prst="rect">
-            <a:avLst/>
-          </a:prstGeom>
-        </p:spPr>
-        <p:txBody>
-          <a:bodyPr vert="horz" lIns="91440" tIns="45720" rIns="91440" bIns="45720" rtlCol="0">
-            <a:normAutofit/>
-          </a:bodyPr>
-          <a:lstStyle>
-            <a:lvl1pPr marL="0" indent="0" algn="ctr" defTabSz="914400" rtl="0" eaLnBrk="1" latinLnBrk="0" hangingPunct="1">
-              <a:spcBef>
-                <a:spcPct val="20000"/>
-              </a:spcBef>
-              <a:buFont typeface="Arial" pitchFamily="34" charset="0"/>
-              <a:buNone/>
-              <a:defRPr sz="3200" kern="1200">
-                <a:solidFill>
-                  <a:schemeClr val="tx1">
-                    <a:tint val="75000"/>
-                  </a:schemeClr>
-                </a:solidFill>
-                <a:latin typeface="+mn-lt"/>
-                <a:ea typeface="+mn-ea"/>
-                <a:cs typeface="+mn-cs"/>
-              </a:defRPr>
-            </a:lvl1pPr>
-            <a:lvl2pPr marL="457200" indent="0" algn="ctr" defTabSz="914400" rtl="0" eaLnBrk="1" latinLnBrk="0" hangingPunct="1">
-              <a:spcBef>
-                <a:spcPct val="20000"/>
-              </a:spcBef>
-              <a:buFont typeface="Arial" pitchFamily="34" charset="0"/>
-              <a:buNone/>
-              <a:defRPr sz="2800" kern="1200">
-                <a:solidFill>
-                  <a:schemeClr val="tx1">
-                    <a:tint val="75000"/>
-                  </a:schemeClr>
-                </a:solidFill>
-                <a:latin typeface="+mn-lt"/>
-                <a:ea typeface="+mn-ea"/>
-                <a:cs typeface="+mn-cs"/>
-              </a:defRPr>
-            </a:lvl2pPr>
-            <a:lvl3pPr marL="914400" indent="0" algn="ctr" defTabSz="914400" rtl="0" eaLnBrk="1" latinLnBrk="0" hangingPunct="1">
-              <a:spcBef>
-                <a:spcPct val="20000"/>
-              </a:spcBef>
-              <a:buFont typeface="Arial" pitchFamily="34" charset="0"/>
-              <a:buNone/>
-              <a:defRPr sz="2400" kern="1200">
-                <a:solidFill>
-                  <a:schemeClr val="tx1">
-                    <a:tint val="75000"/>
-                  </a:schemeClr>
-                </a:solidFill>
-                <a:latin typeface="+mn-lt"/>
-                <a:ea typeface="+mn-ea"/>
-                <a:cs typeface="+mn-cs"/>
-              </a:defRPr>
-            </a:lvl3pPr>
-            <a:lvl4pPr marL="1371600" indent="0" algn="ctr" defTabSz="914400" rtl="0" eaLnBrk="1" latinLnBrk="0" hangingPunct="1">
-              <a:spcBef>
-                <a:spcPct val="20000"/>
-              </a:spcBef>
-              <a:buFont typeface="Arial" pitchFamily="34" charset="0"/>
-              <a:buNone/>
-              <a:defRPr sz="2000" kern="1200">
-                <a:solidFill>
-                  <a:schemeClr val="tx1">
-                    <a:tint val="75000"/>
-                  </a:schemeClr>
-                </a:solidFill>
-                <a:latin typeface="+mn-lt"/>
-                <a:ea typeface="+mn-ea"/>
-                <a:cs typeface="+mn-cs"/>
-              </a:defRPr>
-            </a:lvl4pPr>
-            <a:lvl5pPr marL="1828800" indent="0" algn="ctr" defTabSz="914400" rtl="0" eaLnBrk="1" latinLnBrk="0" hangingPunct="1">
-              <a:spcBef>
-                <a:spcPct val="20000"/>
-              </a:spcBef>
-              <a:buFont typeface="Arial" pitchFamily="34" charset="0"/>
-              <a:buNone/>
-              <a:defRPr sz="2000" kern="1200">
-                <a:solidFill>
-                  <a:schemeClr val="tx1">
-                    <a:tint val="75000"/>
-                  </a:schemeClr>
-                </a:solidFill>
-                <a:latin typeface="+mn-lt"/>
-                <a:ea typeface="+mn-ea"/>
-                <a:cs typeface="+mn-cs"/>
-              </a:defRPr>
-            </a:lvl5pPr>
-            <a:lvl6pPr marL="2286000" indent="0" algn="ctr" defTabSz="914400" rtl="0" eaLnBrk="1" latinLnBrk="0" hangingPunct="1">
-              <a:spcBef>
-                <a:spcPct val="20000"/>
-              </a:spcBef>
-              <a:buFont typeface="Arial" pitchFamily="34" charset="0"/>
-              <a:buNone/>
-              <a:defRPr sz="2000" kern="1200">
-                <a:solidFill>
-                  <a:schemeClr val="tx1">
-                    <a:tint val="75000"/>
-                  </a:schemeClr>
-                </a:solidFill>
-                <a:latin typeface="+mn-lt"/>
-                <a:ea typeface="+mn-ea"/>
-                <a:cs typeface="+mn-cs"/>
-              </a:defRPr>
-            </a:lvl6pPr>
-            <a:lvl7pPr marL="2743200" indent="0" algn="ctr" defTabSz="914400" rtl="0" eaLnBrk="1" latinLnBrk="0" hangingPunct="1">
-              <a:spcBef>
-                <a:spcPct val="20000"/>
-              </a:spcBef>
-              <a:buFont typeface="Arial" pitchFamily="34" charset="0"/>
-              <a:buNone/>
-              <a:defRPr sz="2000" kern="1200">
-                <a:solidFill>
-                  <a:schemeClr val="tx1">
-                    <a:tint val="75000"/>
-                  </a:schemeClr>
-                </a:solidFill>
-                <a:latin typeface="+mn-lt"/>
-                <a:ea typeface="+mn-ea"/>
-                <a:cs typeface="+mn-cs"/>
-              </a:defRPr>
-            </a:lvl7pPr>
-            <a:lvl8pPr marL="3200400" indent="0" algn="ctr" defTabSz="914400" rtl="0" eaLnBrk="1" latinLnBrk="0" hangingPunct="1">
-              <a:spcBef>
-                <a:spcPct val="20000"/>
-              </a:spcBef>
-              <a:buFont typeface="Arial" pitchFamily="34" charset="0"/>
-              <a:buNone/>
-              <a:defRPr sz="2000" kern="1200">
-                <a:solidFill>
-                  <a:schemeClr val="tx1">
-                    <a:tint val="75000"/>
-                  </a:schemeClr>
-                </a:solidFill>
-                <a:latin typeface="+mn-lt"/>
-                <a:ea typeface="+mn-ea"/>
-                <a:cs typeface="+mn-cs"/>
-              </a:defRPr>
-            </a:lvl8pPr>
-            <a:lvl9pPr marL="3657600" indent="0" algn="ctr" defTabSz="914400" rtl="0" eaLnBrk="1" latinLnBrk="0" hangingPunct="1">
-              <a:spcBef>
-                <a:spcPct val="20000"/>
-              </a:spcBef>
-              <a:buFont typeface="Arial" pitchFamily="34" charset="0"/>
-              <a:buNone/>
-              <a:defRPr sz="2000" kern="1200">
-                <a:solidFill>
-                  <a:schemeClr val="tx1">
-                    <a:tint val="75000"/>
-                  </a:schemeClr>
-                </a:solidFill>
-                <a:latin typeface="+mn-lt"/>
-                <a:ea typeface="+mn-ea"/>
-                <a:cs typeface="+mn-cs"/>
-              </a:defRPr>
-            </a:lvl9pPr>
-          </a:lstStyle>
-          <a:p>
-            <a:r>
-              <a:rPr lang="en-US" sz="1600" dirty="0">
-                <a:solidFill>
-                  <a:schemeClr val="tx1"/>
-                </a:solidFill>
-              </a:rPr>
-              <a:t>RIGHT</a:t>
-            </a:r>
-          </a:p>
-        </p:txBody>
-      </p:sp>
-      <p:sp>
-        <p:nvSpPr>
-          <p:cNvPr id="13" name="Right Arrow 12"/>
-          <p:cNvSpPr/>
-          <p:nvPr/>
-        </p:nvSpPr>
-        <p:spPr>
-          <a:xfrm>
-            <a:off x="9637318" y="6391827"/>
-            <a:ext cx="640200" cy="289763"/>
-          </a:xfrm>
-          <a:prstGeom prst="rightArrow">
-            <a:avLst/>
-          </a:prstGeom>
-          <a:solidFill>
-            <a:schemeClr val="tx1"/>
-          </a:solidFill>
-          <a:ln>
-            <a:noFill/>
-          </a:ln>
-        </p:spPr>
-        <p:style>
-          <a:lnRef idx="1">
-            <a:schemeClr val="accent1"/>
-          </a:lnRef>
-          <a:fillRef idx="3">
-            <a:schemeClr val="accent1"/>
-          </a:fillRef>
-          <a:effectRef idx="2">
-            <a:schemeClr val="accent1"/>
-          </a:effectRef>
-          <a:fontRef idx="minor">
-            <a:schemeClr val="lt1"/>
-          </a:fontRef>
-        </p:style>
-        <p:txBody>
-          <a:bodyPr rtlCol="0" anchor="ctr"/>
-          <a:lstStyle/>
-          <a:p>
-            <a:pPr algn="ctr"/>
-            <a:endParaRPr lang="en-US"/>
-          </a:p>
-        </p:txBody>
-      </p:sp>
-    </p:spTree>
-    <p:extLst>
-      <p:ext uri="{BB962C8B-B14F-4D97-AF65-F5344CB8AC3E}">
-        <p14:creationId xmlns:p14="http://schemas.microsoft.com/office/powerpoint/2010/main" val="984613945"/>
       </p:ext>
     </p:extLst>
   </p:cSld>

</xml_diff>

<commit_message>
normalized audio and changed the resonpse keys to < and > keys
</commit_message>
<xml_diff>
--- a/public/js/tasks/horizon/media/horizonInstructions_RSS.pptx
+++ b/public/js/tasks/horizon/media/horizonInstructions_RSS.pptx
@@ -265,7 +265,7 @@
           <a:p>
             <a:fld id="{5ACDFB13-8C7E-2148-B293-047F9641DD71}" type="datetimeFigureOut">
               <a:rPr lang="en-US" smtClean="0"/>
-              <a:t>9/4/20</a:t>
+              <a:t>9/8/20</a:t>
             </a:fld>
             <a:endParaRPr lang="en-US" dirty="0"/>
           </a:p>
@@ -2918,7 +2918,7 @@
           <a:p>
             <a:fld id="{E69A4D3A-6EF8-7448-AC6F-AD52FEDAA6A8}" type="datetimeFigureOut">
               <a:rPr lang="en-US" smtClean="0"/>
-              <a:t>9/4/20</a:t>
+              <a:t>9/8/20</a:t>
             </a:fld>
             <a:endParaRPr lang="en-US" dirty="0"/>
           </a:p>
@@ -3086,7 +3086,7 @@
           <a:p>
             <a:fld id="{E69A4D3A-6EF8-7448-AC6F-AD52FEDAA6A8}" type="datetimeFigureOut">
               <a:rPr lang="en-US" smtClean="0"/>
-              <a:t>9/4/20</a:t>
+              <a:t>9/8/20</a:t>
             </a:fld>
             <a:endParaRPr lang="en-US" dirty="0"/>
           </a:p>
@@ -3264,7 +3264,7 @@
           <a:p>
             <a:fld id="{E69A4D3A-6EF8-7448-AC6F-AD52FEDAA6A8}" type="datetimeFigureOut">
               <a:rPr lang="en-US" smtClean="0"/>
-              <a:t>9/4/20</a:t>
+              <a:t>9/8/20</a:t>
             </a:fld>
             <a:endParaRPr lang="en-US" dirty="0"/>
           </a:p>
@@ -3432,7 +3432,7 @@
           <a:p>
             <a:fld id="{E69A4D3A-6EF8-7448-AC6F-AD52FEDAA6A8}" type="datetimeFigureOut">
               <a:rPr lang="en-US" smtClean="0"/>
-              <a:t>9/4/20</a:t>
+              <a:t>9/8/20</a:t>
             </a:fld>
             <a:endParaRPr lang="en-US" dirty="0"/>
           </a:p>
@@ -3677,7 +3677,7 @@
           <a:p>
             <a:fld id="{E69A4D3A-6EF8-7448-AC6F-AD52FEDAA6A8}" type="datetimeFigureOut">
               <a:rPr lang="en-US" smtClean="0"/>
-              <a:t>9/4/20</a:t>
+              <a:t>9/8/20</a:t>
             </a:fld>
             <a:endParaRPr lang="en-US" dirty="0"/>
           </a:p>
@@ -3962,7 +3962,7 @@
           <a:p>
             <a:fld id="{E69A4D3A-6EF8-7448-AC6F-AD52FEDAA6A8}" type="datetimeFigureOut">
               <a:rPr lang="en-US" smtClean="0"/>
-              <a:t>9/4/20</a:t>
+              <a:t>9/8/20</a:t>
             </a:fld>
             <a:endParaRPr lang="en-US" dirty="0"/>
           </a:p>
@@ -4381,7 +4381,7 @@
           <a:p>
             <a:fld id="{E69A4D3A-6EF8-7448-AC6F-AD52FEDAA6A8}" type="datetimeFigureOut">
               <a:rPr lang="en-US" smtClean="0"/>
-              <a:t>9/4/20</a:t>
+              <a:t>9/8/20</a:t>
             </a:fld>
             <a:endParaRPr lang="en-US" dirty="0"/>
           </a:p>
@@ -4498,7 +4498,7 @@
           <a:p>
             <a:fld id="{E69A4D3A-6EF8-7448-AC6F-AD52FEDAA6A8}" type="datetimeFigureOut">
               <a:rPr lang="en-US" smtClean="0"/>
-              <a:t>9/4/20</a:t>
+              <a:t>9/8/20</a:t>
             </a:fld>
             <a:endParaRPr lang="en-US" dirty="0"/>
           </a:p>
@@ -4593,7 +4593,7 @@
           <a:p>
             <a:fld id="{E69A4D3A-6EF8-7448-AC6F-AD52FEDAA6A8}" type="datetimeFigureOut">
               <a:rPr lang="en-US" smtClean="0"/>
-              <a:t>9/4/20</a:t>
+              <a:t>9/8/20</a:t>
             </a:fld>
             <a:endParaRPr lang="en-US" dirty="0"/>
           </a:p>
@@ -4868,7 +4868,7 @@
           <a:p>
             <a:fld id="{E69A4D3A-6EF8-7448-AC6F-AD52FEDAA6A8}" type="datetimeFigureOut">
               <a:rPr lang="en-US" smtClean="0"/>
-              <a:t>9/4/20</a:t>
+              <a:t>9/8/20</a:t>
             </a:fld>
             <a:endParaRPr lang="en-US" dirty="0"/>
           </a:p>
@@ -5123,7 +5123,7 @@
           <a:p>
             <a:fld id="{E69A4D3A-6EF8-7448-AC6F-AD52FEDAA6A8}" type="datetimeFigureOut">
               <a:rPr lang="en-US" smtClean="0"/>
-              <a:t>9/4/20</a:t>
+              <a:t>9/8/20</a:t>
             </a:fld>
             <a:endParaRPr lang="en-US" dirty="0"/>
           </a:p>
@@ -5337,7 +5337,7 @@
           <a:p>
             <a:fld id="{E69A4D3A-6EF8-7448-AC6F-AD52FEDAA6A8}" type="datetimeFigureOut">
               <a:rPr lang="en-US" smtClean="0"/>
-              <a:t>9/4/20</a:t>
+              <a:t>9/8/20</a:t>
             </a:fld>
             <a:endParaRPr lang="en-US" dirty="0"/>
           </a:p>
@@ -5732,7 +5732,7 @@
         </p:nvSpPr>
         <p:spPr>
           <a:xfrm>
-            <a:off x="1888343" y="2130426"/>
+            <a:off x="1866900" y="2798641"/>
             <a:ext cx="8458200" cy="1470025"/>
           </a:xfrm>
         </p:spPr>
@@ -5743,7 +5743,7 @@
           <a:lstStyle/>
           <a:p>
             <a:r>
-              <a:rPr lang="en-US" dirty="0"/>
+              <a:rPr lang="en-US" sz="5400" dirty="0"/>
               <a:t>Horizon Task</a:t>
             </a:r>
           </a:p>
@@ -6060,6 +6060,42 @@
           </a:prstGeom>
         </p:spPr>
       </p:pic>
+      <p:sp>
+        <p:nvSpPr>
+          <p:cNvPr id="2" name="TextBox 1">
+            <a:extLst>
+              <a:ext uri="{FF2B5EF4-FFF2-40B4-BE49-F238E27FC236}">
+                <a16:creationId xmlns:a16="http://schemas.microsoft.com/office/drawing/2014/main" id="{C225CAA8-1234-FC4A-90C1-FB81655EFF7B}"/>
+              </a:ext>
+            </a:extLst>
+          </p:cNvPr>
+          <p:cNvSpPr txBox="1"/>
+          <p:nvPr/>
+        </p:nvSpPr>
+        <p:spPr>
+          <a:xfrm>
+            <a:off x="1866900" y="1539939"/>
+            <a:ext cx="8268628" cy="584775"/>
+          </a:xfrm>
+          <a:prstGeom prst="rect">
+            <a:avLst/>
+          </a:prstGeom>
+          <a:noFill/>
+        </p:spPr>
+        <p:txBody>
+          <a:bodyPr wrap="square" rtlCol="0">
+            <a:spAutoFit/>
+          </a:bodyPr>
+          <a:lstStyle/>
+          <a:p>
+            <a:pPr algn="ctr"/>
+            <a:r>
+              <a:rPr lang="en-US" sz="3200" i="1" dirty="0"/>
+              <a:t>Turn up the volume to hear instructions.</a:t>
+            </a:r>
+          </a:p>
+        </p:txBody>
+      </p:sp>
     </p:spTree>
     <p:extLst>
       <p:ext uri="{BB962C8B-B14F-4D97-AF65-F5344CB8AC3E}">
@@ -6165,7 +6201,7 @@
             </a:r>
             <a:r>
               <a:rPr lang="en-US" dirty="0"/>
-              <a:t> box on the right you might get 45 points this time.</a:t>
+              <a:t> play on the right you might get 45 points this time.</a:t>
             </a:r>
           </a:p>
         </p:txBody>

</xml_diff>

<commit_message>
added study specific runs for horizon task
</commit_message>
<xml_diff>
--- a/public/js/tasks/horizon/media/horizonInstructions_RSS.pptx
+++ b/public/js/tasks/horizon/media/horizonInstructions_RSS.pptx
@@ -5,7 +5,7 @@
     <p:sldMasterId id="2147483660" r:id="rId1"/>
   </p:sldMasterIdLst>
   <p:notesMasterIdLst>
-    <p:notesMasterId r:id="rId25"/>
+    <p:notesMasterId r:id="rId26"/>
   </p:notesMasterIdLst>
   <p:sldIdLst>
     <p:sldId id="498" r:id="rId2"/>
@@ -31,6 +31,7 @@
     <p:sldId id="530" r:id="rId22"/>
     <p:sldId id="531" r:id="rId23"/>
     <p:sldId id="532" r:id="rId24"/>
+    <p:sldId id="533" r:id="rId25"/>
   </p:sldIdLst>
   <p:sldSz cx="12192000" cy="6858000"/>
   <p:notesSz cx="6858000" cy="9144000"/>
@@ -161,6 +162,7 @@
         <p14:section name="run2" id="{D32F0954-C8B6-BD40-8229-7B80911332A3}">
           <p14:sldIdLst>
             <p14:sldId id="532"/>
+            <p14:sldId id="533"/>
           </p14:sldIdLst>
         </p14:section>
       </p14:sectionLst>
@@ -2051,6 +2053,95 @@
     <p:extLst>
       <p:ext uri="{BB962C8B-B14F-4D97-AF65-F5344CB8AC3E}">
         <p14:creationId xmlns:p14="http://schemas.microsoft.com/office/powerpoint/2010/main" val="2080840416"/>
+      </p:ext>
+    </p:extLst>
+  </p:cSld>
+  <p:clrMapOvr>
+    <a:masterClrMapping/>
+  </p:clrMapOvr>
+</p:notes>
+</file>
+
+<file path=ppt/notesSlides/notesSlide24.xml><?xml version="1.0" encoding="utf-8"?>
+<p:notes xmlns:a="http://schemas.openxmlformats.org/drawingml/2006/main" xmlns:r="http://schemas.openxmlformats.org/officeDocument/2006/relationships" xmlns:p="http://schemas.openxmlformats.org/presentationml/2006/main">
+  <p:cSld>
+    <p:spTree>
+      <p:nvGrpSpPr>
+        <p:cNvPr id="1" name=""/>
+        <p:cNvGrpSpPr/>
+        <p:nvPr/>
+      </p:nvGrpSpPr>
+      <p:grpSpPr>
+        <a:xfrm>
+          <a:off x="0" y="0"/>
+          <a:ext cx="0" cy="0"/>
+          <a:chOff x="0" y="0"/>
+          <a:chExt cx="0" cy="0"/>
+        </a:xfrm>
+      </p:grpSpPr>
+      <p:sp>
+        <p:nvSpPr>
+          <p:cNvPr id="2" name="Slide Image Placeholder 1"/>
+          <p:cNvSpPr>
+            <a:spLocks noGrp="1" noRot="1" noChangeAspect="1"/>
+          </p:cNvSpPr>
+          <p:nvPr>
+            <p:ph type="sldImg"/>
+          </p:nvPr>
+        </p:nvSpPr>
+        <p:spPr>
+          <a:xfrm>
+            <a:off x="381000" y="685800"/>
+            <a:ext cx="6096000" cy="3429000"/>
+          </a:xfrm>
+        </p:spPr>
+      </p:sp>
+      <p:sp>
+        <p:nvSpPr>
+          <p:cNvPr id="3" name="Notes Placeholder 2"/>
+          <p:cNvSpPr>
+            <a:spLocks noGrp="1"/>
+          </p:cNvSpPr>
+          <p:nvPr>
+            <p:ph type="body" idx="1"/>
+          </p:nvPr>
+        </p:nvSpPr>
+        <p:spPr/>
+        <p:txBody>
+          <a:bodyPr/>
+          <a:lstStyle/>
+          <a:p>
+            <a:endParaRPr lang="en-US" dirty="0"/>
+          </a:p>
+        </p:txBody>
+      </p:sp>
+      <p:sp>
+        <p:nvSpPr>
+          <p:cNvPr id="4" name="Slide Number Placeholder 3"/>
+          <p:cNvSpPr>
+            <a:spLocks noGrp="1"/>
+          </p:cNvSpPr>
+          <p:nvPr>
+            <p:ph type="sldNum" sz="quarter" idx="10"/>
+          </p:nvPr>
+        </p:nvSpPr>
+        <p:spPr/>
+        <p:txBody>
+          <a:bodyPr/>
+          <a:lstStyle/>
+          <a:p>
+            <a:fld id="{BCAE12D7-AE97-9243-8341-9A20FCA5A307}" type="slidenum">
+              <a:rPr lang="en-US" smtClean="0"/>
+              <a:t>24</a:t>
+            </a:fld>
+            <a:endParaRPr lang="en-US"/>
+          </a:p>
+        </p:txBody>
+      </p:sp>
+    </p:spTree>
+    <p:extLst>
+      <p:ext uri="{BB962C8B-B14F-4D97-AF65-F5344CB8AC3E}">
+        <p14:creationId xmlns:p14="http://schemas.microsoft.com/office/powerpoint/2010/main" val="2891260041"/>
       </p:ext>
     </p:extLst>
   </p:cSld>
@@ -6096,6 +6187,42 @@
           </a:p>
         </p:txBody>
       </p:sp>
+      <p:sp>
+        <p:nvSpPr>
+          <p:cNvPr id="10" name="TextBox 9">
+            <a:extLst>
+              <a:ext uri="{FF2B5EF4-FFF2-40B4-BE49-F238E27FC236}">
+                <a16:creationId xmlns:a16="http://schemas.microsoft.com/office/drawing/2014/main" id="{E73A45A9-74D9-7C48-985C-3CF674C494BA}"/>
+              </a:ext>
+            </a:extLst>
+          </p:cNvPr>
+          <p:cNvSpPr txBox="1"/>
+          <p:nvPr/>
+        </p:nvSpPr>
+        <p:spPr>
+          <a:xfrm>
+            <a:off x="5064211" y="5704512"/>
+            <a:ext cx="2063578" cy="369332"/>
+          </a:xfrm>
+          <a:prstGeom prst="rect">
+            <a:avLst/>
+          </a:prstGeom>
+          <a:noFill/>
+        </p:spPr>
+        <p:txBody>
+          <a:bodyPr wrap="square" rtlCol="0">
+            <a:spAutoFit/>
+          </a:bodyPr>
+          <a:lstStyle/>
+          <a:p>
+            <a:pPr algn="ctr"/>
+            <a:r>
+              <a:rPr lang="en-US" dirty="0"/>
+              <a:t>RUN 1</a:t>
+            </a:r>
+          </a:p>
+        </p:txBody>
+      </p:sp>
     </p:spTree>
     <p:extLst>
       <p:ext uri="{BB962C8B-B14F-4D97-AF65-F5344CB8AC3E}">
@@ -14164,6 +14291,475 @@
     <p:extLst>
       <p:ext uri="{BB962C8B-B14F-4D97-AF65-F5344CB8AC3E}">
         <p14:creationId xmlns:p14="http://schemas.microsoft.com/office/powerpoint/2010/main" val="1204496967"/>
+      </p:ext>
+    </p:extLst>
+  </p:cSld>
+  <p:clrMapOvr>
+    <a:masterClrMapping/>
+  </p:clrMapOvr>
+</p:sld>
+</file>
+
+<file path=ppt/slides/slide24.xml><?xml version="1.0" encoding="utf-8"?>
+<p:sld xmlns:a="http://schemas.openxmlformats.org/drawingml/2006/main" xmlns:r="http://schemas.openxmlformats.org/officeDocument/2006/relationships" xmlns:p="http://schemas.openxmlformats.org/presentationml/2006/main">
+  <p:cSld>
+    <p:bg>
+      <p:bgPr>
+        <a:solidFill>
+          <a:schemeClr val="bg1"/>
+        </a:solidFill>
+        <a:effectLst/>
+      </p:bgPr>
+    </p:bg>
+    <p:spTree>
+      <p:nvGrpSpPr>
+        <p:cNvPr id="1" name=""/>
+        <p:cNvGrpSpPr/>
+        <p:nvPr/>
+      </p:nvGrpSpPr>
+      <p:grpSpPr>
+        <a:xfrm>
+          <a:off x="0" y="0"/>
+          <a:ext cx="0" cy="0"/>
+          <a:chOff x="0" y="0"/>
+          <a:chExt cx="0" cy="0"/>
+        </a:xfrm>
+      </p:grpSpPr>
+      <p:sp>
+        <p:nvSpPr>
+          <p:cNvPr id="3" name="Content Placeholder 2"/>
+          <p:cNvSpPr>
+            <a:spLocks noGrp="1"/>
+          </p:cNvSpPr>
+          <p:nvPr>
+            <p:ph idx="1"/>
+          </p:nvPr>
+        </p:nvSpPr>
+        <p:spPr>
+          <a:xfrm>
+            <a:off x="457200" y="473173"/>
+            <a:ext cx="11214100" cy="1662164"/>
+          </a:xfrm>
+          <a:ln>
+            <a:noFill/>
+          </a:ln>
+        </p:spPr>
+        <p:txBody>
+          <a:bodyPr>
+            <a:noAutofit/>
+          </a:bodyPr>
+          <a:lstStyle/>
+          <a:p>
+            <a:pPr marL="0" indent="0" algn="ctr">
+              <a:buNone/>
+            </a:pPr>
+            <a:r>
+              <a:rPr lang="en-US" dirty="0"/>
+              <a:t>To make your choice:</a:t>
+            </a:r>
+          </a:p>
+          <a:p>
+            <a:pPr marL="0" indent="0" algn="ctr">
+              <a:buNone/>
+            </a:pPr>
+            <a:r>
+              <a:rPr lang="en-US" dirty="0"/>
+              <a:t>Press the </a:t>
+            </a:r>
+            <a:r>
+              <a:rPr lang="en-US" b="1" dirty="0"/>
+              <a:t>&lt;</a:t>
+            </a:r>
+            <a:r>
+              <a:rPr lang="en-US" dirty="0"/>
+              <a:t> BUTTON to play the left slot machine.</a:t>
+            </a:r>
+          </a:p>
+          <a:p>
+            <a:pPr marL="0" indent="0" algn="ctr">
+              <a:buNone/>
+            </a:pPr>
+            <a:r>
+              <a:rPr lang="en-US" dirty="0"/>
+              <a:t>Press the </a:t>
+            </a:r>
+            <a:r>
+              <a:rPr lang="en-US" b="1" dirty="0"/>
+              <a:t>&gt;</a:t>
+            </a:r>
+            <a:r>
+              <a:rPr lang="en-US" dirty="0"/>
+              <a:t> BUTTON to play the right slot machine.</a:t>
+            </a:r>
+          </a:p>
+        </p:txBody>
+      </p:sp>
+      <p:sp>
+        <p:nvSpPr>
+          <p:cNvPr id="26" name="Title 3"/>
+          <p:cNvSpPr txBox="1">
+            <a:spLocks/>
+          </p:cNvSpPr>
+          <p:nvPr/>
+        </p:nvSpPr>
+        <p:spPr>
+          <a:xfrm>
+            <a:off x="1524000" y="6201295"/>
+            <a:ext cx="9149174" cy="656705"/>
+          </a:xfrm>
+          <a:prstGeom prst="rect">
+            <a:avLst/>
+          </a:prstGeom>
+        </p:spPr>
+        <p:txBody>
+          <a:bodyPr vert="horz" lIns="91440" tIns="45720" rIns="91440" bIns="45720" rtlCol="0" anchor="ctr">
+            <a:normAutofit/>
+          </a:bodyPr>
+          <a:lstStyle>
+            <a:lvl1pPr algn="ctr" defTabSz="914400" rtl="0" eaLnBrk="1" latinLnBrk="0" hangingPunct="1">
+              <a:spcBef>
+                <a:spcPct val="0"/>
+              </a:spcBef>
+              <a:buNone/>
+              <a:defRPr sz="4400" kern="1200">
+                <a:solidFill>
+                  <a:schemeClr val="tx1"/>
+                </a:solidFill>
+                <a:latin typeface="+mj-lt"/>
+                <a:ea typeface="+mj-ea"/>
+                <a:cs typeface="+mj-cs"/>
+              </a:defRPr>
+            </a:lvl1pPr>
+          </a:lstStyle>
+          <a:p>
+            <a:r>
+              <a:rPr lang="en-US" sz="3000" dirty="0">
+                <a:solidFill>
+                  <a:srgbClr val="FF0000"/>
+                </a:solidFill>
+              </a:rPr>
+              <a:t>PRESS THE RIGHT BUTTON TO CONTINUE</a:t>
+            </a:r>
+          </a:p>
+        </p:txBody>
+      </p:sp>
+      <p:sp>
+        <p:nvSpPr>
+          <p:cNvPr id="12" name="Subtitle 8"/>
+          <p:cNvSpPr txBox="1">
+            <a:spLocks/>
+          </p:cNvSpPr>
+          <p:nvPr/>
+        </p:nvSpPr>
+        <p:spPr>
+          <a:xfrm>
+            <a:off x="9140345" y="6073844"/>
+            <a:ext cx="1532830" cy="801636"/>
+          </a:xfrm>
+          <a:prstGeom prst="rect">
+            <a:avLst/>
+          </a:prstGeom>
+        </p:spPr>
+        <p:txBody>
+          <a:bodyPr vert="horz" lIns="91440" tIns="45720" rIns="91440" bIns="45720" rtlCol="0">
+            <a:normAutofit/>
+          </a:bodyPr>
+          <a:lstStyle>
+            <a:lvl1pPr marL="0" indent="0" algn="ctr" defTabSz="914400" rtl="0" eaLnBrk="1" latinLnBrk="0" hangingPunct="1">
+              <a:spcBef>
+                <a:spcPct val="20000"/>
+              </a:spcBef>
+              <a:buFont typeface="Arial" pitchFamily="34" charset="0"/>
+              <a:buNone/>
+              <a:defRPr sz="3200" kern="1200">
+                <a:solidFill>
+                  <a:schemeClr val="tx1">
+                    <a:tint val="75000"/>
+                  </a:schemeClr>
+                </a:solidFill>
+                <a:latin typeface="+mn-lt"/>
+                <a:ea typeface="+mn-ea"/>
+                <a:cs typeface="+mn-cs"/>
+              </a:defRPr>
+            </a:lvl1pPr>
+            <a:lvl2pPr marL="457200" indent="0" algn="ctr" defTabSz="914400" rtl="0" eaLnBrk="1" latinLnBrk="0" hangingPunct="1">
+              <a:spcBef>
+                <a:spcPct val="20000"/>
+              </a:spcBef>
+              <a:buFont typeface="Arial" pitchFamily="34" charset="0"/>
+              <a:buNone/>
+              <a:defRPr sz="2800" kern="1200">
+                <a:solidFill>
+                  <a:schemeClr val="tx1">
+                    <a:tint val="75000"/>
+                  </a:schemeClr>
+                </a:solidFill>
+                <a:latin typeface="+mn-lt"/>
+                <a:ea typeface="+mn-ea"/>
+                <a:cs typeface="+mn-cs"/>
+              </a:defRPr>
+            </a:lvl2pPr>
+            <a:lvl3pPr marL="914400" indent="0" algn="ctr" defTabSz="914400" rtl="0" eaLnBrk="1" latinLnBrk="0" hangingPunct="1">
+              <a:spcBef>
+                <a:spcPct val="20000"/>
+              </a:spcBef>
+              <a:buFont typeface="Arial" pitchFamily="34" charset="0"/>
+              <a:buNone/>
+              <a:defRPr sz="2400" kern="1200">
+                <a:solidFill>
+                  <a:schemeClr val="tx1">
+                    <a:tint val="75000"/>
+                  </a:schemeClr>
+                </a:solidFill>
+                <a:latin typeface="+mn-lt"/>
+                <a:ea typeface="+mn-ea"/>
+                <a:cs typeface="+mn-cs"/>
+              </a:defRPr>
+            </a:lvl3pPr>
+            <a:lvl4pPr marL="1371600" indent="0" algn="ctr" defTabSz="914400" rtl="0" eaLnBrk="1" latinLnBrk="0" hangingPunct="1">
+              <a:spcBef>
+                <a:spcPct val="20000"/>
+              </a:spcBef>
+              <a:buFont typeface="Arial" pitchFamily="34" charset="0"/>
+              <a:buNone/>
+              <a:defRPr sz="2000" kern="1200">
+                <a:solidFill>
+                  <a:schemeClr val="tx1">
+                    <a:tint val="75000"/>
+                  </a:schemeClr>
+                </a:solidFill>
+                <a:latin typeface="+mn-lt"/>
+                <a:ea typeface="+mn-ea"/>
+                <a:cs typeface="+mn-cs"/>
+              </a:defRPr>
+            </a:lvl4pPr>
+            <a:lvl5pPr marL="1828800" indent="0" algn="ctr" defTabSz="914400" rtl="0" eaLnBrk="1" latinLnBrk="0" hangingPunct="1">
+              <a:spcBef>
+                <a:spcPct val="20000"/>
+              </a:spcBef>
+              <a:buFont typeface="Arial" pitchFamily="34" charset="0"/>
+              <a:buNone/>
+              <a:defRPr sz="2000" kern="1200">
+                <a:solidFill>
+                  <a:schemeClr val="tx1">
+                    <a:tint val="75000"/>
+                  </a:schemeClr>
+                </a:solidFill>
+                <a:latin typeface="+mn-lt"/>
+                <a:ea typeface="+mn-ea"/>
+                <a:cs typeface="+mn-cs"/>
+              </a:defRPr>
+            </a:lvl5pPr>
+            <a:lvl6pPr marL="2286000" indent="0" algn="ctr" defTabSz="914400" rtl="0" eaLnBrk="1" latinLnBrk="0" hangingPunct="1">
+              <a:spcBef>
+                <a:spcPct val="20000"/>
+              </a:spcBef>
+              <a:buFont typeface="Arial" pitchFamily="34" charset="0"/>
+              <a:buNone/>
+              <a:defRPr sz="2000" kern="1200">
+                <a:solidFill>
+                  <a:schemeClr val="tx1">
+                    <a:tint val="75000"/>
+                  </a:schemeClr>
+                </a:solidFill>
+                <a:latin typeface="+mn-lt"/>
+                <a:ea typeface="+mn-ea"/>
+                <a:cs typeface="+mn-cs"/>
+              </a:defRPr>
+            </a:lvl6pPr>
+            <a:lvl7pPr marL="2743200" indent="0" algn="ctr" defTabSz="914400" rtl="0" eaLnBrk="1" latinLnBrk="0" hangingPunct="1">
+              <a:spcBef>
+                <a:spcPct val="20000"/>
+              </a:spcBef>
+              <a:buFont typeface="Arial" pitchFamily="34" charset="0"/>
+              <a:buNone/>
+              <a:defRPr sz="2000" kern="1200">
+                <a:solidFill>
+                  <a:schemeClr val="tx1">
+                    <a:tint val="75000"/>
+                  </a:schemeClr>
+                </a:solidFill>
+                <a:latin typeface="+mn-lt"/>
+                <a:ea typeface="+mn-ea"/>
+                <a:cs typeface="+mn-cs"/>
+              </a:defRPr>
+            </a:lvl7pPr>
+            <a:lvl8pPr marL="3200400" indent="0" algn="ctr" defTabSz="914400" rtl="0" eaLnBrk="1" latinLnBrk="0" hangingPunct="1">
+              <a:spcBef>
+                <a:spcPct val="20000"/>
+              </a:spcBef>
+              <a:buFont typeface="Arial" pitchFamily="34" charset="0"/>
+              <a:buNone/>
+              <a:defRPr sz="2000" kern="1200">
+                <a:solidFill>
+                  <a:schemeClr val="tx1">
+                    <a:tint val="75000"/>
+                  </a:schemeClr>
+                </a:solidFill>
+                <a:latin typeface="+mn-lt"/>
+                <a:ea typeface="+mn-ea"/>
+                <a:cs typeface="+mn-cs"/>
+              </a:defRPr>
+            </a:lvl8pPr>
+            <a:lvl9pPr marL="3657600" indent="0" algn="ctr" defTabSz="914400" rtl="0" eaLnBrk="1" latinLnBrk="0" hangingPunct="1">
+              <a:spcBef>
+                <a:spcPct val="20000"/>
+              </a:spcBef>
+              <a:buFont typeface="Arial" pitchFamily="34" charset="0"/>
+              <a:buNone/>
+              <a:defRPr sz="2000" kern="1200">
+                <a:solidFill>
+                  <a:schemeClr val="tx1">
+                    <a:tint val="75000"/>
+                  </a:schemeClr>
+                </a:solidFill>
+                <a:latin typeface="+mn-lt"/>
+                <a:ea typeface="+mn-ea"/>
+                <a:cs typeface="+mn-cs"/>
+              </a:defRPr>
+            </a:lvl9pPr>
+          </a:lstStyle>
+          <a:p>
+            <a:r>
+              <a:rPr lang="en-US" sz="1600" dirty="0">
+                <a:solidFill>
+                  <a:schemeClr val="tx1"/>
+                </a:solidFill>
+              </a:rPr>
+              <a:t>RIGHT</a:t>
+            </a:r>
+          </a:p>
+        </p:txBody>
+      </p:sp>
+      <p:sp>
+        <p:nvSpPr>
+          <p:cNvPr id="13" name="Right Arrow 12"/>
+          <p:cNvSpPr/>
+          <p:nvPr/>
+        </p:nvSpPr>
+        <p:spPr>
+          <a:xfrm>
+            <a:off x="9637318" y="6391827"/>
+            <a:ext cx="640200" cy="289763"/>
+          </a:xfrm>
+          <a:prstGeom prst="rightArrow">
+            <a:avLst/>
+          </a:prstGeom>
+          <a:solidFill>
+            <a:schemeClr val="tx1"/>
+          </a:solidFill>
+          <a:ln>
+            <a:noFill/>
+          </a:ln>
+        </p:spPr>
+        <p:style>
+          <a:lnRef idx="1">
+            <a:schemeClr val="accent1"/>
+          </a:lnRef>
+          <a:fillRef idx="3">
+            <a:schemeClr val="accent1"/>
+          </a:fillRef>
+          <a:effectRef idx="2">
+            <a:schemeClr val="accent1"/>
+          </a:effectRef>
+          <a:fontRef idx="minor">
+            <a:schemeClr val="lt1"/>
+          </a:fontRef>
+        </p:style>
+        <p:txBody>
+          <a:bodyPr rtlCol="0" anchor="ctr"/>
+          <a:lstStyle/>
+          <a:p>
+            <a:pPr algn="ctr"/>
+            <a:endParaRPr lang="en-US"/>
+          </a:p>
+        </p:txBody>
+      </p:sp>
+      <p:pic>
+        <p:nvPicPr>
+          <p:cNvPr id="21" name="Picture 20" descr="A picture containing object, clock, drawing&#10;&#10;Description automatically generated">
+            <a:extLst>
+              <a:ext uri="{FF2B5EF4-FFF2-40B4-BE49-F238E27FC236}">
+                <a16:creationId xmlns:a16="http://schemas.microsoft.com/office/drawing/2014/main" id="{2F717B8A-A6F7-9D45-A07C-A794FE1D3C0A}"/>
+              </a:ext>
+            </a:extLst>
+          </p:cNvPr>
+          <p:cNvPicPr>
+            <a:picLocks noChangeAspect="1"/>
+          </p:cNvPicPr>
+          <p:nvPr/>
+        </p:nvPicPr>
+        <p:blipFill rotWithShape="1">
+          <a:blip r:embed="rId3"/>
+          <a:srcRect l="28021" t="5209" r="28750" b="41148"/>
+          <a:stretch/>
+        </p:blipFill>
+        <p:spPr>
+          <a:xfrm>
+            <a:off x="3460750" y="2398302"/>
+            <a:ext cx="5270500" cy="3540027"/>
+          </a:xfrm>
+          <a:prstGeom prst="rect">
+            <a:avLst/>
+          </a:prstGeom>
+        </p:spPr>
+      </p:pic>
+      <p:sp>
+        <p:nvSpPr>
+          <p:cNvPr id="22" name="Rectangle 21">
+            <a:extLst>
+              <a:ext uri="{FF2B5EF4-FFF2-40B4-BE49-F238E27FC236}">
+                <a16:creationId xmlns:a16="http://schemas.microsoft.com/office/drawing/2014/main" id="{8AE16CA7-6556-E645-8E2C-3B78486F4571}"/>
+              </a:ext>
+            </a:extLst>
+          </p:cNvPr>
+          <p:cNvSpPr/>
+          <p:nvPr/>
+        </p:nvSpPr>
+        <p:spPr>
+          <a:xfrm>
+            <a:off x="6502401" y="3255385"/>
+            <a:ext cx="495300" cy="279400"/>
+          </a:xfrm>
+          <a:prstGeom prst="rect">
+            <a:avLst/>
+          </a:prstGeom>
+          <a:solidFill>
+            <a:schemeClr val="bg1"/>
+          </a:solidFill>
+          <a:ln>
+            <a:noFill/>
+          </a:ln>
+        </p:spPr>
+        <p:style>
+          <a:lnRef idx="2">
+            <a:schemeClr val="accent1">
+              <a:shade val="50000"/>
+            </a:schemeClr>
+          </a:lnRef>
+          <a:fillRef idx="1">
+            <a:schemeClr val="accent1"/>
+          </a:fillRef>
+          <a:effectRef idx="0">
+            <a:schemeClr val="accent1"/>
+          </a:effectRef>
+          <a:fontRef idx="minor">
+            <a:schemeClr val="lt1"/>
+          </a:fontRef>
+        </p:style>
+        <p:txBody>
+          <a:bodyPr rtlCol="0" anchor="ctr"/>
+          <a:lstStyle/>
+          <a:p>
+            <a:pPr algn="ctr"/>
+            <a:endParaRPr lang="en-US"/>
+          </a:p>
+        </p:txBody>
+      </p:sp>
+    </p:spTree>
+    <p:extLst>
+      <p:ext uri="{BB962C8B-B14F-4D97-AF65-F5344CB8AC3E}">
+        <p14:creationId xmlns:p14="http://schemas.microsoft.com/office/powerpoint/2010/main" val="957509331"/>
       </p:ext>
     </p:extLst>
   </p:cSld>

</xml_diff>

<commit_message>
added slide on horizon task to say points meant
</commit_message>
<xml_diff>
--- a/public/js/tasks/horizon/media/horizonInstructions_RSS.pptx
+++ b/public/js/tasks/horizon/media/horizonInstructions_RSS.pptx
@@ -5,7 +5,7 @@
     <p:sldMasterId id="2147483660" r:id="rId1"/>
   </p:sldMasterIdLst>
   <p:notesMasterIdLst>
-    <p:notesMasterId r:id="rId26"/>
+    <p:notesMasterId r:id="rId27"/>
   </p:notesMasterIdLst>
   <p:sldIdLst>
     <p:sldId id="498" r:id="rId2"/>
@@ -28,10 +28,11 @@
     <p:sldId id="526" r:id="rId19"/>
     <p:sldId id="528" r:id="rId20"/>
     <p:sldId id="529" r:id="rId21"/>
-    <p:sldId id="530" r:id="rId22"/>
-    <p:sldId id="531" r:id="rId23"/>
-    <p:sldId id="532" r:id="rId24"/>
-    <p:sldId id="533" r:id="rId25"/>
+    <p:sldId id="534" r:id="rId22"/>
+    <p:sldId id="530" r:id="rId23"/>
+    <p:sldId id="531" r:id="rId24"/>
+    <p:sldId id="532" r:id="rId25"/>
+    <p:sldId id="533" r:id="rId26"/>
   </p:sldIdLst>
   <p:sldSz cx="12192000" cy="6858000"/>
   <p:notesSz cx="6858000" cy="9144000"/>
@@ -155,6 +156,7 @@
             <p14:sldId id="526"/>
             <p14:sldId id="528"/>
             <p14:sldId id="529"/>
+            <p14:sldId id="534"/>
             <p14:sldId id="530"/>
             <p14:sldId id="531"/>
           </p14:sldIdLst>
@@ -267,7 +269,7 @@
           <a:p>
             <a:fld id="{5ACDFB13-8C7E-2148-B293-047F9641DD71}" type="datetimeFigureOut">
               <a:rPr lang="en-US" smtClean="0"/>
-              <a:t>9/8/20</a:t>
+              <a:t>10/29/20</a:t>
             </a:fld>
             <a:endParaRPr lang="en-US" dirty="0"/>
           </a:p>
@@ -1836,6 +1838,14 @@
           <a:bodyPr/>
           <a:lstStyle/>
           <a:p>
+            <a:r>
+              <a:rPr lang="en-US" dirty="0"/>
+              <a:t>Add screenshots of an X and an O</a:t>
+            </a:r>
+            <a:r>
+              <a:rPr lang="en-US" baseline="0" dirty="0"/>
+              <a:t> screen – like a timeline of screenshots.</a:t>
+            </a:r>
             <a:endParaRPr lang="en-US" dirty="0"/>
           </a:p>
         </p:txBody>
@@ -1866,7 +1876,7 @@
     </p:spTree>
     <p:extLst>
       <p:ext uri="{BB962C8B-B14F-4D97-AF65-F5344CB8AC3E}">
-        <p14:creationId xmlns:p14="http://schemas.microsoft.com/office/powerpoint/2010/main" val="3186647101"/>
+        <p14:creationId xmlns:p14="http://schemas.microsoft.com/office/powerpoint/2010/main" val="2970812486"/>
       </p:ext>
     </p:extLst>
   </p:cSld>
@@ -1955,7 +1965,7 @@
     </p:spTree>
     <p:extLst>
       <p:ext uri="{BB962C8B-B14F-4D97-AF65-F5344CB8AC3E}">
-        <p14:creationId xmlns:p14="http://schemas.microsoft.com/office/powerpoint/2010/main" val="3781381945"/>
+        <p14:creationId xmlns:p14="http://schemas.microsoft.com/office/powerpoint/2010/main" val="3186647101"/>
       </p:ext>
     </p:extLst>
   </p:cSld>
@@ -2014,14 +2024,6 @@
           <a:bodyPr/>
           <a:lstStyle/>
           <a:p>
-            <a:r>
-              <a:rPr lang="en-US" dirty="0"/>
-              <a:t>Outside</a:t>
-            </a:r>
-            <a:r>
-              <a:rPr lang="en-US" baseline="0" dirty="0"/>
-              <a:t> the scanner</a:t>
-            </a:r>
             <a:endParaRPr lang="en-US" dirty="0"/>
           </a:p>
         </p:txBody>
@@ -2052,7 +2054,7 @@
     </p:spTree>
     <p:extLst>
       <p:ext uri="{BB962C8B-B14F-4D97-AF65-F5344CB8AC3E}">
-        <p14:creationId xmlns:p14="http://schemas.microsoft.com/office/powerpoint/2010/main" val="2080840416"/>
+        <p14:creationId xmlns:p14="http://schemas.microsoft.com/office/powerpoint/2010/main" val="3781381945"/>
       </p:ext>
     </p:extLst>
   </p:cSld>
@@ -2111,6 +2113,14 @@
           <a:bodyPr/>
           <a:lstStyle/>
           <a:p>
+            <a:r>
+              <a:rPr lang="en-US" dirty="0"/>
+              <a:t>Outside</a:t>
+            </a:r>
+            <a:r>
+              <a:rPr lang="en-US" baseline="0" dirty="0"/>
+              <a:t> the scanner</a:t>
+            </a:r>
             <a:endParaRPr lang="en-US" dirty="0"/>
           </a:p>
         </p:txBody>
@@ -2133,6 +2143,95 @@
             <a:fld id="{BCAE12D7-AE97-9243-8341-9A20FCA5A307}" type="slidenum">
               <a:rPr lang="en-US" smtClean="0"/>
               <a:t>24</a:t>
+            </a:fld>
+            <a:endParaRPr lang="en-US"/>
+          </a:p>
+        </p:txBody>
+      </p:sp>
+    </p:spTree>
+    <p:extLst>
+      <p:ext uri="{BB962C8B-B14F-4D97-AF65-F5344CB8AC3E}">
+        <p14:creationId xmlns:p14="http://schemas.microsoft.com/office/powerpoint/2010/main" val="2080840416"/>
+      </p:ext>
+    </p:extLst>
+  </p:cSld>
+  <p:clrMapOvr>
+    <a:masterClrMapping/>
+  </p:clrMapOvr>
+</p:notes>
+</file>
+
+<file path=ppt/notesSlides/notesSlide25.xml><?xml version="1.0" encoding="utf-8"?>
+<p:notes xmlns:a="http://schemas.openxmlformats.org/drawingml/2006/main" xmlns:r="http://schemas.openxmlformats.org/officeDocument/2006/relationships" xmlns:p="http://schemas.openxmlformats.org/presentationml/2006/main">
+  <p:cSld>
+    <p:spTree>
+      <p:nvGrpSpPr>
+        <p:cNvPr id="1" name=""/>
+        <p:cNvGrpSpPr/>
+        <p:nvPr/>
+      </p:nvGrpSpPr>
+      <p:grpSpPr>
+        <a:xfrm>
+          <a:off x="0" y="0"/>
+          <a:ext cx="0" cy="0"/>
+          <a:chOff x="0" y="0"/>
+          <a:chExt cx="0" cy="0"/>
+        </a:xfrm>
+      </p:grpSpPr>
+      <p:sp>
+        <p:nvSpPr>
+          <p:cNvPr id="2" name="Slide Image Placeholder 1"/>
+          <p:cNvSpPr>
+            <a:spLocks noGrp="1" noRot="1" noChangeAspect="1"/>
+          </p:cNvSpPr>
+          <p:nvPr>
+            <p:ph type="sldImg"/>
+          </p:nvPr>
+        </p:nvSpPr>
+        <p:spPr>
+          <a:xfrm>
+            <a:off x="381000" y="685800"/>
+            <a:ext cx="6096000" cy="3429000"/>
+          </a:xfrm>
+        </p:spPr>
+      </p:sp>
+      <p:sp>
+        <p:nvSpPr>
+          <p:cNvPr id="3" name="Notes Placeholder 2"/>
+          <p:cNvSpPr>
+            <a:spLocks noGrp="1"/>
+          </p:cNvSpPr>
+          <p:nvPr>
+            <p:ph type="body" idx="1"/>
+          </p:nvPr>
+        </p:nvSpPr>
+        <p:spPr/>
+        <p:txBody>
+          <a:bodyPr/>
+          <a:lstStyle/>
+          <a:p>
+            <a:endParaRPr lang="en-US" dirty="0"/>
+          </a:p>
+        </p:txBody>
+      </p:sp>
+      <p:sp>
+        <p:nvSpPr>
+          <p:cNvPr id="4" name="Slide Number Placeholder 3"/>
+          <p:cNvSpPr>
+            <a:spLocks noGrp="1"/>
+          </p:cNvSpPr>
+          <p:nvPr>
+            <p:ph type="sldNum" sz="quarter" idx="10"/>
+          </p:nvPr>
+        </p:nvSpPr>
+        <p:spPr/>
+        <p:txBody>
+          <a:bodyPr/>
+          <a:lstStyle/>
+          <a:p>
+            <a:fld id="{BCAE12D7-AE97-9243-8341-9A20FCA5A307}" type="slidenum">
+              <a:rPr lang="en-US" smtClean="0"/>
+              <a:t>25</a:t>
             </a:fld>
             <a:endParaRPr lang="en-US"/>
           </a:p>
@@ -3009,7 +3108,7 @@
           <a:p>
             <a:fld id="{E69A4D3A-6EF8-7448-AC6F-AD52FEDAA6A8}" type="datetimeFigureOut">
               <a:rPr lang="en-US" smtClean="0"/>
-              <a:t>9/8/20</a:t>
+              <a:t>10/29/20</a:t>
             </a:fld>
             <a:endParaRPr lang="en-US" dirty="0"/>
           </a:p>
@@ -3177,7 +3276,7 @@
           <a:p>
             <a:fld id="{E69A4D3A-6EF8-7448-AC6F-AD52FEDAA6A8}" type="datetimeFigureOut">
               <a:rPr lang="en-US" smtClean="0"/>
-              <a:t>9/8/20</a:t>
+              <a:t>10/29/20</a:t>
             </a:fld>
             <a:endParaRPr lang="en-US" dirty="0"/>
           </a:p>
@@ -3355,7 +3454,7 @@
           <a:p>
             <a:fld id="{E69A4D3A-6EF8-7448-AC6F-AD52FEDAA6A8}" type="datetimeFigureOut">
               <a:rPr lang="en-US" smtClean="0"/>
-              <a:t>9/8/20</a:t>
+              <a:t>10/29/20</a:t>
             </a:fld>
             <a:endParaRPr lang="en-US" dirty="0"/>
           </a:p>
@@ -3523,7 +3622,7 @@
           <a:p>
             <a:fld id="{E69A4D3A-6EF8-7448-AC6F-AD52FEDAA6A8}" type="datetimeFigureOut">
               <a:rPr lang="en-US" smtClean="0"/>
-              <a:t>9/8/20</a:t>
+              <a:t>10/29/20</a:t>
             </a:fld>
             <a:endParaRPr lang="en-US" dirty="0"/>
           </a:p>
@@ -3768,7 +3867,7 @@
           <a:p>
             <a:fld id="{E69A4D3A-6EF8-7448-AC6F-AD52FEDAA6A8}" type="datetimeFigureOut">
               <a:rPr lang="en-US" smtClean="0"/>
-              <a:t>9/8/20</a:t>
+              <a:t>10/29/20</a:t>
             </a:fld>
             <a:endParaRPr lang="en-US" dirty="0"/>
           </a:p>
@@ -4053,7 +4152,7 @@
           <a:p>
             <a:fld id="{E69A4D3A-6EF8-7448-AC6F-AD52FEDAA6A8}" type="datetimeFigureOut">
               <a:rPr lang="en-US" smtClean="0"/>
-              <a:t>9/8/20</a:t>
+              <a:t>10/29/20</a:t>
             </a:fld>
             <a:endParaRPr lang="en-US" dirty="0"/>
           </a:p>
@@ -4472,7 +4571,7 @@
           <a:p>
             <a:fld id="{E69A4D3A-6EF8-7448-AC6F-AD52FEDAA6A8}" type="datetimeFigureOut">
               <a:rPr lang="en-US" smtClean="0"/>
-              <a:t>9/8/20</a:t>
+              <a:t>10/29/20</a:t>
             </a:fld>
             <a:endParaRPr lang="en-US" dirty="0"/>
           </a:p>
@@ -4589,7 +4688,7 @@
           <a:p>
             <a:fld id="{E69A4D3A-6EF8-7448-AC6F-AD52FEDAA6A8}" type="datetimeFigureOut">
               <a:rPr lang="en-US" smtClean="0"/>
-              <a:t>9/8/20</a:t>
+              <a:t>10/29/20</a:t>
             </a:fld>
             <a:endParaRPr lang="en-US" dirty="0"/>
           </a:p>
@@ -4684,7 +4783,7 @@
           <a:p>
             <a:fld id="{E69A4D3A-6EF8-7448-AC6F-AD52FEDAA6A8}" type="datetimeFigureOut">
               <a:rPr lang="en-US" smtClean="0"/>
-              <a:t>9/8/20</a:t>
+              <a:t>10/29/20</a:t>
             </a:fld>
             <a:endParaRPr lang="en-US" dirty="0"/>
           </a:p>
@@ -4959,7 +5058,7 @@
           <a:p>
             <a:fld id="{E69A4D3A-6EF8-7448-AC6F-AD52FEDAA6A8}" type="datetimeFigureOut">
               <a:rPr lang="en-US" smtClean="0"/>
-              <a:t>9/8/20</a:t>
+              <a:t>10/29/20</a:t>
             </a:fld>
             <a:endParaRPr lang="en-US" dirty="0"/>
           </a:p>
@@ -5214,7 +5313,7 @@
           <a:p>
             <a:fld id="{E69A4D3A-6EF8-7448-AC6F-AD52FEDAA6A8}" type="datetimeFigureOut">
               <a:rPr lang="en-US" smtClean="0"/>
-              <a:t>9/8/20</a:t>
+              <a:t>10/29/20</a:t>
             </a:fld>
             <a:endParaRPr lang="en-US" dirty="0"/>
           </a:p>
@@ -5428,7 +5527,7 @@
           <a:p>
             <a:fld id="{E69A4D3A-6EF8-7448-AC6F-AD52FEDAA6A8}" type="datetimeFigureOut">
               <a:rPr lang="en-US" smtClean="0"/>
-              <a:t>9/8/20</a:t>
+              <a:t>10/29/20</a:t>
             </a:fld>
             <a:endParaRPr lang="en-US" dirty="0"/>
           </a:p>
@@ -13368,8 +13467,8 @@
         </p:nvSpPr>
         <p:spPr>
           <a:xfrm>
-            <a:off x="457200" y="473173"/>
-            <a:ext cx="11214100" cy="1662164"/>
+            <a:off x="457200" y="473172"/>
+            <a:ext cx="11214100" cy="3298728"/>
           </a:xfrm>
           <a:ln>
             <a:noFill/>
@@ -13381,12 +13480,21 @@
           </a:bodyPr>
           <a:lstStyle/>
           <a:p>
+            <a:pPr marL="0" indent="0">
+              <a:buNone/>
+            </a:pPr>
+            <a:r>
+              <a:rPr lang="en-US" dirty="0"/>
+              <a:t>You will receive payment based on the number of points  you win.</a:t>
+            </a:r>
+          </a:p>
+          <a:p>
             <a:pPr marL="0" indent="0" algn="ctr">
               <a:buNone/>
             </a:pPr>
             <a:r>
               <a:rPr lang="en-US" dirty="0"/>
-              <a:t>So to be sure that everything makes sense let’s work through a few example games.</a:t>
+              <a:t>For every 100 points you win, you will receive 10 cents.</a:t>
             </a:r>
           </a:p>
           <a:p>
@@ -13406,33 +13514,8 @@
               <a:buNone/>
             </a:pPr>
             <a:r>
-              <a:rPr lang="en-US" dirty="0"/>
-              <a:t>Press the </a:t>
-            </a:r>
-            <a:r>
-              <a:rPr lang="en-US" b="1" dirty="0"/>
-              <a:t>&lt;</a:t>
-            </a:r>
-            <a:r>
-              <a:rPr lang="en-US" dirty="0"/>
-              <a:t> BUTTON to play the left slot machine.</a:t>
-            </a:r>
-          </a:p>
-          <a:p>
-            <a:pPr marL="0" indent="0" algn="ctr">
-              <a:buNone/>
-            </a:pPr>
-            <a:r>
-              <a:rPr lang="en-US" dirty="0"/>
-              <a:t>Press the </a:t>
-            </a:r>
-            <a:r>
-              <a:rPr lang="en-US" b="1" dirty="0"/>
-              <a:t>&gt;</a:t>
-            </a:r>
-            <a:r>
-              <a:rPr lang="en-US" dirty="0"/>
-              <a:t> BUTTON to play the right slot machine.</a:t>
+              <a:rPr lang="en-US" sz="3600" b="1" dirty="0"/>
+              <a:t>100 points = 10 cents</a:t>
             </a:r>
           </a:p>
         </p:txBody>
@@ -13718,62 +13801,10 @@
           </a:p>
         </p:txBody>
       </p:sp>
-      <p:sp>
-        <p:nvSpPr>
-          <p:cNvPr id="22" name="Rectangle 21">
-            <a:extLst>
-              <a:ext uri="{FF2B5EF4-FFF2-40B4-BE49-F238E27FC236}">
-                <a16:creationId xmlns:a16="http://schemas.microsoft.com/office/drawing/2014/main" id="{8AE16CA7-6556-E645-8E2C-3B78486F4571}"/>
-              </a:ext>
-            </a:extLst>
-          </p:cNvPr>
-          <p:cNvSpPr/>
-          <p:nvPr/>
-        </p:nvSpPr>
-        <p:spPr>
-          <a:xfrm>
-            <a:off x="6502401" y="3255385"/>
-            <a:ext cx="495300" cy="279400"/>
-          </a:xfrm>
-          <a:prstGeom prst="rect">
-            <a:avLst/>
-          </a:prstGeom>
-          <a:solidFill>
-            <a:schemeClr val="bg1"/>
-          </a:solidFill>
-          <a:ln>
-            <a:noFill/>
-          </a:ln>
-        </p:spPr>
-        <p:style>
-          <a:lnRef idx="2">
-            <a:schemeClr val="accent1">
-              <a:shade val="50000"/>
-            </a:schemeClr>
-          </a:lnRef>
-          <a:fillRef idx="1">
-            <a:schemeClr val="accent1"/>
-          </a:fillRef>
-          <a:effectRef idx="0">
-            <a:schemeClr val="accent1"/>
-          </a:effectRef>
-          <a:fontRef idx="minor">
-            <a:schemeClr val="lt1"/>
-          </a:fontRef>
-        </p:style>
-        <p:txBody>
-          <a:bodyPr rtlCol="0" anchor="ctr"/>
-          <a:lstStyle/>
-          <a:p>
-            <a:pPr algn="ctr"/>
-            <a:endParaRPr lang="en-US"/>
-          </a:p>
-        </p:txBody>
-      </p:sp>
     </p:spTree>
     <p:extLst>
       <p:ext uri="{BB962C8B-B14F-4D97-AF65-F5344CB8AC3E}">
-        <p14:creationId xmlns:p14="http://schemas.microsoft.com/office/powerpoint/2010/main" val="758451698"/>
+        <p14:creationId xmlns:p14="http://schemas.microsoft.com/office/powerpoint/2010/main" val="1934461905"/>
       </p:ext>
     </p:extLst>
   </p:cSld>
@@ -13820,8 +13851,8 @@
         </p:nvSpPr>
         <p:spPr>
           <a:xfrm>
-            <a:off x="457200" y="860451"/>
-            <a:ext cx="11214100" cy="5013227"/>
+            <a:off x="457200" y="473173"/>
+            <a:ext cx="11214100" cy="1662164"/>
           </a:xfrm>
           <a:ln>
             <a:noFill/>
@@ -13838,7 +13869,7 @@
             </a:pPr>
             <a:r>
               <a:rPr lang="en-US" dirty="0"/>
-              <a:t>Good Job!</a:t>
+              <a:t>So to be sure that everything makes sense let’s work through a few example games.</a:t>
             </a:r>
           </a:p>
           <a:p>
@@ -13851,32 +13882,381 @@
             <a:pPr marL="0" indent="0" algn="ctr">
               <a:buNone/>
             </a:pPr>
+            <a:endParaRPr lang="en-US" dirty="0"/>
+          </a:p>
+          <a:p>
+            <a:pPr marL="0" indent="0" algn="ctr">
+              <a:buNone/>
+            </a:pPr>
             <a:r>
               <a:rPr lang="en-US" dirty="0"/>
-              <a:t>Now you know how to play this game.</a:t>
+              <a:t>Press the </a:t>
+            </a:r>
+            <a:r>
+              <a:rPr lang="en-US" b="1" dirty="0"/>
+              <a:t>&lt;</a:t>
+            </a:r>
+            <a:r>
+              <a:rPr lang="en-US" dirty="0"/>
+              <a:t> BUTTON to play the left slot machine.</a:t>
             </a:r>
           </a:p>
           <a:p>
             <a:pPr marL="0" indent="0" algn="ctr">
               <a:buNone/>
             </a:pPr>
-            <a:endParaRPr lang="en-US" dirty="0"/>
-          </a:p>
-          <a:p>
-            <a:pPr marL="0" indent="0" algn="ctr">
-              <a:buNone/>
-            </a:pPr>
             <a:r>
               <a:rPr lang="en-US" dirty="0"/>
-              <a:t>Once you are ready to start playing the  actual game to win points, please press the RIGHT BUTTON.</a:t>
-            </a:r>
+              <a:t>Press the </a:t>
+            </a:r>
+            <a:r>
+              <a:rPr lang="en-US" b="1" dirty="0"/>
+              <a:t>&gt;</a:t>
+            </a:r>
+            <a:r>
+              <a:rPr lang="en-US" dirty="0"/>
+              <a:t> BUTTON to play the right slot machine.</a:t>
+            </a:r>
+          </a:p>
+        </p:txBody>
+      </p:sp>
+      <p:sp>
+        <p:nvSpPr>
+          <p:cNvPr id="26" name="Title 3"/>
+          <p:cNvSpPr txBox="1">
+            <a:spLocks/>
+          </p:cNvSpPr>
+          <p:nvPr/>
+        </p:nvSpPr>
+        <p:spPr>
+          <a:xfrm>
+            <a:off x="1524000" y="6201295"/>
+            <a:ext cx="9149174" cy="656705"/>
+          </a:xfrm>
+          <a:prstGeom prst="rect">
+            <a:avLst/>
+          </a:prstGeom>
+        </p:spPr>
+        <p:txBody>
+          <a:bodyPr vert="horz" lIns="91440" tIns="45720" rIns="91440" bIns="45720" rtlCol="0" anchor="ctr">
+            <a:normAutofit/>
+          </a:bodyPr>
+          <a:lstStyle>
+            <a:lvl1pPr algn="ctr" defTabSz="914400" rtl="0" eaLnBrk="1" latinLnBrk="0" hangingPunct="1">
+              <a:spcBef>
+                <a:spcPct val="0"/>
+              </a:spcBef>
+              <a:buNone/>
+              <a:defRPr sz="4400" kern="1200">
+                <a:solidFill>
+                  <a:schemeClr val="tx1"/>
+                </a:solidFill>
+                <a:latin typeface="+mj-lt"/>
+                <a:ea typeface="+mj-ea"/>
+                <a:cs typeface="+mj-cs"/>
+              </a:defRPr>
+            </a:lvl1pPr>
+          </a:lstStyle>
+          <a:p>
+            <a:r>
+              <a:rPr lang="en-US" sz="3000" dirty="0">
+                <a:solidFill>
+                  <a:srgbClr val="FF0000"/>
+                </a:solidFill>
+              </a:rPr>
+              <a:t>PRESS THE RIGHT BUTTON TO CONTINUE</a:t>
+            </a:r>
+          </a:p>
+        </p:txBody>
+      </p:sp>
+      <p:sp>
+        <p:nvSpPr>
+          <p:cNvPr id="12" name="Subtitle 8"/>
+          <p:cNvSpPr txBox="1">
+            <a:spLocks/>
+          </p:cNvSpPr>
+          <p:nvPr/>
+        </p:nvSpPr>
+        <p:spPr>
+          <a:xfrm>
+            <a:off x="9140345" y="6073844"/>
+            <a:ext cx="1532830" cy="801636"/>
+          </a:xfrm>
+          <a:prstGeom prst="rect">
+            <a:avLst/>
+          </a:prstGeom>
+        </p:spPr>
+        <p:txBody>
+          <a:bodyPr vert="horz" lIns="91440" tIns="45720" rIns="91440" bIns="45720" rtlCol="0">
+            <a:normAutofit/>
+          </a:bodyPr>
+          <a:lstStyle>
+            <a:lvl1pPr marL="0" indent="0" algn="ctr" defTabSz="914400" rtl="0" eaLnBrk="1" latinLnBrk="0" hangingPunct="1">
+              <a:spcBef>
+                <a:spcPct val="20000"/>
+              </a:spcBef>
+              <a:buFont typeface="Arial" pitchFamily="34" charset="0"/>
+              <a:buNone/>
+              <a:defRPr sz="3200" kern="1200">
+                <a:solidFill>
+                  <a:schemeClr val="tx1">
+                    <a:tint val="75000"/>
+                  </a:schemeClr>
+                </a:solidFill>
+                <a:latin typeface="+mn-lt"/>
+                <a:ea typeface="+mn-ea"/>
+                <a:cs typeface="+mn-cs"/>
+              </a:defRPr>
+            </a:lvl1pPr>
+            <a:lvl2pPr marL="457200" indent="0" algn="ctr" defTabSz="914400" rtl="0" eaLnBrk="1" latinLnBrk="0" hangingPunct="1">
+              <a:spcBef>
+                <a:spcPct val="20000"/>
+              </a:spcBef>
+              <a:buFont typeface="Arial" pitchFamily="34" charset="0"/>
+              <a:buNone/>
+              <a:defRPr sz="2800" kern="1200">
+                <a:solidFill>
+                  <a:schemeClr val="tx1">
+                    <a:tint val="75000"/>
+                  </a:schemeClr>
+                </a:solidFill>
+                <a:latin typeface="+mn-lt"/>
+                <a:ea typeface="+mn-ea"/>
+                <a:cs typeface="+mn-cs"/>
+              </a:defRPr>
+            </a:lvl2pPr>
+            <a:lvl3pPr marL="914400" indent="0" algn="ctr" defTabSz="914400" rtl="0" eaLnBrk="1" latinLnBrk="0" hangingPunct="1">
+              <a:spcBef>
+                <a:spcPct val="20000"/>
+              </a:spcBef>
+              <a:buFont typeface="Arial" pitchFamily="34" charset="0"/>
+              <a:buNone/>
+              <a:defRPr sz="2400" kern="1200">
+                <a:solidFill>
+                  <a:schemeClr val="tx1">
+                    <a:tint val="75000"/>
+                  </a:schemeClr>
+                </a:solidFill>
+                <a:latin typeface="+mn-lt"/>
+                <a:ea typeface="+mn-ea"/>
+                <a:cs typeface="+mn-cs"/>
+              </a:defRPr>
+            </a:lvl3pPr>
+            <a:lvl4pPr marL="1371600" indent="0" algn="ctr" defTabSz="914400" rtl="0" eaLnBrk="1" latinLnBrk="0" hangingPunct="1">
+              <a:spcBef>
+                <a:spcPct val="20000"/>
+              </a:spcBef>
+              <a:buFont typeface="Arial" pitchFamily="34" charset="0"/>
+              <a:buNone/>
+              <a:defRPr sz="2000" kern="1200">
+                <a:solidFill>
+                  <a:schemeClr val="tx1">
+                    <a:tint val="75000"/>
+                  </a:schemeClr>
+                </a:solidFill>
+                <a:latin typeface="+mn-lt"/>
+                <a:ea typeface="+mn-ea"/>
+                <a:cs typeface="+mn-cs"/>
+              </a:defRPr>
+            </a:lvl4pPr>
+            <a:lvl5pPr marL="1828800" indent="0" algn="ctr" defTabSz="914400" rtl="0" eaLnBrk="1" latinLnBrk="0" hangingPunct="1">
+              <a:spcBef>
+                <a:spcPct val="20000"/>
+              </a:spcBef>
+              <a:buFont typeface="Arial" pitchFamily="34" charset="0"/>
+              <a:buNone/>
+              <a:defRPr sz="2000" kern="1200">
+                <a:solidFill>
+                  <a:schemeClr val="tx1">
+                    <a:tint val="75000"/>
+                  </a:schemeClr>
+                </a:solidFill>
+                <a:latin typeface="+mn-lt"/>
+                <a:ea typeface="+mn-ea"/>
+                <a:cs typeface="+mn-cs"/>
+              </a:defRPr>
+            </a:lvl5pPr>
+            <a:lvl6pPr marL="2286000" indent="0" algn="ctr" defTabSz="914400" rtl="0" eaLnBrk="1" latinLnBrk="0" hangingPunct="1">
+              <a:spcBef>
+                <a:spcPct val="20000"/>
+              </a:spcBef>
+              <a:buFont typeface="Arial" pitchFamily="34" charset="0"/>
+              <a:buNone/>
+              <a:defRPr sz="2000" kern="1200">
+                <a:solidFill>
+                  <a:schemeClr val="tx1">
+                    <a:tint val="75000"/>
+                  </a:schemeClr>
+                </a:solidFill>
+                <a:latin typeface="+mn-lt"/>
+                <a:ea typeface="+mn-ea"/>
+                <a:cs typeface="+mn-cs"/>
+              </a:defRPr>
+            </a:lvl6pPr>
+            <a:lvl7pPr marL="2743200" indent="0" algn="ctr" defTabSz="914400" rtl="0" eaLnBrk="1" latinLnBrk="0" hangingPunct="1">
+              <a:spcBef>
+                <a:spcPct val="20000"/>
+              </a:spcBef>
+              <a:buFont typeface="Arial" pitchFamily="34" charset="0"/>
+              <a:buNone/>
+              <a:defRPr sz="2000" kern="1200">
+                <a:solidFill>
+                  <a:schemeClr val="tx1">
+                    <a:tint val="75000"/>
+                  </a:schemeClr>
+                </a:solidFill>
+                <a:latin typeface="+mn-lt"/>
+                <a:ea typeface="+mn-ea"/>
+                <a:cs typeface="+mn-cs"/>
+              </a:defRPr>
+            </a:lvl7pPr>
+            <a:lvl8pPr marL="3200400" indent="0" algn="ctr" defTabSz="914400" rtl="0" eaLnBrk="1" latinLnBrk="0" hangingPunct="1">
+              <a:spcBef>
+                <a:spcPct val="20000"/>
+              </a:spcBef>
+              <a:buFont typeface="Arial" pitchFamily="34" charset="0"/>
+              <a:buNone/>
+              <a:defRPr sz="2000" kern="1200">
+                <a:solidFill>
+                  <a:schemeClr val="tx1">
+                    <a:tint val="75000"/>
+                  </a:schemeClr>
+                </a:solidFill>
+                <a:latin typeface="+mn-lt"/>
+                <a:ea typeface="+mn-ea"/>
+                <a:cs typeface="+mn-cs"/>
+              </a:defRPr>
+            </a:lvl8pPr>
+            <a:lvl9pPr marL="3657600" indent="0" algn="ctr" defTabSz="914400" rtl="0" eaLnBrk="1" latinLnBrk="0" hangingPunct="1">
+              <a:spcBef>
+                <a:spcPct val="20000"/>
+              </a:spcBef>
+              <a:buFont typeface="Arial" pitchFamily="34" charset="0"/>
+              <a:buNone/>
+              <a:defRPr sz="2000" kern="1200">
+                <a:solidFill>
+                  <a:schemeClr val="tx1">
+                    <a:tint val="75000"/>
+                  </a:schemeClr>
+                </a:solidFill>
+                <a:latin typeface="+mn-lt"/>
+                <a:ea typeface="+mn-ea"/>
+                <a:cs typeface="+mn-cs"/>
+              </a:defRPr>
+            </a:lvl9pPr>
+          </a:lstStyle>
+          <a:p>
+            <a:r>
+              <a:rPr lang="en-US" sz="1600" dirty="0">
+                <a:solidFill>
+                  <a:schemeClr val="tx1"/>
+                </a:solidFill>
+              </a:rPr>
+              <a:t>RIGHT</a:t>
+            </a:r>
+          </a:p>
+        </p:txBody>
+      </p:sp>
+      <p:sp>
+        <p:nvSpPr>
+          <p:cNvPr id="13" name="Right Arrow 12"/>
+          <p:cNvSpPr/>
+          <p:nvPr/>
+        </p:nvSpPr>
+        <p:spPr>
+          <a:xfrm>
+            <a:off x="9637318" y="6391827"/>
+            <a:ext cx="640200" cy="289763"/>
+          </a:xfrm>
+          <a:prstGeom prst="rightArrow">
+            <a:avLst/>
+          </a:prstGeom>
+          <a:solidFill>
+            <a:schemeClr val="tx1"/>
+          </a:solidFill>
+          <a:ln>
+            <a:noFill/>
+          </a:ln>
+        </p:spPr>
+        <p:style>
+          <a:lnRef idx="1">
+            <a:schemeClr val="accent1"/>
+          </a:lnRef>
+          <a:fillRef idx="3">
+            <a:schemeClr val="accent1"/>
+          </a:fillRef>
+          <a:effectRef idx="2">
+            <a:schemeClr val="accent1"/>
+          </a:effectRef>
+          <a:fontRef idx="minor">
+            <a:schemeClr val="lt1"/>
+          </a:fontRef>
+        </p:style>
+        <p:txBody>
+          <a:bodyPr rtlCol="0" anchor="ctr"/>
+          <a:lstStyle/>
+          <a:p>
+            <a:pPr algn="ctr"/>
+            <a:endParaRPr lang="en-US"/>
+          </a:p>
+        </p:txBody>
+      </p:sp>
+      <p:sp>
+        <p:nvSpPr>
+          <p:cNvPr id="22" name="Rectangle 21">
+            <a:extLst>
+              <a:ext uri="{FF2B5EF4-FFF2-40B4-BE49-F238E27FC236}">
+                <a16:creationId xmlns:a16="http://schemas.microsoft.com/office/drawing/2014/main" id="{8AE16CA7-6556-E645-8E2C-3B78486F4571}"/>
+              </a:ext>
+            </a:extLst>
+          </p:cNvPr>
+          <p:cNvSpPr/>
+          <p:nvPr/>
+        </p:nvSpPr>
+        <p:spPr>
+          <a:xfrm>
+            <a:off x="6502401" y="3255385"/>
+            <a:ext cx="495300" cy="279400"/>
+          </a:xfrm>
+          <a:prstGeom prst="rect">
+            <a:avLst/>
+          </a:prstGeom>
+          <a:solidFill>
+            <a:schemeClr val="bg1"/>
+          </a:solidFill>
+          <a:ln>
+            <a:noFill/>
+          </a:ln>
+        </p:spPr>
+        <p:style>
+          <a:lnRef idx="2">
+            <a:schemeClr val="accent1">
+              <a:shade val="50000"/>
+            </a:schemeClr>
+          </a:lnRef>
+          <a:fillRef idx="1">
+            <a:schemeClr val="accent1"/>
+          </a:fillRef>
+          <a:effectRef idx="0">
+            <a:schemeClr val="accent1"/>
+          </a:effectRef>
+          <a:fontRef idx="minor">
+            <a:schemeClr val="lt1"/>
+          </a:fontRef>
+        </p:style>
+        <p:txBody>
+          <a:bodyPr rtlCol="0" anchor="ctr"/>
+          <a:lstStyle/>
+          <a:p>
+            <a:pPr algn="ctr"/>
+            <a:endParaRPr lang="en-US"/>
           </a:p>
         </p:txBody>
       </p:sp>
     </p:spTree>
     <p:extLst>
       <p:ext uri="{BB962C8B-B14F-4D97-AF65-F5344CB8AC3E}">
-        <p14:creationId xmlns:p14="http://schemas.microsoft.com/office/powerpoint/2010/main" val="3634238876"/>
+        <p14:creationId xmlns:p14="http://schemas.microsoft.com/office/powerpoint/2010/main" val="758451698"/>
       </p:ext>
     </p:extLst>
   </p:cSld>
@@ -13913,6 +14293,109 @@
       </p:grpSpPr>
       <p:sp>
         <p:nvSpPr>
+          <p:cNvPr id="3" name="Content Placeholder 2"/>
+          <p:cNvSpPr>
+            <a:spLocks noGrp="1"/>
+          </p:cNvSpPr>
+          <p:nvPr>
+            <p:ph idx="1"/>
+          </p:nvPr>
+        </p:nvSpPr>
+        <p:spPr>
+          <a:xfrm>
+            <a:off x="457200" y="860451"/>
+            <a:ext cx="11214100" cy="5013227"/>
+          </a:xfrm>
+          <a:ln>
+            <a:noFill/>
+          </a:ln>
+        </p:spPr>
+        <p:txBody>
+          <a:bodyPr>
+            <a:noAutofit/>
+          </a:bodyPr>
+          <a:lstStyle/>
+          <a:p>
+            <a:pPr marL="0" indent="0" algn="ctr">
+              <a:buNone/>
+            </a:pPr>
+            <a:r>
+              <a:rPr lang="en-US" dirty="0"/>
+              <a:t>Good Job!</a:t>
+            </a:r>
+          </a:p>
+          <a:p>
+            <a:pPr marL="0" indent="0" algn="ctr">
+              <a:buNone/>
+            </a:pPr>
+            <a:endParaRPr lang="en-US" dirty="0"/>
+          </a:p>
+          <a:p>
+            <a:pPr marL="0" indent="0" algn="ctr">
+              <a:buNone/>
+            </a:pPr>
+            <a:r>
+              <a:rPr lang="en-US" dirty="0"/>
+              <a:t>Now you know how to play this game.</a:t>
+            </a:r>
+          </a:p>
+          <a:p>
+            <a:pPr marL="0" indent="0" algn="ctr">
+              <a:buNone/>
+            </a:pPr>
+            <a:endParaRPr lang="en-US" dirty="0"/>
+          </a:p>
+          <a:p>
+            <a:pPr marL="0" indent="0" algn="ctr">
+              <a:buNone/>
+            </a:pPr>
+            <a:r>
+              <a:rPr lang="en-US" dirty="0"/>
+              <a:t>Once you are ready to start playing the  actual game to win points, please press the RIGHT BUTTON.</a:t>
+            </a:r>
+          </a:p>
+        </p:txBody>
+      </p:sp>
+    </p:spTree>
+    <p:extLst>
+      <p:ext uri="{BB962C8B-B14F-4D97-AF65-F5344CB8AC3E}">
+        <p14:creationId xmlns:p14="http://schemas.microsoft.com/office/powerpoint/2010/main" val="3634238876"/>
+      </p:ext>
+    </p:extLst>
+  </p:cSld>
+  <p:clrMapOvr>
+    <a:masterClrMapping/>
+  </p:clrMapOvr>
+</p:sld>
+</file>
+
+<file path=ppt/slides/slide24.xml><?xml version="1.0" encoding="utf-8"?>
+<p:sld xmlns:a="http://schemas.openxmlformats.org/drawingml/2006/main" xmlns:r="http://schemas.openxmlformats.org/officeDocument/2006/relationships" xmlns:p="http://schemas.openxmlformats.org/presentationml/2006/main">
+  <p:cSld>
+    <p:bg>
+      <p:bgPr>
+        <a:solidFill>
+          <a:schemeClr val="bg1"/>
+        </a:solidFill>
+        <a:effectLst/>
+      </p:bgPr>
+    </p:bg>
+    <p:spTree>
+      <p:nvGrpSpPr>
+        <p:cNvPr id="1" name=""/>
+        <p:cNvGrpSpPr/>
+        <p:nvPr/>
+      </p:nvGrpSpPr>
+      <p:grpSpPr>
+        <a:xfrm>
+          <a:off x="0" y="0"/>
+          <a:ext cx="0" cy="0"/>
+          <a:chOff x="0" y="0"/>
+          <a:chExt cx="0" cy="0"/>
+        </a:xfrm>
+      </p:grpSpPr>
+      <p:sp>
+        <p:nvSpPr>
           <p:cNvPr id="4" name="Title 3"/>
           <p:cNvSpPr>
             <a:spLocks noGrp="1"/>
@@ -14300,7 +14783,7 @@
 </p:sld>
 </file>
 
-<file path=ppt/slides/slide24.xml><?xml version="1.0" encoding="utf-8"?>
+<file path=ppt/slides/slide25.xml><?xml version="1.0" encoding="utf-8"?>
 <p:sld xmlns:a="http://schemas.openxmlformats.org/drawingml/2006/main" xmlns:r="http://schemas.openxmlformats.org/officeDocument/2006/relationships" xmlns:p="http://schemas.openxmlformats.org/presentationml/2006/main">
   <p:cSld>
     <p:bg>

</xml_diff>

<commit_message>
changed points in horzion task for 1000 points = 10 cents for vanderbelt study
</commit_message>
<xml_diff>
--- a/public/js/tasks/horizon/media/horizonInstructions_RSS.pptx
+++ b/public/js/tasks/horizon/media/horizonInstructions_RSS.pptx
@@ -5,7 +5,7 @@
     <p:sldMasterId id="2147483660" r:id="rId1"/>
   </p:sldMasterIdLst>
   <p:notesMasterIdLst>
-    <p:notesMasterId r:id="rId27"/>
+    <p:notesMasterId r:id="rId28"/>
   </p:notesMasterIdLst>
   <p:sldIdLst>
     <p:sldId id="498" r:id="rId2"/>
@@ -29,10 +29,11 @@
     <p:sldId id="528" r:id="rId20"/>
     <p:sldId id="529" r:id="rId21"/>
     <p:sldId id="534" r:id="rId22"/>
-    <p:sldId id="530" r:id="rId23"/>
-    <p:sldId id="531" r:id="rId24"/>
-    <p:sldId id="532" r:id="rId25"/>
-    <p:sldId id="533" r:id="rId26"/>
+    <p:sldId id="535" r:id="rId23"/>
+    <p:sldId id="530" r:id="rId24"/>
+    <p:sldId id="531" r:id="rId25"/>
+    <p:sldId id="532" r:id="rId26"/>
+    <p:sldId id="533" r:id="rId27"/>
   </p:sldIdLst>
   <p:sldSz cx="12192000" cy="6858000"/>
   <p:notesSz cx="6858000" cy="9144000"/>
@@ -157,6 +158,7 @@
             <p14:sldId id="528"/>
             <p14:sldId id="529"/>
             <p14:sldId id="534"/>
+            <p14:sldId id="535"/>
             <p14:sldId id="530"/>
             <p14:sldId id="531"/>
           </p14:sldIdLst>
@@ -269,7 +271,7 @@
           <a:p>
             <a:fld id="{5ACDFB13-8C7E-2148-B293-047F9641DD71}" type="datetimeFigureOut">
               <a:rPr lang="en-US" smtClean="0"/>
-              <a:t>10/29/20</a:t>
+              <a:t>11/3/20</a:t>
             </a:fld>
             <a:endParaRPr lang="en-US" dirty="0"/>
           </a:p>
@@ -1935,6 +1937,14 @@
           <a:bodyPr/>
           <a:lstStyle/>
           <a:p>
+            <a:r>
+              <a:rPr lang="en-US" dirty="0"/>
+              <a:t>Add screenshots of an X and an O</a:t>
+            </a:r>
+            <a:r>
+              <a:rPr lang="en-US" baseline="0" dirty="0"/>
+              <a:t> screen – like a timeline of screenshots.</a:t>
+            </a:r>
             <a:endParaRPr lang="en-US" dirty="0"/>
           </a:p>
         </p:txBody>
@@ -1965,7 +1975,7 @@
     </p:spTree>
     <p:extLst>
       <p:ext uri="{BB962C8B-B14F-4D97-AF65-F5344CB8AC3E}">
-        <p14:creationId xmlns:p14="http://schemas.microsoft.com/office/powerpoint/2010/main" val="3186647101"/>
+        <p14:creationId xmlns:p14="http://schemas.microsoft.com/office/powerpoint/2010/main" val="429599464"/>
       </p:ext>
     </p:extLst>
   </p:cSld>
@@ -2054,7 +2064,7 @@
     </p:spTree>
     <p:extLst>
       <p:ext uri="{BB962C8B-B14F-4D97-AF65-F5344CB8AC3E}">
-        <p14:creationId xmlns:p14="http://schemas.microsoft.com/office/powerpoint/2010/main" val="3781381945"/>
+        <p14:creationId xmlns:p14="http://schemas.microsoft.com/office/powerpoint/2010/main" val="3186647101"/>
       </p:ext>
     </p:extLst>
   </p:cSld>
@@ -2113,14 +2123,6 @@
           <a:bodyPr/>
           <a:lstStyle/>
           <a:p>
-            <a:r>
-              <a:rPr lang="en-US" dirty="0"/>
-              <a:t>Outside</a:t>
-            </a:r>
-            <a:r>
-              <a:rPr lang="en-US" baseline="0" dirty="0"/>
-              <a:t> the scanner</a:t>
-            </a:r>
             <a:endParaRPr lang="en-US" dirty="0"/>
           </a:p>
         </p:txBody>
@@ -2151,7 +2153,7 @@
     </p:spTree>
     <p:extLst>
       <p:ext uri="{BB962C8B-B14F-4D97-AF65-F5344CB8AC3E}">
-        <p14:creationId xmlns:p14="http://schemas.microsoft.com/office/powerpoint/2010/main" val="2080840416"/>
+        <p14:creationId xmlns:p14="http://schemas.microsoft.com/office/powerpoint/2010/main" val="3781381945"/>
       </p:ext>
     </p:extLst>
   </p:cSld>
@@ -2210,6 +2212,14 @@
           <a:bodyPr/>
           <a:lstStyle/>
           <a:p>
+            <a:r>
+              <a:rPr lang="en-US" dirty="0"/>
+              <a:t>Outside</a:t>
+            </a:r>
+            <a:r>
+              <a:rPr lang="en-US" baseline="0" dirty="0"/>
+              <a:t> the scanner</a:t>
+            </a:r>
             <a:endParaRPr lang="en-US" dirty="0"/>
           </a:p>
         </p:txBody>
@@ -2232,6 +2242,95 @@
             <a:fld id="{BCAE12D7-AE97-9243-8341-9A20FCA5A307}" type="slidenum">
               <a:rPr lang="en-US" smtClean="0"/>
               <a:t>25</a:t>
+            </a:fld>
+            <a:endParaRPr lang="en-US"/>
+          </a:p>
+        </p:txBody>
+      </p:sp>
+    </p:spTree>
+    <p:extLst>
+      <p:ext uri="{BB962C8B-B14F-4D97-AF65-F5344CB8AC3E}">
+        <p14:creationId xmlns:p14="http://schemas.microsoft.com/office/powerpoint/2010/main" val="2080840416"/>
+      </p:ext>
+    </p:extLst>
+  </p:cSld>
+  <p:clrMapOvr>
+    <a:masterClrMapping/>
+  </p:clrMapOvr>
+</p:notes>
+</file>
+
+<file path=ppt/notesSlides/notesSlide26.xml><?xml version="1.0" encoding="utf-8"?>
+<p:notes xmlns:a="http://schemas.openxmlformats.org/drawingml/2006/main" xmlns:r="http://schemas.openxmlformats.org/officeDocument/2006/relationships" xmlns:p="http://schemas.openxmlformats.org/presentationml/2006/main">
+  <p:cSld>
+    <p:spTree>
+      <p:nvGrpSpPr>
+        <p:cNvPr id="1" name=""/>
+        <p:cNvGrpSpPr/>
+        <p:nvPr/>
+      </p:nvGrpSpPr>
+      <p:grpSpPr>
+        <a:xfrm>
+          <a:off x="0" y="0"/>
+          <a:ext cx="0" cy="0"/>
+          <a:chOff x="0" y="0"/>
+          <a:chExt cx="0" cy="0"/>
+        </a:xfrm>
+      </p:grpSpPr>
+      <p:sp>
+        <p:nvSpPr>
+          <p:cNvPr id="2" name="Slide Image Placeholder 1"/>
+          <p:cNvSpPr>
+            <a:spLocks noGrp="1" noRot="1" noChangeAspect="1"/>
+          </p:cNvSpPr>
+          <p:nvPr>
+            <p:ph type="sldImg"/>
+          </p:nvPr>
+        </p:nvSpPr>
+        <p:spPr>
+          <a:xfrm>
+            <a:off x="381000" y="685800"/>
+            <a:ext cx="6096000" cy="3429000"/>
+          </a:xfrm>
+        </p:spPr>
+      </p:sp>
+      <p:sp>
+        <p:nvSpPr>
+          <p:cNvPr id="3" name="Notes Placeholder 2"/>
+          <p:cNvSpPr>
+            <a:spLocks noGrp="1"/>
+          </p:cNvSpPr>
+          <p:nvPr>
+            <p:ph type="body" idx="1"/>
+          </p:nvPr>
+        </p:nvSpPr>
+        <p:spPr/>
+        <p:txBody>
+          <a:bodyPr/>
+          <a:lstStyle/>
+          <a:p>
+            <a:endParaRPr lang="en-US" dirty="0"/>
+          </a:p>
+        </p:txBody>
+      </p:sp>
+      <p:sp>
+        <p:nvSpPr>
+          <p:cNvPr id="4" name="Slide Number Placeholder 3"/>
+          <p:cNvSpPr>
+            <a:spLocks noGrp="1"/>
+          </p:cNvSpPr>
+          <p:nvPr>
+            <p:ph type="sldNum" sz="quarter" idx="10"/>
+          </p:nvPr>
+        </p:nvSpPr>
+        <p:spPr/>
+        <p:txBody>
+          <a:bodyPr/>
+          <a:lstStyle/>
+          <a:p>
+            <a:fld id="{BCAE12D7-AE97-9243-8341-9A20FCA5A307}" type="slidenum">
+              <a:rPr lang="en-US" smtClean="0"/>
+              <a:t>26</a:t>
             </a:fld>
             <a:endParaRPr lang="en-US"/>
           </a:p>
@@ -3108,7 +3207,7 @@
           <a:p>
             <a:fld id="{E69A4D3A-6EF8-7448-AC6F-AD52FEDAA6A8}" type="datetimeFigureOut">
               <a:rPr lang="en-US" smtClean="0"/>
-              <a:t>10/29/20</a:t>
+              <a:t>11/3/20</a:t>
             </a:fld>
             <a:endParaRPr lang="en-US" dirty="0"/>
           </a:p>
@@ -3276,7 +3375,7 @@
           <a:p>
             <a:fld id="{E69A4D3A-6EF8-7448-AC6F-AD52FEDAA6A8}" type="datetimeFigureOut">
               <a:rPr lang="en-US" smtClean="0"/>
-              <a:t>10/29/20</a:t>
+              <a:t>11/3/20</a:t>
             </a:fld>
             <a:endParaRPr lang="en-US" dirty="0"/>
           </a:p>
@@ -3454,7 +3553,7 @@
           <a:p>
             <a:fld id="{E69A4D3A-6EF8-7448-AC6F-AD52FEDAA6A8}" type="datetimeFigureOut">
               <a:rPr lang="en-US" smtClean="0"/>
-              <a:t>10/29/20</a:t>
+              <a:t>11/3/20</a:t>
             </a:fld>
             <a:endParaRPr lang="en-US" dirty="0"/>
           </a:p>
@@ -3622,7 +3721,7 @@
           <a:p>
             <a:fld id="{E69A4D3A-6EF8-7448-AC6F-AD52FEDAA6A8}" type="datetimeFigureOut">
               <a:rPr lang="en-US" smtClean="0"/>
-              <a:t>10/29/20</a:t>
+              <a:t>11/3/20</a:t>
             </a:fld>
             <a:endParaRPr lang="en-US" dirty="0"/>
           </a:p>
@@ -3867,7 +3966,7 @@
           <a:p>
             <a:fld id="{E69A4D3A-6EF8-7448-AC6F-AD52FEDAA6A8}" type="datetimeFigureOut">
               <a:rPr lang="en-US" smtClean="0"/>
-              <a:t>10/29/20</a:t>
+              <a:t>11/3/20</a:t>
             </a:fld>
             <a:endParaRPr lang="en-US" dirty="0"/>
           </a:p>
@@ -4152,7 +4251,7 @@
           <a:p>
             <a:fld id="{E69A4D3A-6EF8-7448-AC6F-AD52FEDAA6A8}" type="datetimeFigureOut">
               <a:rPr lang="en-US" smtClean="0"/>
-              <a:t>10/29/20</a:t>
+              <a:t>11/3/20</a:t>
             </a:fld>
             <a:endParaRPr lang="en-US" dirty="0"/>
           </a:p>
@@ -4571,7 +4670,7 @@
           <a:p>
             <a:fld id="{E69A4D3A-6EF8-7448-AC6F-AD52FEDAA6A8}" type="datetimeFigureOut">
               <a:rPr lang="en-US" smtClean="0"/>
-              <a:t>10/29/20</a:t>
+              <a:t>11/3/20</a:t>
             </a:fld>
             <a:endParaRPr lang="en-US" dirty="0"/>
           </a:p>
@@ -4688,7 +4787,7 @@
           <a:p>
             <a:fld id="{E69A4D3A-6EF8-7448-AC6F-AD52FEDAA6A8}" type="datetimeFigureOut">
               <a:rPr lang="en-US" smtClean="0"/>
-              <a:t>10/29/20</a:t>
+              <a:t>11/3/20</a:t>
             </a:fld>
             <a:endParaRPr lang="en-US" dirty="0"/>
           </a:p>
@@ -4783,7 +4882,7 @@
           <a:p>
             <a:fld id="{E69A4D3A-6EF8-7448-AC6F-AD52FEDAA6A8}" type="datetimeFigureOut">
               <a:rPr lang="en-US" smtClean="0"/>
-              <a:t>10/29/20</a:t>
+              <a:t>11/3/20</a:t>
             </a:fld>
             <a:endParaRPr lang="en-US" dirty="0"/>
           </a:p>
@@ -5058,7 +5157,7 @@
           <a:p>
             <a:fld id="{E69A4D3A-6EF8-7448-AC6F-AD52FEDAA6A8}" type="datetimeFigureOut">
               <a:rPr lang="en-US" smtClean="0"/>
-              <a:t>10/29/20</a:t>
+              <a:t>11/3/20</a:t>
             </a:fld>
             <a:endParaRPr lang="en-US" dirty="0"/>
           </a:p>
@@ -5313,7 +5412,7 @@
           <a:p>
             <a:fld id="{E69A4D3A-6EF8-7448-AC6F-AD52FEDAA6A8}" type="datetimeFigureOut">
               <a:rPr lang="en-US" smtClean="0"/>
-              <a:t>10/29/20</a:t>
+              <a:t>11/3/20</a:t>
             </a:fld>
             <a:endParaRPr lang="en-US" dirty="0"/>
           </a:p>
@@ -5527,7 +5626,7 @@
           <a:p>
             <a:fld id="{E69A4D3A-6EF8-7448-AC6F-AD52FEDAA6A8}" type="datetimeFigureOut">
               <a:rPr lang="en-US" smtClean="0"/>
-              <a:t>10/29/20</a:t>
+              <a:t>11/3/20</a:t>
             </a:fld>
             <a:endParaRPr lang="en-US" dirty="0"/>
           </a:p>
@@ -13851,8 +13950,8 @@
         </p:nvSpPr>
         <p:spPr>
           <a:xfrm>
-            <a:off x="457200" y="473173"/>
-            <a:ext cx="11214100" cy="1662164"/>
+            <a:off x="457200" y="473172"/>
+            <a:ext cx="11214100" cy="3298728"/>
           </a:xfrm>
           <a:ln>
             <a:noFill/>
@@ -13864,12 +13963,21 @@
           </a:bodyPr>
           <a:lstStyle/>
           <a:p>
+            <a:pPr marL="0" indent="0">
+              <a:buNone/>
+            </a:pPr>
+            <a:r>
+              <a:rPr lang="en-US" dirty="0"/>
+              <a:t>You will receive payment based on the number of points  you win.</a:t>
+            </a:r>
+          </a:p>
+          <a:p>
             <a:pPr marL="0" indent="0" algn="ctr">
               <a:buNone/>
             </a:pPr>
             <a:r>
               <a:rPr lang="en-US" dirty="0"/>
-              <a:t>So to be sure that everything makes sense let’s work through a few example games.</a:t>
+              <a:t>For every 1000 points you win, you will receive 10 cents.</a:t>
             </a:r>
           </a:p>
           <a:p>
@@ -13889,33 +13997,8 @@
               <a:buNone/>
             </a:pPr>
             <a:r>
-              <a:rPr lang="en-US" dirty="0"/>
-              <a:t>Press the </a:t>
-            </a:r>
-            <a:r>
-              <a:rPr lang="en-US" b="1" dirty="0"/>
-              <a:t>&lt;</a:t>
-            </a:r>
-            <a:r>
-              <a:rPr lang="en-US" dirty="0"/>
-              <a:t> BUTTON to play the left slot machine.</a:t>
-            </a:r>
-          </a:p>
-          <a:p>
-            <a:pPr marL="0" indent="0" algn="ctr">
-              <a:buNone/>
-            </a:pPr>
-            <a:r>
-              <a:rPr lang="en-US" dirty="0"/>
-              <a:t>Press the </a:t>
-            </a:r>
-            <a:r>
-              <a:rPr lang="en-US" b="1" dirty="0"/>
-              <a:t>&gt;</a:t>
-            </a:r>
-            <a:r>
-              <a:rPr lang="en-US" dirty="0"/>
-              <a:t> BUTTON to play the right slot machine.</a:t>
+              <a:rPr lang="en-US" sz="3600" b="1" dirty="0"/>
+              <a:t>1000 points = 10 cents</a:t>
             </a:r>
           </a:p>
         </p:txBody>
@@ -14201,62 +14284,10 @@
           </a:p>
         </p:txBody>
       </p:sp>
-      <p:sp>
-        <p:nvSpPr>
-          <p:cNvPr id="22" name="Rectangle 21">
-            <a:extLst>
-              <a:ext uri="{FF2B5EF4-FFF2-40B4-BE49-F238E27FC236}">
-                <a16:creationId xmlns:a16="http://schemas.microsoft.com/office/drawing/2014/main" id="{8AE16CA7-6556-E645-8E2C-3B78486F4571}"/>
-              </a:ext>
-            </a:extLst>
-          </p:cNvPr>
-          <p:cNvSpPr/>
-          <p:nvPr/>
-        </p:nvSpPr>
-        <p:spPr>
-          <a:xfrm>
-            <a:off x="6502401" y="3255385"/>
-            <a:ext cx="495300" cy="279400"/>
-          </a:xfrm>
-          <a:prstGeom prst="rect">
-            <a:avLst/>
-          </a:prstGeom>
-          <a:solidFill>
-            <a:schemeClr val="bg1"/>
-          </a:solidFill>
-          <a:ln>
-            <a:noFill/>
-          </a:ln>
-        </p:spPr>
-        <p:style>
-          <a:lnRef idx="2">
-            <a:schemeClr val="accent1">
-              <a:shade val="50000"/>
-            </a:schemeClr>
-          </a:lnRef>
-          <a:fillRef idx="1">
-            <a:schemeClr val="accent1"/>
-          </a:fillRef>
-          <a:effectRef idx="0">
-            <a:schemeClr val="accent1"/>
-          </a:effectRef>
-          <a:fontRef idx="minor">
-            <a:schemeClr val="lt1"/>
-          </a:fontRef>
-        </p:style>
-        <p:txBody>
-          <a:bodyPr rtlCol="0" anchor="ctr"/>
-          <a:lstStyle/>
-          <a:p>
-            <a:pPr algn="ctr"/>
-            <a:endParaRPr lang="en-US"/>
-          </a:p>
-        </p:txBody>
-      </p:sp>
     </p:spTree>
     <p:extLst>
       <p:ext uri="{BB962C8B-B14F-4D97-AF65-F5344CB8AC3E}">
-        <p14:creationId xmlns:p14="http://schemas.microsoft.com/office/powerpoint/2010/main" val="758451698"/>
+        <p14:creationId xmlns:p14="http://schemas.microsoft.com/office/powerpoint/2010/main" val="1496369590"/>
       </p:ext>
     </p:extLst>
   </p:cSld>
@@ -14303,8 +14334,8 @@
         </p:nvSpPr>
         <p:spPr>
           <a:xfrm>
-            <a:off x="457200" y="860451"/>
-            <a:ext cx="11214100" cy="5013227"/>
+            <a:off x="457200" y="473173"/>
+            <a:ext cx="11214100" cy="1662164"/>
           </a:xfrm>
           <a:ln>
             <a:noFill/>
@@ -14321,7 +14352,7 @@
             </a:pPr>
             <a:r>
               <a:rPr lang="en-US" dirty="0"/>
-              <a:t>Good Job!</a:t>
+              <a:t>So to be sure that everything makes sense let’s work through a few example games.</a:t>
             </a:r>
           </a:p>
           <a:p>
@@ -14334,32 +14365,381 @@
             <a:pPr marL="0" indent="0" algn="ctr">
               <a:buNone/>
             </a:pPr>
+            <a:endParaRPr lang="en-US" dirty="0"/>
+          </a:p>
+          <a:p>
+            <a:pPr marL="0" indent="0" algn="ctr">
+              <a:buNone/>
+            </a:pPr>
             <a:r>
               <a:rPr lang="en-US" dirty="0"/>
-              <a:t>Now you know how to play this game.</a:t>
+              <a:t>Press the </a:t>
+            </a:r>
+            <a:r>
+              <a:rPr lang="en-US" b="1" dirty="0"/>
+              <a:t>&lt;</a:t>
+            </a:r>
+            <a:r>
+              <a:rPr lang="en-US" dirty="0"/>
+              <a:t> BUTTON to play the left slot machine.</a:t>
             </a:r>
           </a:p>
           <a:p>
             <a:pPr marL="0" indent="0" algn="ctr">
               <a:buNone/>
             </a:pPr>
-            <a:endParaRPr lang="en-US" dirty="0"/>
-          </a:p>
-          <a:p>
-            <a:pPr marL="0" indent="0" algn="ctr">
-              <a:buNone/>
-            </a:pPr>
             <a:r>
               <a:rPr lang="en-US" dirty="0"/>
-              <a:t>Once you are ready to start playing the  actual game to win points, please press the RIGHT BUTTON.</a:t>
-            </a:r>
+              <a:t>Press the </a:t>
+            </a:r>
+            <a:r>
+              <a:rPr lang="en-US" b="1" dirty="0"/>
+              <a:t>&gt;</a:t>
+            </a:r>
+            <a:r>
+              <a:rPr lang="en-US" dirty="0"/>
+              <a:t> BUTTON to play the right slot machine.</a:t>
+            </a:r>
+          </a:p>
+        </p:txBody>
+      </p:sp>
+      <p:sp>
+        <p:nvSpPr>
+          <p:cNvPr id="26" name="Title 3"/>
+          <p:cNvSpPr txBox="1">
+            <a:spLocks/>
+          </p:cNvSpPr>
+          <p:nvPr/>
+        </p:nvSpPr>
+        <p:spPr>
+          <a:xfrm>
+            <a:off x="1524000" y="6201295"/>
+            <a:ext cx="9149174" cy="656705"/>
+          </a:xfrm>
+          <a:prstGeom prst="rect">
+            <a:avLst/>
+          </a:prstGeom>
+        </p:spPr>
+        <p:txBody>
+          <a:bodyPr vert="horz" lIns="91440" tIns="45720" rIns="91440" bIns="45720" rtlCol="0" anchor="ctr">
+            <a:normAutofit/>
+          </a:bodyPr>
+          <a:lstStyle>
+            <a:lvl1pPr algn="ctr" defTabSz="914400" rtl="0" eaLnBrk="1" latinLnBrk="0" hangingPunct="1">
+              <a:spcBef>
+                <a:spcPct val="0"/>
+              </a:spcBef>
+              <a:buNone/>
+              <a:defRPr sz="4400" kern="1200">
+                <a:solidFill>
+                  <a:schemeClr val="tx1"/>
+                </a:solidFill>
+                <a:latin typeface="+mj-lt"/>
+                <a:ea typeface="+mj-ea"/>
+                <a:cs typeface="+mj-cs"/>
+              </a:defRPr>
+            </a:lvl1pPr>
+          </a:lstStyle>
+          <a:p>
+            <a:r>
+              <a:rPr lang="en-US" sz="3000" dirty="0">
+                <a:solidFill>
+                  <a:srgbClr val="FF0000"/>
+                </a:solidFill>
+              </a:rPr>
+              <a:t>PRESS THE RIGHT BUTTON TO CONTINUE</a:t>
+            </a:r>
+          </a:p>
+        </p:txBody>
+      </p:sp>
+      <p:sp>
+        <p:nvSpPr>
+          <p:cNvPr id="12" name="Subtitle 8"/>
+          <p:cNvSpPr txBox="1">
+            <a:spLocks/>
+          </p:cNvSpPr>
+          <p:nvPr/>
+        </p:nvSpPr>
+        <p:spPr>
+          <a:xfrm>
+            <a:off x="9140345" y="6073844"/>
+            <a:ext cx="1532830" cy="801636"/>
+          </a:xfrm>
+          <a:prstGeom prst="rect">
+            <a:avLst/>
+          </a:prstGeom>
+        </p:spPr>
+        <p:txBody>
+          <a:bodyPr vert="horz" lIns="91440" tIns="45720" rIns="91440" bIns="45720" rtlCol="0">
+            <a:normAutofit/>
+          </a:bodyPr>
+          <a:lstStyle>
+            <a:lvl1pPr marL="0" indent="0" algn="ctr" defTabSz="914400" rtl="0" eaLnBrk="1" latinLnBrk="0" hangingPunct="1">
+              <a:spcBef>
+                <a:spcPct val="20000"/>
+              </a:spcBef>
+              <a:buFont typeface="Arial" pitchFamily="34" charset="0"/>
+              <a:buNone/>
+              <a:defRPr sz="3200" kern="1200">
+                <a:solidFill>
+                  <a:schemeClr val="tx1">
+                    <a:tint val="75000"/>
+                  </a:schemeClr>
+                </a:solidFill>
+                <a:latin typeface="+mn-lt"/>
+                <a:ea typeface="+mn-ea"/>
+                <a:cs typeface="+mn-cs"/>
+              </a:defRPr>
+            </a:lvl1pPr>
+            <a:lvl2pPr marL="457200" indent="0" algn="ctr" defTabSz="914400" rtl="0" eaLnBrk="1" latinLnBrk="0" hangingPunct="1">
+              <a:spcBef>
+                <a:spcPct val="20000"/>
+              </a:spcBef>
+              <a:buFont typeface="Arial" pitchFamily="34" charset="0"/>
+              <a:buNone/>
+              <a:defRPr sz="2800" kern="1200">
+                <a:solidFill>
+                  <a:schemeClr val="tx1">
+                    <a:tint val="75000"/>
+                  </a:schemeClr>
+                </a:solidFill>
+                <a:latin typeface="+mn-lt"/>
+                <a:ea typeface="+mn-ea"/>
+                <a:cs typeface="+mn-cs"/>
+              </a:defRPr>
+            </a:lvl2pPr>
+            <a:lvl3pPr marL="914400" indent="0" algn="ctr" defTabSz="914400" rtl="0" eaLnBrk="1" latinLnBrk="0" hangingPunct="1">
+              <a:spcBef>
+                <a:spcPct val="20000"/>
+              </a:spcBef>
+              <a:buFont typeface="Arial" pitchFamily="34" charset="0"/>
+              <a:buNone/>
+              <a:defRPr sz="2400" kern="1200">
+                <a:solidFill>
+                  <a:schemeClr val="tx1">
+                    <a:tint val="75000"/>
+                  </a:schemeClr>
+                </a:solidFill>
+                <a:latin typeface="+mn-lt"/>
+                <a:ea typeface="+mn-ea"/>
+                <a:cs typeface="+mn-cs"/>
+              </a:defRPr>
+            </a:lvl3pPr>
+            <a:lvl4pPr marL="1371600" indent="0" algn="ctr" defTabSz="914400" rtl="0" eaLnBrk="1" latinLnBrk="0" hangingPunct="1">
+              <a:spcBef>
+                <a:spcPct val="20000"/>
+              </a:spcBef>
+              <a:buFont typeface="Arial" pitchFamily="34" charset="0"/>
+              <a:buNone/>
+              <a:defRPr sz="2000" kern="1200">
+                <a:solidFill>
+                  <a:schemeClr val="tx1">
+                    <a:tint val="75000"/>
+                  </a:schemeClr>
+                </a:solidFill>
+                <a:latin typeface="+mn-lt"/>
+                <a:ea typeface="+mn-ea"/>
+                <a:cs typeface="+mn-cs"/>
+              </a:defRPr>
+            </a:lvl4pPr>
+            <a:lvl5pPr marL="1828800" indent="0" algn="ctr" defTabSz="914400" rtl="0" eaLnBrk="1" latinLnBrk="0" hangingPunct="1">
+              <a:spcBef>
+                <a:spcPct val="20000"/>
+              </a:spcBef>
+              <a:buFont typeface="Arial" pitchFamily="34" charset="0"/>
+              <a:buNone/>
+              <a:defRPr sz="2000" kern="1200">
+                <a:solidFill>
+                  <a:schemeClr val="tx1">
+                    <a:tint val="75000"/>
+                  </a:schemeClr>
+                </a:solidFill>
+                <a:latin typeface="+mn-lt"/>
+                <a:ea typeface="+mn-ea"/>
+                <a:cs typeface="+mn-cs"/>
+              </a:defRPr>
+            </a:lvl5pPr>
+            <a:lvl6pPr marL="2286000" indent="0" algn="ctr" defTabSz="914400" rtl="0" eaLnBrk="1" latinLnBrk="0" hangingPunct="1">
+              <a:spcBef>
+                <a:spcPct val="20000"/>
+              </a:spcBef>
+              <a:buFont typeface="Arial" pitchFamily="34" charset="0"/>
+              <a:buNone/>
+              <a:defRPr sz="2000" kern="1200">
+                <a:solidFill>
+                  <a:schemeClr val="tx1">
+                    <a:tint val="75000"/>
+                  </a:schemeClr>
+                </a:solidFill>
+                <a:latin typeface="+mn-lt"/>
+                <a:ea typeface="+mn-ea"/>
+                <a:cs typeface="+mn-cs"/>
+              </a:defRPr>
+            </a:lvl6pPr>
+            <a:lvl7pPr marL="2743200" indent="0" algn="ctr" defTabSz="914400" rtl="0" eaLnBrk="1" latinLnBrk="0" hangingPunct="1">
+              <a:spcBef>
+                <a:spcPct val="20000"/>
+              </a:spcBef>
+              <a:buFont typeface="Arial" pitchFamily="34" charset="0"/>
+              <a:buNone/>
+              <a:defRPr sz="2000" kern="1200">
+                <a:solidFill>
+                  <a:schemeClr val="tx1">
+                    <a:tint val="75000"/>
+                  </a:schemeClr>
+                </a:solidFill>
+                <a:latin typeface="+mn-lt"/>
+                <a:ea typeface="+mn-ea"/>
+                <a:cs typeface="+mn-cs"/>
+              </a:defRPr>
+            </a:lvl7pPr>
+            <a:lvl8pPr marL="3200400" indent="0" algn="ctr" defTabSz="914400" rtl="0" eaLnBrk="1" latinLnBrk="0" hangingPunct="1">
+              <a:spcBef>
+                <a:spcPct val="20000"/>
+              </a:spcBef>
+              <a:buFont typeface="Arial" pitchFamily="34" charset="0"/>
+              <a:buNone/>
+              <a:defRPr sz="2000" kern="1200">
+                <a:solidFill>
+                  <a:schemeClr val="tx1">
+                    <a:tint val="75000"/>
+                  </a:schemeClr>
+                </a:solidFill>
+                <a:latin typeface="+mn-lt"/>
+                <a:ea typeface="+mn-ea"/>
+                <a:cs typeface="+mn-cs"/>
+              </a:defRPr>
+            </a:lvl8pPr>
+            <a:lvl9pPr marL="3657600" indent="0" algn="ctr" defTabSz="914400" rtl="0" eaLnBrk="1" latinLnBrk="0" hangingPunct="1">
+              <a:spcBef>
+                <a:spcPct val="20000"/>
+              </a:spcBef>
+              <a:buFont typeface="Arial" pitchFamily="34" charset="0"/>
+              <a:buNone/>
+              <a:defRPr sz="2000" kern="1200">
+                <a:solidFill>
+                  <a:schemeClr val="tx1">
+                    <a:tint val="75000"/>
+                  </a:schemeClr>
+                </a:solidFill>
+                <a:latin typeface="+mn-lt"/>
+                <a:ea typeface="+mn-ea"/>
+                <a:cs typeface="+mn-cs"/>
+              </a:defRPr>
+            </a:lvl9pPr>
+          </a:lstStyle>
+          <a:p>
+            <a:r>
+              <a:rPr lang="en-US" sz="1600" dirty="0">
+                <a:solidFill>
+                  <a:schemeClr val="tx1"/>
+                </a:solidFill>
+              </a:rPr>
+              <a:t>RIGHT</a:t>
+            </a:r>
+          </a:p>
+        </p:txBody>
+      </p:sp>
+      <p:sp>
+        <p:nvSpPr>
+          <p:cNvPr id="13" name="Right Arrow 12"/>
+          <p:cNvSpPr/>
+          <p:nvPr/>
+        </p:nvSpPr>
+        <p:spPr>
+          <a:xfrm>
+            <a:off x="9637318" y="6391827"/>
+            <a:ext cx="640200" cy="289763"/>
+          </a:xfrm>
+          <a:prstGeom prst="rightArrow">
+            <a:avLst/>
+          </a:prstGeom>
+          <a:solidFill>
+            <a:schemeClr val="tx1"/>
+          </a:solidFill>
+          <a:ln>
+            <a:noFill/>
+          </a:ln>
+        </p:spPr>
+        <p:style>
+          <a:lnRef idx="1">
+            <a:schemeClr val="accent1"/>
+          </a:lnRef>
+          <a:fillRef idx="3">
+            <a:schemeClr val="accent1"/>
+          </a:fillRef>
+          <a:effectRef idx="2">
+            <a:schemeClr val="accent1"/>
+          </a:effectRef>
+          <a:fontRef idx="minor">
+            <a:schemeClr val="lt1"/>
+          </a:fontRef>
+        </p:style>
+        <p:txBody>
+          <a:bodyPr rtlCol="0" anchor="ctr"/>
+          <a:lstStyle/>
+          <a:p>
+            <a:pPr algn="ctr"/>
+            <a:endParaRPr lang="en-US"/>
+          </a:p>
+        </p:txBody>
+      </p:sp>
+      <p:sp>
+        <p:nvSpPr>
+          <p:cNvPr id="22" name="Rectangle 21">
+            <a:extLst>
+              <a:ext uri="{FF2B5EF4-FFF2-40B4-BE49-F238E27FC236}">
+                <a16:creationId xmlns:a16="http://schemas.microsoft.com/office/drawing/2014/main" id="{8AE16CA7-6556-E645-8E2C-3B78486F4571}"/>
+              </a:ext>
+            </a:extLst>
+          </p:cNvPr>
+          <p:cNvSpPr/>
+          <p:nvPr/>
+        </p:nvSpPr>
+        <p:spPr>
+          <a:xfrm>
+            <a:off x="6502401" y="3255385"/>
+            <a:ext cx="495300" cy="279400"/>
+          </a:xfrm>
+          <a:prstGeom prst="rect">
+            <a:avLst/>
+          </a:prstGeom>
+          <a:solidFill>
+            <a:schemeClr val="bg1"/>
+          </a:solidFill>
+          <a:ln>
+            <a:noFill/>
+          </a:ln>
+        </p:spPr>
+        <p:style>
+          <a:lnRef idx="2">
+            <a:schemeClr val="accent1">
+              <a:shade val="50000"/>
+            </a:schemeClr>
+          </a:lnRef>
+          <a:fillRef idx="1">
+            <a:schemeClr val="accent1"/>
+          </a:fillRef>
+          <a:effectRef idx="0">
+            <a:schemeClr val="accent1"/>
+          </a:effectRef>
+          <a:fontRef idx="minor">
+            <a:schemeClr val="lt1"/>
+          </a:fontRef>
+        </p:style>
+        <p:txBody>
+          <a:bodyPr rtlCol="0" anchor="ctr"/>
+          <a:lstStyle/>
+          <a:p>
+            <a:pPr algn="ctr"/>
+            <a:endParaRPr lang="en-US"/>
           </a:p>
         </p:txBody>
       </p:sp>
     </p:spTree>
     <p:extLst>
       <p:ext uri="{BB962C8B-B14F-4D97-AF65-F5344CB8AC3E}">
-        <p14:creationId xmlns:p14="http://schemas.microsoft.com/office/powerpoint/2010/main" val="3634238876"/>
+        <p14:creationId xmlns:p14="http://schemas.microsoft.com/office/powerpoint/2010/main" val="758451698"/>
       </p:ext>
     </p:extLst>
   </p:cSld>
@@ -14396,6 +14776,109 @@
       </p:grpSpPr>
       <p:sp>
         <p:nvSpPr>
+          <p:cNvPr id="3" name="Content Placeholder 2"/>
+          <p:cNvSpPr>
+            <a:spLocks noGrp="1"/>
+          </p:cNvSpPr>
+          <p:nvPr>
+            <p:ph idx="1"/>
+          </p:nvPr>
+        </p:nvSpPr>
+        <p:spPr>
+          <a:xfrm>
+            <a:off x="457200" y="860451"/>
+            <a:ext cx="11214100" cy="5013227"/>
+          </a:xfrm>
+          <a:ln>
+            <a:noFill/>
+          </a:ln>
+        </p:spPr>
+        <p:txBody>
+          <a:bodyPr>
+            <a:noAutofit/>
+          </a:bodyPr>
+          <a:lstStyle/>
+          <a:p>
+            <a:pPr marL="0" indent="0" algn="ctr">
+              <a:buNone/>
+            </a:pPr>
+            <a:r>
+              <a:rPr lang="en-US" dirty="0"/>
+              <a:t>Good Job!</a:t>
+            </a:r>
+          </a:p>
+          <a:p>
+            <a:pPr marL="0" indent="0" algn="ctr">
+              <a:buNone/>
+            </a:pPr>
+            <a:endParaRPr lang="en-US" dirty="0"/>
+          </a:p>
+          <a:p>
+            <a:pPr marL="0" indent="0" algn="ctr">
+              <a:buNone/>
+            </a:pPr>
+            <a:r>
+              <a:rPr lang="en-US" dirty="0"/>
+              <a:t>Now you know how to play this game.</a:t>
+            </a:r>
+          </a:p>
+          <a:p>
+            <a:pPr marL="0" indent="0" algn="ctr">
+              <a:buNone/>
+            </a:pPr>
+            <a:endParaRPr lang="en-US" dirty="0"/>
+          </a:p>
+          <a:p>
+            <a:pPr marL="0" indent="0" algn="ctr">
+              <a:buNone/>
+            </a:pPr>
+            <a:r>
+              <a:rPr lang="en-US" dirty="0"/>
+              <a:t>Once you are ready to start playing the  actual game to win points, please press the RIGHT BUTTON.</a:t>
+            </a:r>
+          </a:p>
+        </p:txBody>
+      </p:sp>
+    </p:spTree>
+    <p:extLst>
+      <p:ext uri="{BB962C8B-B14F-4D97-AF65-F5344CB8AC3E}">
+        <p14:creationId xmlns:p14="http://schemas.microsoft.com/office/powerpoint/2010/main" val="3634238876"/>
+      </p:ext>
+    </p:extLst>
+  </p:cSld>
+  <p:clrMapOvr>
+    <a:masterClrMapping/>
+  </p:clrMapOvr>
+</p:sld>
+</file>
+
+<file path=ppt/slides/slide25.xml><?xml version="1.0" encoding="utf-8"?>
+<p:sld xmlns:a="http://schemas.openxmlformats.org/drawingml/2006/main" xmlns:r="http://schemas.openxmlformats.org/officeDocument/2006/relationships" xmlns:p="http://schemas.openxmlformats.org/presentationml/2006/main">
+  <p:cSld>
+    <p:bg>
+      <p:bgPr>
+        <a:solidFill>
+          <a:schemeClr val="bg1"/>
+        </a:solidFill>
+        <a:effectLst/>
+      </p:bgPr>
+    </p:bg>
+    <p:spTree>
+      <p:nvGrpSpPr>
+        <p:cNvPr id="1" name=""/>
+        <p:cNvGrpSpPr/>
+        <p:nvPr/>
+      </p:nvGrpSpPr>
+      <p:grpSpPr>
+        <a:xfrm>
+          <a:off x="0" y="0"/>
+          <a:ext cx="0" cy="0"/>
+          <a:chOff x="0" y="0"/>
+          <a:chExt cx="0" cy="0"/>
+        </a:xfrm>
+      </p:grpSpPr>
+      <p:sp>
+        <p:nvSpPr>
           <p:cNvPr id="4" name="Title 3"/>
           <p:cNvSpPr>
             <a:spLocks noGrp="1"/>
@@ -14783,7 +15266,7 @@
 </p:sld>
 </file>
 
-<file path=ppt/slides/slide25.xml><?xml version="1.0" encoding="utf-8"?>
+<file path=ppt/slides/slide26.xml><?xml version="1.0" encoding="utf-8"?>
 <p:sld xmlns:a="http://schemas.openxmlformats.org/drawingml/2006/main" xmlns:r="http://schemas.openxmlformats.org/officeDocument/2006/relationships" xmlns:p="http://schemas.openxmlformats.org/presentationml/2006/main">
   <p:cSld>
     <p:bg>

</xml_diff>